<commit_message>
New slides and first photo
</commit_message>
<xml_diff>
--- a/math465_tsne.pptx
+++ b/math465_tsne.pptx
@@ -13,11 +13,11 @@
     <p:sldId id="258" r:id="rId4"/>
     <p:sldId id="259" r:id="rId5"/>
     <p:sldId id="260" r:id="rId6"/>
-    <p:sldId id="263" r:id="rId7"/>
-    <p:sldId id="261" r:id="rId8"/>
+    <p:sldId id="261" r:id="rId7"/>
+    <p:sldId id="263" r:id="rId8"/>
     <p:sldId id="265" r:id="rId9"/>
-    <p:sldId id="266" r:id="rId10"/>
-    <p:sldId id="264" r:id="rId11"/>
+    <p:sldId id="264" r:id="rId10"/>
+    <p:sldId id="266" r:id="rId11"/>
   </p:sldIdLst>
   <p:sldSz cx="12192000" cy="6858000"/>
   <p:notesSz cx="6858000" cy="9144000"/>
@@ -122,6 +122,18 @@
     </p:ext>
   </p:extLst>
 </p:presentation>
+</file>
+
+<file path=ppt/commentAuthors.xml><?xml version="1.0" encoding="utf-8"?>
+<p:cmAuthorLst xmlns:a="http://schemas.openxmlformats.org/drawingml/2006/main" xmlns:r="http://schemas.openxmlformats.org/officeDocument/2006/relationships" xmlns:p="http://schemas.openxmlformats.org/presentationml/2006/main">
+  <p:cmAuthor id="1" name="nvonturk@gmail.com" initials="" lastIdx="0" clrIdx="0">
+    <p:extLst>
+      <p:ext uri="{19B8F6BF-5375-455C-9EA6-DF929625EA0E}">
+        <p15:presenceInfo xmlns:p15="http://schemas.microsoft.com/office/powerpoint/2012/main" userId="" providerId=""/>
+      </p:ext>
+    </p:extLst>
+  </p:cmAuthor>
+</p:cmAuthorLst>
 </file>
 
 <file path=ppt/notesMasters/notesMaster1.xml><?xml version="1.0" encoding="utf-8"?>
@@ -549,6 +561,278 @@
     <p:extLst>
       <p:ext uri="{BB962C8B-B14F-4D97-AF65-F5344CB8AC3E}">
         <p14:creationId xmlns:p14="http://schemas.microsoft.com/office/powerpoint/2010/main" val="1413959647"/>
+      </p:ext>
+    </p:extLst>
+  </p:cSld>
+  <p:clrMapOvr>
+    <a:masterClrMapping/>
+  </p:clrMapOvr>
+</p:notes>
+</file>
+
+<file path=ppt/notesSlides/notesSlide2.xml><?xml version="1.0" encoding="utf-8"?>
+<p:notes xmlns:a="http://schemas.openxmlformats.org/drawingml/2006/main" xmlns:r="http://schemas.openxmlformats.org/officeDocument/2006/relationships" xmlns:p="http://schemas.openxmlformats.org/presentationml/2006/main">
+  <p:cSld>
+    <p:spTree>
+      <p:nvGrpSpPr>
+        <p:cNvPr id="1" name=""/>
+        <p:cNvGrpSpPr/>
+        <p:nvPr/>
+      </p:nvGrpSpPr>
+      <p:grpSpPr>
+        <a:xfrm>
+          <a:off x="0" y="0"/>
+          <a:ext cx="0" cy="0"/>
+          <a:chOff x="0" y="0"/>
+          <a:chExt cx="0" cy="0"/>
+        </a:xfrm>
+      </p:grpSpPr>
+      <p:sp>
+        <p:nvSpPr>
+          <p:cNvPr id="2" name="Slide Image Placeholder 1"/>
+          <p:cNvSpPr>
+            <a:spLocks noGrp="1" noRot="1" noChangeAspect="1"/>
+          </p:cNvSpPr>
+          <p:nvPr>
+            <p:ph type="sldImg"/>
+          </p:nvPr>
+        </p:nvSpPr>
+        <p:spPr/>
+      </p:sp>
+      <p:sp>
+        <p:nvSpPr>
+          <p:cNvPr id="3" name="Notes Placeholder 2"/>
+          <p:cNvSpPr>
+            <a:spLocks noGrp="1"/>
+          </p:cNvSpPr>
+          <p:nvPr>
+            <p:ph type="body" idx="1"/>
+          </p:nvPr>
+        </p:nvSpPr>
+        <p:spPr/>
+        <p:txBody>
+          <a:bodyPr/>
+          <a:lstStyle/>
+          <a:p>
+            <a:r>
+              <a:rPr lang="en-US" dirty="0" smtClean="0"/>
+              <a:t>Use analogy</a:t>
+            </a:r>
+            <a:r>
+              <a:rPr lang="en-US" baseline="0" dirty="0" smtClean="0"/>
+              <a:t> to describe more intuitively what similarity means especially depending on your location within the point cloud</a:t>
+            </a:r>
+          </a:p>
+          <a:p>
+            <a:endParaRPr lang="en-US" baseline="0" dirty="0" smtClean="0"/>
+          </a:p>
+          <a:p>
+            <a:r>
+              <a:rPr lang="en-US" baseline="0" dirty="0" smtClean="0"/>
+              <a:t>How this works:</a:t>
+            </a:r>
+          </a:p>
+          <a:p>
+            <a:endParaRPr lang="en-US" baseline="0" dirty="0" smtClean="0"/>
+          </a:p>
+          <a:p>
+            <a:r>
+              <a:rPr lang="en-US" baseline="0" dirty="0" smtClean="0"/>
+              <a:t>Iterate over values of sigma</a:t>
+            </a:r>
+          </a:p>
+          <a:p>
+            <a:r>
+              <a:rPr lang="en-US" baseline="0" dirty="0" smtClean="0"/>
+              <a:t>Sigma induces a change in the values of </a:t>
+            </a:r>
+            <a:r>
+              <a:rPr lang="en-US" baseline="0" dirty="0" err="1" smtClean="0"/>
+              <a:t>p_j|j</a:t>
+            </a:r>
+            <a:endParaRPr lang="en-US" baseline="0" dirty="0" smtClean="0"/>
+          </a:p>
+          <a:p>
+            <a:r>
+              <a:rPr lang="en-US" baseline="0" dirty="0" smtClean="0"/>
+              <a:t>Iterate over different distributions or values for sigma until the entropy value is reached</a:t>
+            </a:r>
+          </a:p>
+          <a:p>
+            <a:endParaRPr lang="en-US" baseline="0" dirty="0" smtClean="0"/>
+          </a:p>
+          <a:p>
+            <a:r>
+              <a:rPr lang="en-US" baseline="0" dirty="0" smtClean="0"/>
+              <a:t>This is a way of determining distributions that biases the algorithm to care more about preserving local structure</a:t>
+            </a:r>
+          </a:p>
+          <a:p>
+            <a:endParaRPr lang="en-US" baseline="0" dirty="0" smtClean="0"/>
+          </a:p>
+          <a:p>
+            <a:r>
+              <a:rPr lang="en-US" baseline="0" dirty="0" smtClean="0"/>
+              <a:t>Symmetric </a:t>
+            </a:r>
+            <a:r>
+              <a:rPr lang="en-US" baseline="0" dirty="0" err="1" smtClean="0"/>
+              <a:t>pij</a:t>
+            </a:r>
+            <a:r>
+              <a:rPr lang="en-US" baseline="0" dirty="0" smtClean="0"/>
+              <a:t> to account for outlier data points</a:t>
+            </a:r>
+          </a:p>
+          <a:p>
+            <a:endParaRPr lang="en-US" baseline="0" dirty="0" smtClean="0"/>
+          </a:p>
+          <a:p>
+            <a:endParaRPr lang="en-US" baseline="0" dirty="0" smtClean="0"/>
+          </a:p>
+        </p:txBody>
+      </p:sp>
+      <p:sp>
+        <p:nvSpPr>
+          <p:cNvPr id="4" name="Slide Number Placeholder 3"/>
+          <p:cNvSpPr>
+            <a:spLocks noGrp="1"/>
+          </p:cNvSpPr>
+          <p:nvPr>
+            <p:ph type="sldNum" sz="quarter" idx="10"/>
+          </p:nvPr>
+        </p:nvSpPr>
+        <p:spPr/>
+        <p:txBody>
+          <a:bodyPr/>
+          <a:lstStyle/>
+          <a:p>
+            <a:fld id="{4ABACD3E-33D6-8842-A5DE-832FA4DFC58F}" type="slidenum">
+              <a:rPr lang="en-US" smtClean="0"/>
+              <a:t>4</a:t>
+            </a:fld>
+            <a:endParaRPr lang="en-US"/>
+          </a:p>
+        </p:txBody>
+      </p:sp>
+    </p:spTree>
+    <p:extLst>
+      <p:ext uri="{BB962C8B-B14F-4D97-AF65-F5344CB8AC3E}">
+        <p14:creationId xmlns:p14="http://schemas.microsoft.com/office/powerpoint/2010/main" val="311709685"/>
+      </p:ext>
+    </p:extLst>
+  </p:cSld>
+  <p:clrMapOvr>
+    <a:masterClrMapping/>
+  </p:clrMapOvr>
+</p:notes>
+</file>
+
+<file path=ppt/notesSlides/notesSlide3.xml><?xml version="1.0" encoding="utf-8"?>
+<p:notes xmlns:a="http://schemas.openxmlformats.org/drawingml/2006/main" xmlns:r="http://schemas.openxmlformats.org/officeDocument/2006/relationships" xmlns:p="http://schemas.openxmlformats.org/presentationml/2006/main">
+  <p:cSld>
+    <p:spTree>
+      <p:nvGrpSpPr>
+        <p:cNvPr id="1" name=""/>
+        <p:cNvGrpSpPr/>
+        <p:nvPr/>
+      </p:nvGrpSpPr>
+      <p:grpSpPr>
+        <a:xfrm>
+          <a:off x="0" y="0"/>
+          <a:ext cx="0" cy="0"/>
+          <a:chOff x="0" y="0"/>
+          <a:chExt cx="0" cy="0"/>
+        </a:xfrm>
+      </p:grpSpPr>
+      <p:sp>
+        <p:nvSpPr>
+          <p:cNvPr id="2" name="Slide Image Placeholder 1"/>
+          <p:cNvSpPr>
+            <a:spLocks noGrp="1" noRot="1" noChangeAspect="1"/>
+          </p:cNvSpPr>
+          <p:nvPr>
+            <p:ph type="sldImg"/>
+          </p:nvPr>
+        </p:nvSpPr>
+        <p:spPr/>
+      </p:sp>
+      <p:sp>
+        <p:nvSpPr>
+          <p:cNvPr id="3" name="Notes Placeholder 2"/>
+          <p:cNvSpPr>
+            <a:spLocks noGrp="1"/>
+          </p:cNvSpPr>
+          <p:nvPr>
+            <p:ph type="body" idx="1"/>
+          </p:nvPr>
+        </p:nvSpPr>
+        <p:spPr/>
+        <p:txBody>
+          <a:bodyPr/>
+          <a:lstStyle/>
+          <a:p>
+            <a:r>
+              <a:rPr lang="en-US" dirty="0" smtClean="0"/>
+              <a:t>As points thrown</a:t>
+            </a:r>
+            <a:r>
+              <a:rPr lang="en-US" baseline="0" dirty="0" smtClean="0"/>
+              <a:t> to small dimension and local structure is preserved, more global structure can actually get farther away</a:t>
+            </a:r>
+          </a:p>
+          <a:p>
+            <a:endParaRPr lang="en-US" baseline="0" dirty="0" smtClean="0"/>
+          </a:p>
+          <a:p>
+            <a:r>
+              <a:rPr lang="en-US" baseline="0" dirty="0" smtClean="0"/>
+              <a:t>What that means is points that are not close in high dimensional space may be forced to be modeled farther from each other (recall the triangle of points demonstration)</a:t>
+            </a:r>
+          </a:p>
+          <a:p>
+            <a:endParaRPr lang="en-US" baseline="0" dirty="0" smtClean="0"/>
+          </a:p>
+          <a:p>
+            <a:r>
+              <a:rPr lang="en-US" baseline="0" dirty="0" smtClean="0"/>
+              <a:t>To compensate for this reality, the paper writers used a student t-distribution with 1 degree of freedom to reflect/describe the increased probability of points existing far away from </a:t>
+            </a:r>
+            <a:r>
+              <a:rPr lang="en-US" baseline="0" smtClean="0"/>
+              <a:t>each other</a:t>
+            </a:r>
+            <a:endParaRPr lang="en-US" dirty="0"/>
+          </a:p>
+        </p:txBody>
+      </p:sp>
+      <p:sp>
+        <p:nvSpPr>
+          <p:cNvPr id="4" name="Slide Number Placeholder 3"/>
+          <p:cNvSpPr>
+            <a:spLocks noGrp="1"/>
+          </p:cNvSpPr>
+          <p:nvPr>
+            <p:ph type="sldNum" sz="quarter" idx="10"/>
+          </p:nvPr>
+        </p:nvSpPr>
+        <p:spPr/>
+        <p:txBody>
+          <a:bodyPr/>
+          <a:lstStyle/>
+          <a:p>
+            <a:fld id="{4ABACD3E-33D6-8842-A5DE-832FA4DFC58F}" type="slidenum">
+              <a:rPr lang="en-US" smtClean="0"/>
+              <a:t>5</a:t>
+            </a:fld>
+            <a:endParaRPr lang="en-US"/>
+          </a:p>
+        </p:txBody>
+      </p:sp>
+    </p:spTree>
+    <p:extLst>
+      <p:ext uri="{BB962C8B-B14F-4D97-AF65-F5344CB8AC3E}">
+        <p14:creationId xmlns:p14="http://schemas.microsoft.com/office/powerpoint/2010/main" val="1972854954"/>
       </p:ext>
     </p:extLst>
   </p:cSld>
@@ -3565,11 +3849,8 @@
           <a:p>
             <a:r>
               <a:rPr lang="en-US" dirty="0" smtClean="0"/>
-              <a:t>Strengths/Pitfalls</a:t>
-            </a:r>
-            <a:br>
-              <a:rPr lang="en-US" dirty="0" smtClean="0"/>
-            </a:br>
+              <a:t>Comparison to Other Methods</a:t>
+            </a:r>
             <a:endParaRPr lang="en-US" dirty="0"/>
           </a:p>
         </p:txBody>
@@ -3596,7 +3877,7 @@
     </p:spTree>
     <p:extLst>
       <p:ext uri="{BB962C8B-B14F-4D97-AF65-F5344CB8AC3E}">
-        <p14:creationId xmlns:p14="http://schemas.microsoft.com/office/powerpoint/2010/main" val="1889581618"/>
+        <p14:creationId xmlns:p14="http://schemas.microsoft.com/office/powerpoint/2010/main" val="1054989624"/>
       </p:ext>
     </p:extLst>
   </p:cSld>
@@ -3959,8 +4240,8 @@
           </a:p>
         </p:txBody>
       </p:sp>
-      <mc:AlternateContent xmlns:mc="http://schemas.openxmlformats.org/markup-compatibility/2006">
-        <mc:Choice xmlns:a14="http://schemas.microsoft.com/office/drawing/2010/main" Requires="a14">
+      <mc:AlternateContent xmlns:mc="http://schemas.openxmlformats.org/markup-compatibility/2006" xmlns:a14="http://schemas.microsoft.com/office/drawing/2010/main">
+        <mc:Choice Requires="a14">
           <p:sp>
             <p:nvSpPr>
               <p:cNvPr id="3" name="Content Placeholder 2"/>
@@ -4069,7 +4350,7 @@
                     <m:sSub>
                       <m:sSubPr>
                         <m:ctrlPr>
-                          <a:rPr lang="en-US" b="1" i="0" smtClean="0">
+                          <a:rPr lang="en-US" b="1" i="1" smtClean="0">
                             <a:latin typeface="Cambria Math" charset="0"/>
                           </a:rPr>
                         </m:ctrlPr>
@@ -5230,7 +5511,7 @@
             </p:txBody>
           </p:sp>
         </mc:Choice>
-        <mc:Fallback>
+        <mc:Fallback xmlns="">
           <p:sp>
             <p:nvSpPr>
               <p:cNvPr id="3" name="Content Placeholder 2"/>
@@ -5305,48 +5586,1656 @@
           <a:chExt cx="0" cy="0"/>
         </a:xfrm>
       </p:grpSpPr>
-      <p:sp>
-        <p:nvSpPr>
-          <p:cNvPr id="2" name="Title 1"/>
-          <p:cNvSpPr>
-            <a:spLocks noGrp="1"/>
-          </p:cNvSpPr>
-          <p:nvPr>
-            <p:ph type="title"/>
-          </p:nvPr>
-        </p:nvSpPr>
-        <p:spPr/>
-        <p:txBody>
-          <a:bodyPr/>
-          <a:lstStyle/>
-          <a:p>
-            <a:r>
-              <a:rPr lang="en-US" dirty="0" smtClean="0"/>
-              <a:t>Similarity P in R^D</a:t>
-            </a:r>
-            <a:endParaRPr lang="en-US" dirty="0"/>
-          </a:p>
-        </p:txBody>
-      </p:sp>
-      <p:sp>
-        <p:nvSpPr>
-          <p:cNvPr id="3" name="Content Placeholder 2"/>
-          <p:cNvSpPr>
-            <a:spLocks noGrp="1"/>
-          </p:cNvSpPr>
-          <p:nvPr>
-            <p:ph idx="1"/>
-          </p:nvPr>
-        </p:nvSpPr>
-        <p:spPr/>
-        <p:txBody>
-          <a:bodyPr/>
-          <a:lstStyle/>
-          <a:p>
-            <a:endParaRPr lang="en-US"/>
-          </a:p>
-        </p:txBody>
-      </p:sp>
+      <mc:AlternateContent xmlns:mc="http://schemas.openxmlformats.org/markup-compatibility/2006">
+        <mc:Choice xmlns:a14="http://schemas.microsoft.com/office/drawing/2010/main" Requires="a14">
+          <p:sp>
+            <p:nvSpPr>
+              <p:cNvPr id="2" name="Title 1"/>
+              <p:cNvSpPr>
+                <a:spLocks noGrp="1"/>
+              </p:cNvSpPr>
+              <p:nvPr>
+                <p:ph type="title"/>
+              </p:nvPr>
+            </p:nvSpPr>
+            <p:spPr/>
+            <p:txBody>
+              <a:bodyPr/>
+              <a:lstStyle/>
+              <a:p>
+                <a:r>
+                  <a:rPr lang="en-US" dirty="0" smtClean="0"/>
+                  <a:t>Similarity in </a:t>
+                </a:r>
+                <a14:m>
+                  <m:oMath xmlns:m="http://schemas.openxmlformats.org/officeDocument/2006/math">
+                    <m:sSup>
+                      <m:sSupPr>
+                        <m:ctrlPr>
+                          <a:rPr lang="en-US" b="0" i="1" smtClean="0">
+                            <a:latin typeface="Cambria Math" charset="0"/>
+                          </a:rPr>
+                        </m:ctrlPr>
+                      </m:sSupPr>
+                      <m:e>
+                        <m:r>
+                          <a:rPr lang="en-US" b="0" i="1" smtClean="0">
+                            <a:latin typeface="Cambria Math" charset="0"/>
+                          </a:rPr>
+                          <m:t>ℝ</m:t>
+                        </m:r>
+                      </m:e>
+                      <m:sup>
+                        <m:r>
+                          <a:rPr lang="en-US" b="0" i="1" smtClean="0">
+                            <a:latin typeface="Cambria Math" charset="0"/>
+                          </a:rPr>
+                          <m:t>𝐷</m:t>
+                        </m:r>
+                      </m:sup>
+                    </m:sSup>
+                  </m:oMath>
+                </a14:m>
+                <a:endParaRPr lang="en-US" dirty="0"/>
+              </a:p>
+            </p:txBody>
+          </p:sp>
+        </mc:Choice>
+        <mc:Fallback>
+          <p:sp>
+            <p:nvSpPr>
+              <p:cNvPr id="2" name="Title 1"/>
+              <p:cNvSpPr>
+                <a:spLocks noGrp="1" noRot="1" noChangeAspect="1" noMove="1" noResize="1" noEditPoints="1" noAdjustHandles="1" noChangeArrowheads="1" noChangeShapeType="1" noTextEdit="1"/>
+              </p:cNvSpPr>
+              <p:nvPr>
+                <p:ph type="title"/>
+              </p:nvPr>
+            </p:nvSpPr>
+            <p:spPr>
+              <a:blipFill rotWithShape="0">
+                <a:blip r:embed="rId3"/>
+                <a:stretch>
+                  <a:fillRect l="-2377"/>
+                </a:stretch>
+              </a:blipFill>
+            </p:spPr>
+            <p:txBody>
+              <a:bodyPr/>
+              <a:lstStyle/>
+              <a:p>
+                <a:r>
+                  <a:rPr lang="en-US">
+                    <a:noFill/>
+                  </a:rPr>
+                  <a:t> </a:t>
+                </a:r>
+              </a:p>
+            </p:txBody>
+          </p:sp>
+        </mc:Fallback>
+      </mc:AlternateContent>
+      <mc:AlternateContent xmlns:mc="http://schemas.openxmlformats.org/markup-compatibility/2006">
+        <mc:Choice xmlns:a14="http://schemas.microsoft.com/office/drawing/2010/main" Requires="a14">
+          <p:sp>
+            <p:nvSpPr>
+              <p:cNvPr id="3" name="Content Placeholder 2"/>
+              <p:cNvSpPr>
+                <a:spLocks noGrp="1"/>
+              </p:cNvSpPr>
+              <p:nvPr>
+                <p:ph idx="1"/>
+              </p:nvPr>
+            </p:nvSpPr>
+            <p:spPr>
+              <a:xfrm>
+                <a:off x="838200" y="1690688"/>
+                <a:ext cx="10515600" cy="4351338"/>
+              </a:xfrm>
+            </p:spPr>
+            <p:txBody>
+              <a:bodyPr>
+                <a:normAutofit fontScale="77500" lnSpcReduction="20000"/>
+              </a:bodyPr>
+              <a:lstStyle/>
+              <a:p>
+                <a:pPr marL="0" lvl="0" indent="0">
+                  <a:lnSpc>
+                    <a:spcPct val="100000"/>
+                  </a:lnSpc>
+                  <a:spcBef>
+                    <a:spcPts val="0"/>
+                  </a:spcBef>
+                  <a:buNone/>
+                </a:pPr>
+                <a14:m>
+                  <m:oMath xmlns:m="http://schemas.openxmlformats.org/officeDocument/2006/math">
+                    <m:sSub>
+                      <m:sSubPr>
+                        <m:ctrlPr>
+                          <a:rPr lang="en-US" b="0" i="1" smtClean="0">
+                            <a:latin typeface="Cambria Math" charset="0"/>
+                          </a:rPr>
+                        </m:ctrlPr>
+                      </m:sSubPr>
+                      <m:e>
+                        <m:r>
+                          <a:rPr lang="en-US" b="0" i="1" smtClean="0">
+                            <a:latin typeface="Cambria Math" charset="0"/>
+                          </a:rPr>
+                          <m:t>𝑝</m:t>
+                        </m:r>
+                      </m:e>
+                      <m:sub>
+                        <m:r>
+                          <a:rPr lang="en-US" b="0" i="1" smtClean="0">
+                            <a:latin typeface="Cambria Math" charset="0"/>
+                          </a:rPr>
+                          <m:t>𝑗</m:t>
+                        </m:r>
+                        <m:r>
+                          <a:rPr lang="en-US" b="0" i="1" smtClean="0">
+                            <a:latin typeface="Cambria Math" charset="0"/>
+                          </a:rPr>
+                          <m:t>|</m:t>
+                        </m:r>
+                        <m:r>
+                          <a:rPr lang="en-US" b="0" i="1" smtClean="0">
+                            <a:latin typeface="Cambria Math" charset="0"/>
+                          </a:rPr>
+                          <m:t>𝑖</m:t>
+                        </m:r>
+                      </m:sub>
+                    </m:sSub>
+                    <m:r>
+                      <a:rPr lang="en-US" b="0" i="1" smtClean="0">
+                        <a:latin typeface="Cambria Math" charset="0"/>
+                      </a:rPr>
+                      <m:t>=</m:t>
+                    </m:r>
+                  </m:oMath>
+                </a14:m>
+                <a:r>
+                  <a:rPr lang="en-US" dirty="0" smtClean="0"/>
+                  <a:t> “neighborliness” </a:t>
+                </a:r>
+                <a:r>
+                  <a:rPr lang="en-US" i="1" dirty="0" smtClean="0"/>
+                  <a:t>of </a:t>
+                </a:r>
+                <a14:m>
+                  <m:oMath xmlns:m="http://schemas.openxmlformats.org/officeDocument/2006/math">
+                    <m:sSub>
+                      <m:sSubPr>
+                        <m:ctrlPr>
+                          <a:rPr lang="en-US" b="1" i="1">
+                            <a:latin typeface="Cambria Math" charset="0"/>
+                          </a:rPr>
+                        </m:ctrlPr>
+                      </m:sSubPr>
+                      <m:e>
+                        <m:r>
+                          <a:rPr lang="en-US" b="1" i="1">
+                            <a:latin typeface="Cambria Math" charset="0"/>
+                          </a:rPr>
+                          <m:t>𝒙</m:t>
+                        </m:r>
+                      </m:e>
+                      <m:sub>
+                        <m:r>
+                          <a:rPr lang="en-US" b="1" i="1">
+                            <a:latin typeface="Cambria Math" charset="0"/>
+                          </a:rPr>
+                          <m:t>𝒋</m:t>
+                        </m:r>
+                      </m:sub>
+                    </m:sSub>
+                  </m:oMath>
+                </a14:m>
+                <a:r>
+                  <a:rPr lang="en-US" dirty="0"/>
+                  <a:t> </a:t>
+                </a:r>
+                <a:r>
+                  <a:rPr lang="en-US" dirty="0" smtClean="0"/>
+                  <a:t>g</a:t>
+                </a:r>
+                <a14:m>
+                  <m:oMath xmlns:m="http://schemas.openxmlformats.org/officeDocument/2006/math">
+                    <m:r>
+                      <m:rPr>
+                        <m:sty m:val="p"/>
+                      </m:rPr>
+                      <a:rPr lang="en-US" b="0" i="0" smtClean="0">
+                        <a:latin typeface="Cambria Math" charset="0"/>
+                      </a:rPr>
+                      <m:t>iven</m:t>
+                    </m:r>
+                    <m:r>
+                      <a:rPr lang="en-US" b="0" i="0" smtClean="0">
+                        <a:latin typeface="Cambria Math" charset="0"/>
+                      </a:rPr>
+                      <m:t> </m:t>
+                    </m:r>
+                    <m:sSub>
+                      <m:sSubPr>
+                        <m:ctrlPr>
+                          <a:rPr lang="en-US" b="1" i="1">
+                            <a:latin typeface="Cambria Math" charset="0"/>
+                          </a:rPr>
+                        </m:ctrlPr>
+                      </m:sSubPr>
+                      <m:e>
+                        <m:r>
+                          <a:rPr lang="en-US" b="1" i="1">
+                            <a:latin typeface="Cambria Math" charset="0"/>
+                          </a:rPr>
+                          <m:t>𝒙</m:t>
+                        </m:r>
+                      </m:e>
+                      <m:sub>
+                        <m:r>
+                          <a:rPr lang="en-US" b="1" i="1">
+                            <a:latin typeface="Cambria Math" charset="0"/>
+                          </a:rPr>
+                          <m:t>𝒊</m:t>
+                        </m:r>
+                      </m:sub>
+                    </m:sSub>
+                  </m:oMath>
+                </a14:m>
+                <a:r>
+                  <a:rPr lang="en-US" dirty="0" smtClean="0"/>
+                  <a:t> = </a:t>
+                </a:r>
+                <a14:m>
+                  <m:oMath xmlns:m="http://schemas.openxmlformats.org/officeDocument/2006/math">
+                    <m:f>
+                      <m:fPr>
+                        <m:ctrlPr>
+                          <a:rPr lang="mr-IN" i="1" smtClean="0">
+                            <a:latin typeface="Cambria Math" charset="0"/>
+                          </a:rPr>
+                        </m:ctrlPr>
+                      </m:fPr>
+                      <m:num>
+                        <m:r>
+                          <m:rPr>
+                            <m:sty m:val="p"/>
+                          </m:rPr>
+                          <a:rPr lang="en-US" b="0" i="0" smtClean="0">
+                            <a:latin typeface="Cambria Math" charset="0"/>
+                          </a:rPr>
+                          <m:t>exp</m:t>
+                        </m:r>
+                        <m:d>
+                          <m:dPr>
+                            <m:ctrlPr>
+                              <a:rPr lang="mr-IN" b="0" i="1" smtClean="0">
+                                <a:latin typeface="Cambria Math" charset="0"/>
+                              </a:rPr>
+                            </m:ctrlPr>
+                          </m:dPr>
+                          <m:e>
+                            <m:f>
+                              <m:fPr>
+                                <m:type m:val="lin"/>
+                                <m:ctrlPr>
+                                  <a:rPr lang="en-US" i="1">
+                                    <a:latin typeface="Cambria Math" charset="0"/>
+                                  </a:rPr>
+                                </m:ctrlPr>
+                              </m:fPr>
+                              <m:num>
+                                <m:d>
+                                  <m:dPr>
+                                    <m:ctrlPr>
+                                      <a:rPr lang="en-US" i="1">
+                                        <a:latin typeface="Cambria Math" charset="0"/>
+                                      </a:rPr>
+                                    </m:ctrlPr>
+                                  </m:dPr>
+                                  <m:e>
+                                    <m:r>
+                                      <a:rPr lang="en-US" i="1">
+                                        <a:latin typeface="Cambria Math" charset="0"/>
+                                      </a:rPr>
+                                      <m:t>−</m:t>
+                                    </m:r>
+                                    <m:sSup>
+                                      <m:sSupPr>
+                                        <m:ctrlPr>
+                                          <a:rPr lang="en-US" i="1">
+                                            <a:latin typeface="Cambria Math" charset="0"/>
+                                          </a:rPr>
+                                        </m:ctrlPr>
+                                      </m:sSupPr>
+                                      <m:e>
+                                        <m:d>
+                                          <m:dPr>
+                                            <m:begChr m:val="|"/>
+                                            <m:endChr m:val="|"/>
+                                            <m:ctrlPr>
+                                              <a:rPr lang="en-US" i="1">
+                                                <a:latin typeface="Cambria Math" charset="0"/>
+                                              </a:rPr>
+                                            </m:ctrlPr>
+                                          </m:dPr>
+                                          <m:e>
+                                            <m:d>
+                                              <m:dPr>
+                                                <m:begChr m:val="|"/>
+                                                <m:endChr m:val="|"/>
+                                                <m:ctrlPr>
+                                                  <a:rPr lang="en-US" i="1" smtClean="0">
+                                                    <a:latin typeface="Cambria Math" charset="0"/>
+                                                  </a:rPr>
+                                                </m:ctrlPr>
+                                              </m:dPr>
+                                              <m:e>
+                                                <m:sSub>
+                                                  <m:sSubPr>
+                                                    <m:ctrlPr>
+                                                      <a:rPr lang="en-US" i="1">
+                                                        <a:latin typeface="Cambria Math" charset="0"/>
+                                                      </a:rPr>
+                                                    </m:ctrlPr>
+                                                  </m:sSubPr>
+                                                  <m:e>
+                                                    <m:r>
+                                                      <a:rPr lang="en-US" i="1">
+                                                        <a:latin typeface="Cambria Math" charset="0"/>
+                                                      </a:rPr>
+                                                      <m:t>𝑥</m:t>
+                                                    </m:r>
+                                                  </m:e>
+                                                  <m:sub>
+                                                    <m:r>
+                                                      <a:rPr lang="en-US" i="1">
+                                                        <a:latin typeface="Cambria Math" charset="0"/>
+                                                      </a:rPr>
+                                                      <m:t>𝑖</m:t>
+                                                    </m:r>
+                                                  </m:sub>
+                                                </m:sSub>
+                                                <m:r>
+                                                  <a:rPr lang="en-US" i="1">
+                                                    <a:latin typeface="Cambria Math" charset="0"/>
+                                                  </a:rPr>
+                                                  <m:t>−</m:t>
+                                                </m:r>
+                                                <m:sSub>
+                                                  <m:sSubPr>
+                                                    <m:ctrlPr>
+                                                      <a:rPr lang="en-US" i="1">
+                                                        <a:latin typeface="Cambria Math" charset="0"/>
+                                                      </a:rPr>
+                                                    </m:ctrlPr>
+                                                  </m:sSubPr>
+                                                  <m:e>
+                                                    <m:r>
+                                                      <a:rPr lang="en-US" i="1">
+                                                        <a:latin typeface="Cambria Math" charset="0"/>
+                                                      </a:rPr>
+                                                      <m:t>𝑥</m:t>
+                                                    </m:r>
+                                                  </m:e>
+                                                  <m:sub>
+                                                    <m:r>
+                                                      <a:rPr lang="en-US" b="0" i="1" smtClean="0">
+                                                        <a:latin typeface="Cambria Math" charset="0"/>
+                                                      </a:rPr>
+                                                      <m:t>𝑗</m:t>
+                                                    </m:r>
+                                                  </m:sub>
+                                                </m:sSub>
+                                              </m:e>
+                                            </m:d>
+                                          </m:e>
+                                        </m:d>
+                                      </m:e>
+                                      <m:sup>
+                                        <m:r>
+                                          <a:rPr lang="en-US" i="1">
+                                            <a:latin typeface="Cambria Math" charset="0"/>
+                                          </a:rPr>
+                                          <m:t>2</m:t>
+                                        </m:r>
+                                      </m:sup>
+                                    </m:sSup>
+                                  </m:e>
+                                </m:d>
+                              </m:num>
+                              <m:den>
+                                <m:d>
+                                  <m:dPr>
+                                    <m:ctrlPr>
+                                      <a:rPr lang="en-US" i="1">
+                                        <a:latin typeface="Cambria Math" charset="0"/>
+                                      </a:rPr>
+                                    </m:ctrlPr>
+                                  </m:dPr>
+                                  <m:e>
+                                    <m:r>
+                                      <a:rPr lang="en-US" i="1">
+                                        <a:latin typeface="Cambria Math" charset="0"/>
+                                      </a:rPr>
+                                      <m:t>2</m:t>
+                                    </m:r>
+                                    <m:sSubSup>
+                                      <m:sSubSupPr>
+                                        <m:ctrlPr>
+                                          <a:rPr lang="en-US" i="1">
+                                            <a:latin typeface="Cambria Math" charset="0"/>
+                                          </a:rPr>
+                                        </m:ctrlPr>
+                                      </m:sSubSupPr>
+                                      <m:e>
+                                        <m:r>
+                                          <a:rPr lang="en-US" i="1">
+                                            <a:latin typeface="Cambria Math" charset="0"/>
+                                          </a:rPr>
+                                          <m:t>𝜎</m:t>
+                                        </m:r>
+                                      </m:e>
+                                      <m:sub>
+                                        <m:r>
+                                          <a:rPr lang="en-US" i="1">
+                                            <a:latin typeface="Cambria Math" charset="0"/>
+                                          </a:rPr>
+                                          <m:t>𝑖</m:t>
+                                        </m:r>
+                                      </m:sub>
+                                      <m:sup>
+                                        <m:r>
+                                          <a:rPr lang="en-US" i="1">
+                                            <a:latin typeface="Cambria Math" charset="0"/>
+                                          </a:rPr>
+                                          <m:t>2</m:t>
+                                        </m:r>
+                                      </m:sup>
+                                    </m:sSubSup>
+                                  </m:e>
+                                </m:d>
+                              </m:den>
+                            </m:f>
+                          </m:e>
+                        </m:d>
+                      </m:num>
+                      <m:den>
+                        <m:nary>
+                          <m:naryPr>
+                            <m:chr m:val="∑"/>
+                            <m:supHide m:val="on"/>
+                            <m:ctrlPr>
+                              <a:rPr lang="is-IS" i="1" smtClean="0">
+                                <a:latin typeface="Cambria Math" charset="0"/>
+                              </a:rPr>
+                            </m:ctrlPr>
+                          </m:naryPr>
+                          <m:sub>
+                            <m:r>
+                              <m:rPr>
+                                <m:brk m:alnAt="23"/>
+                              </m:rPr>
+                              <a:rPr lang="en-US" b="0" i="1" smtClean="0">
+                                <a:latin typeface="Cambria Math" charset="0"/>
+                              </a:rPr>
+                              <m:t>𝑘</m:t>
+                            </m:r>
+                            <m:r>
+                              <a:rPr lang="en-US" b="0" i="1" smtClean="0">
+                                <a:latin typeface="Cambria Math" charset="0"/>
+                              </a:rPr>
+                              <m:t>≠</m:t>
+                            </m:r>
+                            <m:r>
+                              <a:rPr lang="en-US" b="0" i="1" smtClean="0">
+                                <a:latin typeface="Cambria Math" charset="0"/>
+                              </a:rPr>
+                              <m:t>𝑖</m:t>
+                            </m:r>
+                          </m:sub>
+                          <m:sup/>
+                          <m:e>
+                            <m:r>
+                              <m:rPr>
+                                <m:sty m:val="p"/>
+                              </m:rPr>
+                              <a:rPr lang="en-US">
+                                <a:latin typeface="Cambria Math" charset="0"/>
+                              </a:rPr>
+                              <m:t>exp</m:t>
+                            </m:r>
+                            <m:r>
+                              <a:rPr lang="en-US" i="1">
+                                <a:latin typeface="Cambria Math" charset="0"/>
+                              </a:rPr>
+                              <m:t>⁡</m:t>
+                            </m:r>
+                            <m:d>
+                              <m:dPr>
+                                <m:ctrlPr>
+                                  <a:rPr lang="mr-IN" i="1">
+                                    <a:latin typeface="Cambria Math" charset="0"/>
+                                  </a:rPr>
+                                </m:ctrlPr>
+                              </m:dPr>
+                              <m:e>
+                                <m:f>
+                                  <m:fPr>
+                                    <m:type m:val="lin"/>
+                                    <m:ctrlPr>
+                                      <a:rPr lang="en-US" i="1" smtClean="0">
+                                        <a:latin typeface="Cambria Math" charset="0"/>
+                                      </a:rPr>
+                                    </m:ctrlPr>
+                                  </m:fPr>
+                                  <m:num>
+                                    <m:d>
+                                      <m:dPr>
+                                        <m:ctrlPr>
+                                          <a:rPr lang="en-US" i="1">
+                                            <a:latin typeface="Cambria Math" charset="0"/>
+                                          </a:rPr>
+                                        </m:ctrlPr>
+                                      </m:dPr>
+                                      <m:e>
+                                        <m:r>
+                                          <a:rPr lang="en-US" i="1">
+                                            <a:latin typeface="Cambria Math" charset="0"/>
+                                          </a:rPr>
+                                          <m:t>−</m:t>
+                                        </m:r>
+                                        <m:sSup>
+                                          <m:sSupPr>
+                                            <m:ctrlPr>
+                                              <a:rPr lang="en-US" i="1">
+                                                <a:latin typeface="Cambria Math" charset="0"/>
+                                              </a:rPr>
+                                            </m:ctrlPr>
+                                          </m:sSupPr>
+                                          <m:e>
+                                            <m:d>
+                                              <m:dPr>
+                                                <m:begChr m:val="|"/>
+                                                <m:endChr m:val="|"/>
+                                                <m:ctrlPr>
+                                                  <a:rPr lang="en-US" i="1">
+                                                    <a:latin typeface="Cambria Math" charset="0"/>
+                                                  </a:rPr>
+                                                </m:ctrlPr>
+                                              </m:dPr>
+                                              <m:e>
+                                                <m:d>
+                                                  <m:dPr>
+                                                    <m:begChr m:val="|"/>
+                                                    <m:endChr m:val="|"/>
+                                                    <m:ctrlPr>
+                                                      <a:rPr lang="en-US" i="1">
+                                                        <a:latin typeface="Cambria Math" charset="0"/>
+                                                      </a:rPr>
+                                                    </m:ctrlPr>
+                                                  </m:dPr>
+                                                  <m:e>
+                                                    <m:sSub>
+                                                      <m:sSubPr>
+                                                        <m:ctrlPr>
+                                                          <a:rPr lang="en-US" i="1">
+                                                            <a:latin typeface="Cambria Math" charset="0"/>
+                                                          </a:rPr>
+                                                        </m:ctrlPr>
+                                                      </m:sSubPr>
+                                                      <m:e>
+                                                        <m:r>
+                                                          <a:rPr lang="en-US" i="1">
+                                                            <a:latin typeface="Cambria Math" charset="0"/>
+                                                          </a:rPr>
+                                                          <m:t>𝑥</m:t>
+                                                        </m:r>
+                                                      </m:e>
+                                                      <m:sub>
+                                                        <m:r>
+                                                          <a:rPr lang="en-US" i="1">
+                                                            <a:latin typeface="Cambria Math" charset="0"/>
+                                                          </a:rPr>
+                                                          <m:t>𝑖</m:t>
+                                                        </m:r>
+                                                      </m:sub>
+                                                    </m:sSub>
+                                                    <m:r>
+                                                      <a:rPr lang="en-US" i="1">
+                                                        <a:latin typeface="Cambria Math" charset="0"/>
+                                                      </a:rPr>
+                                                      <m:t>−</m:t>
+                                                    </m:r>
+                                                    <m:sSub>
+                                                      <m:sSubPr>
+                                                        <m:ctrlPr>
+                                                          <a:rPr lang="en-US" i="1">
+                                                            <a:latin typeface="Cambria Math" charset="0"/>
+                                                          </a:rPr>
+                                                        </m:ctrlPr>
+                                                      </m:sSubPr>
+                                                      <m:e>
+                                                        <m:r>
+                                                          <a:rPr lang="en-US" i="1">
+                                                            <a:latin typeface="Cambria Math" charset="0"/>
+                                                          </a:rPr>
+                                                          <m:t>𝑥</m:t>
+                                                        </m:r>
+                                                      </m:e>
+                                                      <m:sub>
+                                                        <m:r>
+                                                          <a:rPr lang="en-US" i="1">
+                                                            <a:latin typeface="Cambria Math" charset="0"/>
+                                                          </a:rPr>
+                                                          <m:t>𝑘</m:t>
+                                                        </m:r>
+                                                      </m:sub>
+                                                    </m:sSub>
+                                                  </m:e>
+                                                </m:d>
+                                              </m:e>
+                                            </m:d>
+                                          </m:e>
+                                          <m:sup>
+                                            <m:r>
+                                              <a:rPr lang="en-US" i="1">
+                                                <a:latin typeface="Cambria Math" charset="0"/>
+                                              </a:rPr>
+                                              <m:t>2</m:t>
+                                            </m:r>
+                                          </m:sup>
+                                        </m:sSup>
+                                      </m:e>
+                                    </m:d>
+                                  </m:num>
+                                  <m:den>
+                                    <m:d>
+                                      <m:dPr>
+                                        <m:ctrlPr>
+                                          <a:rPr lang="en-US" i="1">
+                                            <a:latin typeface="Cambria Math" charset="0"/>
+                                          </a:rPr>
+                                        </m:ctrlPr>
+                                      </m:dPr>
+                                      <m:e>
+                                        <m:r>
+                                          <a:rPr lang="en-US" i="1">
+                                            <a:latin typeface="Cambria Math" charset="0"/>
+                                          </a:rPr>
+                                          <m:t>2</m:t>
+                                        </m:r>
+                                        <m:sSubSup>
+                                          <m:sSubSupPr>
+                                            <m:ctrlPr>
+                                              <a:rPr lang="en-US" i="1">
+                                                <a:latin typeface="Cambria Math" charset="0"/>
+                                              </a:rPr>
+                                            </m:ctrlPr>
+                                          </m:sSubSupPr>
+                                          <m:e>
+                                            <m:r>
+                                              <a:rPr lang="en-US" i="1">
+                                                <a:latin typeface="Cambria Math" charset="0"/>
+                                              </a:rPr>
+                                              <m:t>𝜎</m:t>
+                                            </m:r>
+                                          </m:e>
+                                          <m:sub>
+                                            <m:r>
+                                              <a:rPr lang="en-US" i="1">
+                                                <a:latin typeface="Cambria Math" charset="0"/>
+                                              </a:rPr>
+                                              <m:t>𝑖</m:t>
+                                            </m:r>
+                                          </m:sub>
+                                          <m:sup>
+                                            <m:r>
+                                              <a:rPr lang="en-US" b="0" i="1" smtClean="0">
+                                                <a:latin typeface="Cambria Math" charset="0"/>
+                                              </a:rPr>
+                                              <m:t>2</m:t>
+                                            </m:r>
+                                          </m:sup>
+                                        </m:sSubSup>
+                                      </m:e>
+                                    </m:d>
+                                  </m:den>
+                                </m:f>
+                              </m:e>
+                            </m:d>
+                          </m:e>
+                        </m:nary>
+                      </m:den>
+                    </m:f>
+                  </m:oMath>
+                </a14:m>
+                <a:endParaRPr lang="en-US" b="1" i="1" dirty="0"/>
+              </a:p>
+              <a:p>
+                <a:pPr marL="0" marR="0" lvl="0" indent="0" defTabSz="914400" eaLnBrk="1" fontAlgn="auto" latinLnBrk="0" hangingPunct="1">
+                  <a:lnSpc>
+                    <a:spcPct val="100000"/>
+                  </a:lnSpc>
+                  <a:spcBef>
+                    <a:spcPts val="0"/>
+                  </a:spcBef>
+                  <a:spcAft>
+                    <a:spcPts val="0"/>
+                  </a:spcAft>
+                  <a:buClrTx/>
+                  <a:buSzTx/>
+                  <a:buFontTx/>
+                  <a:buNone/>
+                  <a:tabLst/>
+                  <a:defRPr/>
+                </a:pPr>
+                <a:endParaRPr lang="en-US" dirty="0" smtClean="0"/>
+              </a:p>
+              <a:p>
+                <a:pPr marL="0" marR="0" lvl="0" indent="0" defTabSz="914400" eaLnBrk="1" fontAlgn="auto" latinLnBrk="0" hangingPunct="1">
+                  <a:lnSpc>
+                    <a:spcPct val="100000"/>
+                  </a:lnSpc>
+                  <a:spcBef>
+                    <a:spcPts val="0"/>
+                  </a:spcBef>
+                  <a:spcAft>
+                    <a:spcPts val="0"/>
+                  </a:spcAft>
+                  <a:buClrTx/>
+                  <a:buSzTx/>
+                  <a:buFontTx/>
+                  <a:buNone/>
+                  <a:tabLst/>
+                  <a:defRPr/>
+                </a:pPr>
+                <a:endParaRPr lang="en-US" dirty="0" smtClean="0"/>
+              </a:p>
+              <a:p>
+                <a:pPr marL="0" marR="0" lvl="0" indent="0" defTabSz="914400" eaLnBrk="1" fontAlgn="auto" latinLnBrk="0" hangingPunct="1">
+                  <a:lnSpc>
+                    <a:spcPct val="100000"/>
+                  </a:lnSpc>
+                  <a:spcBef>
+                    <a:spcPts val="0"/>
+                  </a:spcBef>
+                  <a:spcAft>
+                    <a:spcPts val="0"/>
+                  </a:spcAft>
+                  <a:buClrTx/>
+                  <a:buSzTx/>
+                  <a:buFontTx/>
+                  <a:buNone/>
+                  <a:tabLst/>
+                  <a:defRPr/>
+                </a:pPr>
+                <a:r>
+                  <a:rPr lang="en-US" dirty="0" smtClean="0"/>
+                  <a:t>Fix </a:t>
+                </a:r>
+                <a14:m>
+                  <m:oMath xmlns:m="http://schemas.openxmlformats.org/officeDocument/2006/math">
+                    <m:sSub>
+                      <m:sSubPr>
+                        <m:ctrlPr>
+                          <a:rPr lang="en-US" b="0" i="1" smtClean="0">
+                            <a:latin typeface="Cambria Math" charset="0"/>
+                          </a:rPr>
+                        </m:ctrlPr>
+                      </m:sSubPr>
+                      <m:e>
+                        <m:r>
+                          <a:rPr lang="en-US" b="0" i="1" smtClean="0">
+                            <a:latin typeface="Cambria Math" charset="0"/>
+                          </a:rPr>
+                          <m:t>𝑃𝑒𝑟𝑝</m:t>
+                        </m:r>
+                        <m:r>
+                          <a:rPr lang="en-US" b="0" i="1" smtClean="0">
+                            <a:latin typeface="Cambria Math" charset="0"/>
+                          </a:rPr>
+                          <m:t>(</m:t>
+                        </m:r>
+                        <m:r>
+                          <a:rPr lang="en-US" b="0" i="1" smtClean="0">
+                            <a:latin typeface="Cambria Math" charset="0"/>
+                          </a:rPr>
+                          <m:t>𝑃</m:t>
+                        </m:r>
+                      </m:e>
+                      <m:sub>
+                        <m:r>
+                          <a:rPr lang="en-US" b="0" i="1" smtClean="0">
+                            <a:latin typeface="Cambria Math" charset="0"/>
+                          </a:rPr>
+                          <m:t>𝑖</m:t>
+                        </m:r>
+                      </m:sub>
+                    </m:sSub>
+                    <m:r>
+                      <a:rPr lang="en-US" b="0" i="1" smtClean="0">
+                        <a:latin typeface="Cambria Math" charset="0"/>
+                      </a:rPr>
+                      <m:t>)</m:t>
+                    </m:r>
+                    <m:r>
+                      <a:rPr lang="en-US" b="0" i="0" smtClean="0">
+                        <a:latin typeface="Cambria Math" charset="0"/>
+                      </a:rPr>
+                      <m:t>. </m:t>
+                    </m:r>
+                  </m:oMath>
+                </a14:m>
+                <a:r>
+                  <a:rPr lang="en-US" dirty="0" smtClean="0"/>
+                  <a:t>Choose </a:t>
+                </a:r>
+                <a14:m>
+                  <m:oMath xmlns:m="http://schemas.openxmlformats.org/officeDocument/2006/math">
+                    <m:sSub>
+                      <m:sSubPr>
+                        <m:ctrlPr>
+                          <a:rPr lang="en-US" b="0" i="1" smtClean="0">
+                            <a:latin typeface="Cambria Math" charset="0"/>
+                          </a:rPr>
+                        </m:ctrlPr>
+                      </m:sSubPr>
+                      <m:e>
+                        <m:r>
+                          <a:rPr lang="en-US" b="0" i="1" smtClean="0">
+                            <a:latin typeface="Cambria Math" charset="0"/>
+                          </a:rPr>
+                          <m:t>𝜎</m:t>
+                        </m:r>
+                      </m:e>
+                      <m:sub>
+                        <m:r>
+                          <a:rPr lang="en-US" b="0" i="1" smtClean="0">
+                            <a:latin typeface="Cambria Math" charset="0"/>
+                          </a:rPr>
+                          <m:t>𝑖</m:t>
+                        </m:r>
+                      </m:sub>
+                    </m:sSub>
+                  </m:oMath>
+                </a14:m>
+                <a:r>
+                  <a:rPr lang="en-US" dirty="0" smtClean="0"/>
+                  <a:t> such that:</a:t>
+                </a:r>
+              </a:p>
+              <a:p>
+                <a:pPr marL="0" marR="0" lvl="0" indent="0" defTabSz="914400" eaLnBrk="1" fontAlgn="auto" latinLnBrk="0" hangingPunct="1">
+                  <a:lnSpc>
+                    <a:spcPct val="100000"/>
+                  </a:lnSpc>
+                  <a:spcBef>
+                    <a:spcPts val="0"/>
+                  </a:spcBef>
+                  <a:spcAft>
+                    <a:spcPts val="0"/>
+                  </a:spcAft>
+                  <a:buClrTx/>
+                  <a:buSzTx/>
+                  <a:buFontTx/>
+                  <a:buNone/>
+                  <a:tabLst/>
+                  <a:defRPr/>
+                </a:pPr>
+                <a:endParaRPr lang="en-US" dirty="0" smtClean="0"/>
+              </a:p>
+              <a:p>
+                <a:pPr marL="0" marR="0" lvl="0" indent="0" defTabSz="914400" eaLnBrk="1" fontAlgn="auto" latinLnBrk="0" hangingPunct="1">
+                  <a:lnSpc>
+                    <a:spcPct val="100000"/>
+                  </a:lnSpc>
+                  <a:spcBef>
+                    <a:spcPts val="0"/>
+                  </a:spcBef>
+                  <a:spcAft>
+                    <a:spcPts val="0"/>
+                  </a:spcAft>
+                  <a:buClrTx/>
+                  <a:buSzTx/>
+                  <a:buFontTx/>
+                  <a:buNone/>
+                  <a:tabLst/>
+                  <a:defRPr/>
+                </a:pPr>
+                <a:r>
+                  <a:rPr lang="en-US" b="0" dirty="0"/>
+                  <a:t>	</a:t>
+                </a:r>
+                <a:endParaRPr lang="en-US" b="0" dirty="0" smtClean="0"/>
+              </a:p>
+              <a:p>
+                <a:pPr marL="0" marR="0" lvl="0" indent="0" defTabSz="914400" eaLnBrk="1" fontAlgn="auto" latinLnBrk="0" hangingPunct="1">
+                  <a:lnSpc>
+                    <a:spcPct val="100000"/>
+                  </a:lnSpc>
+                  <a:spcBef>
+                    <a:spcPts val="0"/>
+                  </a:spcBef>
+                  <a:spcAft>
+                    <a:spcPts val="0"/>
+                  </a:spcAft>
+                  <a:buClrTx/>
+                  <a:buSzTx/>
+                  <a:buFontTx/>
+                  <a:buNone/>
+                  <a:tabLst/>
+                  <a:defRPr/>
+                </a:pPr>
+                <a:r>
+                  <a:rPr lang="en-US" dirty="0"/>
+                  <a:t>	</a:t>
+                </a:r>
+                <a:r>
+                  <a:rPr lang="en-US" dirty="0" smtClean="0"/>
+                  <a:t>	</a:t>
+                </a:r>
+                <a14:m>
+                  <m:oMath xmlns:m="http://schemas.openxmlformats.org/officeDocument/2006/math">
+                    <m:r>
+                      <a:rPr lang="en-US" b="0" i="1" smtClean="0">
+                        <a:latin typeface="Cambria Math" charset="0"/>
+                      </a:rPr>
+                      <m:t>𝑃𝑒𝑟𝑝</m:t>
+                    </m:r>
+                    <m:d>
+                      <m:dPr>
+                        <m:ctrlPr>
+                          <a:rPr lang="en-US" b="0" i="1" smtClean="0">
+                            <a:latin typeface="Cambria Math" charset="0"/>
+                          </a:rPr>
+                        </m:ctrlPr>
+                      </m:dPr>
+                      <m:e>
+                        <m:sSub>
+                          <m:sSubPr>
+                            <m:ctrlPr>
+                              <a:rPr lang="en-US" b="0" i="1" smtClean="0">
+                                <a:latin typeface="Cambria Math" charset="0"/>
+                              </a:rPr>
+                            </m:ctrlPr>
+                          </m:sSubPr>
+                          <m:e>
+                            <m:r>
+                              <a:rPr lang="en-US" b="0" i="1" smtClean="0">
+                                <a:latin typeface="Cambria Math" charset="0"/>
+                              </a:rPr>
+                              <m:t>𝑃</m:t>
+                            </m:r>
+                          </m:e>
+                          <m:sub>
+                            <m:r>
+                              <a:rPr lang="en-US" b="0" i="1" smtClean="0">
+                                <a:latin typeface="Cambria Math" charset="0"/>
+                              </a:rPr>
+                              <m:t>𝑖</m:t>
+                            </m:r>
+                          </m:sub>
+                        </m:sSub>
+                      </m:e>
+                    </m:d>
+                    <m:r>
+                      <a:rPr lang="en-US" b="0" i="1" smtClean="0">
+                        <a:latin typeface="Cambria Math" charset="0"/>
+                      </a:rPr>
+                      <m:t>=</m:t>
+                    </m:r>
+                    <m:sSup>
+                      <m:sSupPr>
+                        <m:ctrlPr>
+                          <a:rPr lang="en-US" b="0" i="1" smtClean="0">
+                            <a:latin typeface="Cambria Math" charset="0"/>
+                          </a:rPr>
+                        </m:ctrlPr>
+                      </m:sSupPr>
+                      <m:e>
+                        <m:r>
+                          <a:rPr lang="en-US" b="0" i="1" smtClean="0">
+                            <a:latin typeface="Cambria Math" charset="0"/>
+                          </a:rPr>
+                          <m:t>2</m:t>
+                        </m:r>
+                      </m:e>
+                      <m:sup>
+                        <m:r>
+                          <a:rPr lang="en-US" i="1">
+                            <a:latin typeface="Cambria Math" charset="0"/>
+                          </a:rPr>
+                          <m:t>𝐻</m:t>
+                        </m:r>
+                        <m:d>
+                          <m:dPr>
+                            <m:ctrlPr>
+                              <a:rPr lang="en-US" i="1">
+                                <a:latin typeface="Cambria Math" charset="0"/>
+                              </a:rPr>
+                            </m:ctrlPr>
+                          </m:dPr>
+                          <m:e>
+                            <m:sSub>
+                              <m:sSubPr>
+                                <m:ctrlPr>
+                                  <a:rPr lang="en-US" i="1">
+                                    <a:latin typeface="Cambria Math" charset="0"/>
+                                  </a:rPr>
+                                </m:ctrlPr>
+                              </m:sSubPr>
+                              <m:e>
+                                <m:r>
+                                  <a:rPr lang="en-US" i="1">
+                                    <a:latin typeface="Cambria Math" charset="0"/>
+                                  </a:rPr>
+                                  <m:t>𝑃</m:t>
+                                </m:r>
+                              </m:e>
+                              <m:sub>
+                                <m:r>
+                                  <a:rPr lang="en-US" i="1">
+                                    <a:latin typeface="Cambria Math" charset="0"/>
+                                  </a:rPr>
+                                  <m:t>𝑖</m:t>
+                                </m:r>
+                              </m:sub>
+                            </m:sSub>
+                          </m:e>
+                        </m:d>
+                      </m:sup>
+                    </m:sSup>
+                  </m:oMath>
+                </a14:m>
+                <a:r>
+                  <a:rPr lang="en-US" dirty="0" smtClean="0"/>
+                  <a:t>		</a:t>
+                </a:r>
+                <a14:m>
+                  <m:oMath xmlns:m="http://schemas.openxmlformats.org/officeDocument/2006/math">
+                    <m:r>
+                      <a:rPr lang="en-US" b="0" i="1" smtClean="0">
+                        <a:latin typeface="Cambria Math" charset="0"/>
+                      </a:rPr>
+                      <m:t>𝐻</m:t>
+                    </m:r>
+                    <m:d>
+                      <m:dPr>
+                        <m:ctrlPr>
+                          <a:rPr lang="en-US" b="0" i="1" smtClean="0">
+                            <a:latin typeface="Cambria Math" charset="0"/>
+                          </a:rPr>
+                        </m:ctrlPr>
+                      </m:dPr>
+                      <m:e>
+                        <m:sSub>
+                          <m:sSubPr>
+                            <m:ctrlPr>
+                              <a:rPr lang="en-US" b="0" i="1" smtClean="0">
+                                <a:latin typeface="Cambria Math" charset="0"/>
+                              </a:rPr>
+                            </m:ctrlPr>
+                          </m:sSubPr>
+                          <m:e>
+                            <m:r>
+                              <a:rPr lang="en-US" b="0" i="1" smtClean="0">
+                                <a:latin typeface="Cambria Math" charset="0"/>
+                              </a:rPr>
+                              <m:t>𝑃</m:t>
+                            </m:r>
+                          </m:e>
+                          <m:sub>
+                            <m:r>
+                              <a:rPr lang="en-US" b="0" i="1" smtClean="0">
+                                <a:latin typeface="Cambria Math" charset="0"/>
+                              </a:rPr>
+                              <m:t>𝑖</m:t>
+                            </m:r>
+                          </m:sub>
+                        </m:sSub>
+                      </m:e>
+                    </m:d>
+                    <m:r>
+                      <a:rPr lang="en-US" b="0" i="1" smtClean="0">
+                        <a:latin typeface="Cambria Math" charset="0"/>
+                      </a:rPr>
+                      <m:t>=−</m:t>
+                    </m:r>
+                    <m:nary>
+                      <m:naryPr>
+                        <m:chr m:val="∑"/>
+                        <m:supHide m:val="on"/>
+                        <m:ctrlPr>
+                          <a:rPr lang="en-US" b="0" i="1" smtClean="0">
+                            <a:latin typeface="Cambria Math" charset="0"/>
+                          </a:rPr>
+                        </m:ctrlPr>
+                      </m:naryPr>
+                      <m:sub>
+                        <m:r>
+                          <m:rPr>
+                            <m:brk m:alnAt="7"/>
+                          </m:rPr>
+                          <a:rPr lang="en-US" b="0" i="1" smtClean="0">
+                            <a:latin typeface="Cambria Math" charset="0"/>
+                          </a:rPr>
+                          <m:t>𝑗</m:t>
+                        </m:r>
+                      </m:sub>
+                      <m:sup/>
+                      <m:e>
+                        <m:sSub>
+                          <m:sSubPr>
+                            <m:ctrlPr>
+                              <a:rPr lang="en-US" b="0" i="1" smtClean="0">
+                                <a:latin typeface="Cambria Math" charset="0"/>
+                              </a:rPr>
+                            </m:ctrlPr>
+                          </m:sSubPr>
+                          <m:e>
+                            <m:r>
+                              <a:rPr lang="en-US" b="0" i="1" smtClean="0">
+                                <a:latin typeface="Cambria Math" charset="0"/>
+                              </a:rPr>
+                              <m:t>𝑝</m:t>
+                            </m:r>
+                          </m:e>
+                          <m:sub>
+                            <m:r>
+                              <a:rPr lang="en-US" b="0" i="1" smtClean="0">
+                                <a:latin typeface="Cambria Math" charset="0"/>
+                              </a:rPr>
+                              <m:t>𝑗</m:t>
+                            </m:r>
+                            <m:r>
+                              <a:rPr lang="en-US" b="0" i="1" smtClean="0">
+                                <a:latin typeface="Cambria Math" charset="0"/>
+                              </a:rPr>
+                              <m:t>|</m:t>
+                            </m:r>
+                            <m:r>
+                              <a:rPr lang="en-US" b="0" i="1" smtClean="0">
+                                <a:latin typeface="Cambria Math" charset="0"/>
+                              </a:rPr>
+                              <m:t>𝑖</m:t>
+                            </m:r>
+                          </m:sub>
+                        </m:sSub>
+                        <m:func>
+                          <m:funcPr>
+                            <m:ctrlPr>
+                              <a:rPr lang="en-US" b="0" i="1" smtClean="0">
+                                <a:latin typeface="Cambria Math" charset="0"/>
+                              </a:rPr>
+                            </m:ctrlPr>
+                          </m:funcPr>
+                          <m:fName>
+                            <m:sSub>
+                              <m:sSubPr>
+                                <m:ctrlPr>
+                                  <a:rPr lang="en-US" b="0" i="1" smtClean="0">
+                                    <a:latin typeface="Cambria Math" charset="0"/>
+                                  </a:rPr>
+                                </m:ctrlPr>
+                              </m:sSubPr>
+                              <m:e>
+                                <m:r>
+                                  <m:rPr>
+                                    <m:sty m:val="p"/>
+                                  </m:rPr>
+                                  <a:rPr lang="en-US" b="0" i="0" smtClean="0">
+                                    <a:latin typeface="Cambria Math" charset="0"/>
+                                  </a:rPr>
+                                  <m:t>log</m:t>
+                                </m:r>
+                              </m:e>
+                              <m:sub>
+                                <m:r>
+                                  <a:rPr lang="en-US" b="0" i="1" smtClean="0">
+                                    <a:latin typeface="Cambria Math" charset="0"/>
+                                  </a:rPr>
+                                  <m:t>2</m:t>
+                                </m:r>
+                              </m:sub>
+                            </m:sSub>
+                          </m:fName>
+                          <m:e>
+                            <m:sSub>
+                              <m:sSubPr>
+                                <m:ctrlPr>
+                                  <a:rPr lang="en-US" b="0" i="1" smtClean="0">
+                                    <a:latin typeface="Cambria Math" charset="0"/>
+                                  </a:rPr>
+                                </m:ctrlPr>
+                              </m:sSubPr>
+                              <m:e>
+                                <m:r>
+                                  <a:rPr lang="en-US" b="0" i="1" smtClean="0">
+                                    <a:latin typeface="Cambria Math" charset="0"/>
+                                  </a:rPr>
+                                  <m:t>𝑝</m:t>
+                                </m:r>
+                              </m:e>
+                              <m:sub>
+                                <m:r>
+                                  <a:rPr lang="en-US" b="0" i="1" smtClean="0">
+                                    <a:latin typeface="Cambria Math" charset="0"/>
+                                  </a:rPr>
+                                  <m:t>𝑗</m:t>
+                                </m:r>
+                                <m:r>
+                                  <a:rPr lang="en-US" b="0" i="1" smtClean="0">
+                                    <a:latin typeface="Cambria Math" charset="0"/>
+                                  </a:rPr>
+                                  <m:t>|</m:t>
+                                </m:r>
+                                <m:r>
+                                  <a:rPr lang="en-US" b="0" i="1" smtClean="0">
+                                    <a:latin typeface="Cambria Math" charset="0"/>
+                                  </a:rPr>
+                                  <m:t>𝑖</m:t>
+                                </m:r>
+                              </m:sub>
+                            </m:sSub>
+                          </m:e>
+                        </m:func>
+                      </m:e>
+                    </m:nary>
+                  </m:oMath>
+                </a14:m>
+                <a:endParaRPr lang="en-US" b="0" i="1" dirty="0" smtClean="0">
+                  <a:latin typeface="Cambria Math" charset="0"/>
+                </a:endParaRPr>
+              </a:p>
+              <a:p>
+                <a:pPr marL="0" marR="0" lvl="0" indent="0" defTabSz="914400" eaLnBrk="1" fontAlgn="auto" latinLnBrk="0" hangingPunct="1">
+                  <a:lnSpc>
+                    <a:spcPct val="100000"/>
+                  </a:lnSpc>
+                  <a:spcBef>
+                    <a:spcPts val="0"/>
+                  </a:spcBef>
+                  <a:spcAft>
+                    <a:spcPts val="0"/>
+                  </a:spcAft>
+                  <a:buClrTx/>
+                  <a:buSzTx/>
+                  <a:buFontTx/>
+                  <a:buNone/>
+                  <a:tabLst/>
+                  <a:defRPr/>
+                </a:pPr>
+                <a:endParaRPr lang="en-US" b="0" i="1" dirty="0" smtClean="0">
+                  <a:latin typeface="Cambria Math" charset="0"/>
+                </a:endParaRPr>
+              </a:p>
+              <a:p>
+                <a:pPr marL="0" marR="0" lvl="0" indent="0" defTabSz="914400" eaLnBrk="1" fontAlgn="auto" latinLnBrk="0" hangingPunct="1">
+                  <a:lnSpc>
+                    <a:spcPct val="100000"/>
+                  </a:lnSpc>
+                  <a:spcBef>
+                    <a:spcPts val="0"/>
+                  </a:spcBef>
+                  <a:spcAft>
+                    <a:spcPts val="0"/>
+                  </a:spcAft>
+                  <a:buClrTx/>
+                  <a:buSzTx/>
+                  <a:buFontTx/>
+                  <a:buNone/>
+                  <a:tabLst/>
+                  <a:defRPr/>
+                </a:pPr>
+                <a:endParaRPr lang="en-US" b="0" i="1" dirty="0" smtClean="0">
+                  <a:latin typeface="Cambria Math" charset="0"/>
+                </a:endParaRPr>
+              </a:p>
+              <a:p>
+                <a:pPr marL="0" marR="0" lvl="0" indent="0" defTabSz="914400" eaLnBrk="1" fontAlgn="auto" latinLnBrk="0" hangingPunct="1">
+                  <a:lnSpc>
+                    <a:spcPct val="100000"/>
+                  </a:lnSpc>
+                  <a:spcBef>
+                    <a:spcPts val="0"/>
+                  </a:spcBef>
+                  <a:spcAft>
+                    <a:spcPts val="0"/>
+                  </a:spcAft>
+                  <a:buClrTx/>
+                  <a:buSzTx/>
+                  <a:buFontTx/>
+                  <a:buNone/>
+                  <a:tabLst/>
+                  <a:defRPr/>
+                </a:pPr>
+                <a:r>
+                  <a:rPr lang="en-US" b="0" dirty="0" smtClean="0"/>
+                  <a:t>Note that the entropy, </a:t>
+                </a:r>
+                <a14:m>
+                  <m:oMath xmlns:m="http://schemas.openxmlformats.org/officeDocument/2006/math">
+                    <m:r>
+                      <a:rPr lang="en-US" b="0" i="1" smtClean="0">
+                        <a:latin typeface="Cambria Math" charset="0"/>
+                      </a:rPr>
+                      <m:t>𝐻</m:t>
+                    </m:r>
+                    <m:d>
+                      <m:dPr>
+                        <m:ctrlPr>
+                          <a:rPr lang="en-US" b="0" i="1" smtClean="0">
+                            <a:latin typeface="Cambria Math" charset="0"/>
+                          </a:rPr>
+                        </m:ctrlPr>
+                      </m:dPr>
+                      <m:e>
+                        <m:sSub>
+                          <m:sSubPr>
+                            <m:ctrlPr>
+                              <a:rPr lang="en-US" b="0" i="1" smtClean="0">
+                                <a:latin typeface="Cambria Math" charset="0"/>
+                              </a:rPr>
+                            </m:ctrlPr>
+                          </m:sSubPr>
+                          <m:e>
+                            <m:r>
+                              <a:rPr lang="en-US" b="0" i="1" smtClean="0">
+                                <a:latin typeface="Cambria Math" charset="0"/>
+                              </a:rPr>
+                              <m:t>𝑃</m:t>
+                            </m:r>
+                          </m:e>
+                          <m:sub>
+                            <m:r>
+                              <a:rPr lang="en-US" b="0" i="1" smtClean="0">
+                                <a:latin typeface="Cambria Math" charset="0"/>
+                              </a:rPr>
+                              <m:t>𝑖</m:t>
+                            </m:r>
+                          </m:sub>
+                        </m:sSub>
+                      </m:e>
+                    </m:d>
+                  </m:oMath>
+                </a14:m>
+                <a:r>
+                  <a:rPr lang="en-US" dirty="0" smtClean="0"/>
+                  <a:t> is proportional to </a:t>
+                </a:r>
+                <a14:m>
+                  <m:oMath xmlns:m="http://schemas.openxmlformats.org/officeDocument/2006/math">
+                    <m:sSub>
+                      <m:sSubPr>
+                        <m:ctrlPr>
+                          <a:rPr lang="en-US" b="0" i="1" smtClean="0">
+                            <a:latin typeface="Cambria Math" charset="0"/>
+                          </a:rPr>
+                        </m:ctrlPr>
+                      </m:sSubPr>
+                      <m:e>
+                        <m:r>
+                          <a:rPr lang="en-US" b="0" i="1" smtClean="0">
+                            <a:latin typeface="Cambria Math" charset="0"/>
+                          </a:rPr>
+                          <m:t>𝜎</m:t>
+                        </m:r>
+                      </m:e>
+                      <m:sub>
+                        <m:r>
+                          <a:rPr lang="en-US" b="0" i="1" smtClean="0">
+                            <a:latin typeface="Cambria Math" charset="0"/>
+                          </a:rPr>
+                          <m:t>𝑖</m:t>
+                        </m:r>
+                      </m:sub>
+                    </m:sSub>
+                  </m:oMath>
+                </a14:m>
+                <a:endParaRPr lang="en-US" dirty="0" smtClean="0"/>
+              </a:p>
+              <a:p>
+                <a:pPr marL="0" marR="0" lvl="0" indent="0" defTabSz="914400" eaLnBrk="1" fontAlgn="auto" latinLnBrk="0" hangingPunct="1">
+                  <a:lnSpc>
+                    <a:spcPct val="100000"/>
+                  </a:lnSpc>
+                  <a:spcBef>
+                    <a:spcPts val="0"/>
+                  </a:spcBef>
+                  <a:spcAft>
+                    <a:spcPts val="0"/>
+                  </a:spcAft>
+                  <a:buClrTx/>
+                  <a:buSzTx/>
+                  <a:buFontTx/>
+                  <a:buNone/>
+                  <a:tabLst/>
+                  <a:defRPr/>
+                </a:pPr>
+                <a:endParaRPr lang="en-US" dirty="0"/>
+              </a:p>
+              <a:p>
+                <a:pPr marL="0" marR="0" lvl="0" indent="0" defTabSz="914400" eaLnBrk="1" fontAlgn="auto" latinLnBrk="0" hangingPunct="1">
+                  <a:lnSpc>
+                    <a:spcPct val="100000"/>
+                  </a:lnSpc>
+                  <a:spcBef>
+                    <a:spcPts val="0"/>
+                  </a:spcBef>
+                  <a:spcAft>
+                    <a:spcPts val="0"/>
+                  </a:spcAft>
+                  <a:buClrTx/>
+                  <a:buSzTx/>
+                  <a:buFontTx/>
+                  <a:buNone/>
+                  <a:tabLst/>
+                  <a:defRPr/>
+                </a:pPr>
+                <a:endParaRPr lang="en-US" dirty="0" smtClean="0"/>
+              </a:p>
+              <a:p>
+                <a:pPr marL="0" marR="0" lvl="0" indent="0" defTabSz="914400" eaLnBrk="1" fontAlgn="auto" latinLnBrk="0" hangingPunct="1">
+                  <a:lnSpc>
+                    <a:spcPct val="100000"/>
+                  </a:lnSpc>
+                  <a:spcBef>
+                    <a:spcPts val="0"/>
+                  </a:spcBef>
+                  <a:spcAft>
+                    <a:spcPts val="0"/>
+                  </a:spcAft>
+                  <a:buClrTx/>
+                  <a:buSzTx/>
+                  <a:buFontTx/>
+                  <a:buNone/>
+                  <a:tabLst/>
+                  <a:defRPr/>
+                </a:pPr>
+                <a:r>
+                  <a:rPr lang="en-US" dirty="0" smtClean="0"/>
+                  <a:t>Define </a:t>
+                </a:r>
+                <a14:m>
+                  <m:oMath xmlns:m="http://schemas.openxmlformats.org/officeDocument/2006/math">
+                    <m:sSub>
+                      <m:sSubPr>
+                        <m:ctrlPr>
+                          <a:rPr lang="en-US" b="0" i="1" smtClean="0">
+                            <a:latin typeface="Cambria Math" charset="0"/>
+                          </a:rPr>
+                        </m:ctrlPr>
+                      </m:sSubPr>
+                      <m:e>
+                        <m:r>
+                          <a:rPr lang="en-US" b="0" i="1" smtClean="0">
+                            <a:latin typeface="Cambria Math" charset="0"/>
+                          </a:rPr>
+                          <m:t>𝑝</m:t>
+                        </m:r>
+                      </m:e>
+                      <m:sub>
+                        <m:r>
+                          <a:rPr lang="en-US" b="0" i="1" smtClean="0">
+                            <a:latin typeface="Cambria Math" charset="0"/>
+                          </a:rPr>
+                          <m:t>𝑖𝑗</m:t>
+                        </m:r>
+                      </m:sub>
+                    </m:sSub>
+                    <m:r>
+                      <a:rPr lang="en-US" b="0" i="1" smtClean="0">
+                        <a:latin typeface="Cambria Math" charset="0"/>
+                      </a:rPr>
+                      <m:t>= </m:t>
+                    </m:r>
+                    <m:f>
+                      <m:fPr>
+                        <m:ctrlPr>
+                          <a:rPr lang="mr-IN" b="0" i="1" smtClean="0">
+                            <a:latin typeface="Cambria Math" charset="0"/>
+                          </a:rPr>
+                        </m:ctrlPr>
+                      </m:fPr>
+                      <m:num>
+                        <m:sSub>
+                          <m:sSubPr>
+                            <m:ctrlPr>
+                              <a:rPr lang="en-US" b="0" i="1" smtClean="0">
+                                <a:latin typeface="Cambria Math" charset="0"/>
+                              </a:rPr>
+                            </m:ctrlPr>
+                          </m:sSubPr>
+                          <m:e>
+                            <m:r>
+                              <a:rPr lang="en-US" b="0" i="1" smtClean="0">
+                                <a:latin typeface="Cambria Math" charset="0"/>
+                              </a:rPr>
+                              <m:t>𝑝</m:t>
+                            </m:r>
+                          </m:e>
+                          <m:sub>
+                            <m:r>
+                              <a:rPr lang="en-US" b="0" i="1" smtClean="0">
+                                <a:latin typeface="Cambria Math" charset="0"/>
+                              </a:rPr>
+                              <m:t>𝑖</m:t>
+                            </m:r>
+                            <m:r>
+                              <a:rPr lang="en-US" b="0" i="1" smtClean="0">
+                                <a:latin typeface="Cambria Math" charset="0"/>
+                              </a:rPr>
+                              <m:t>|</m:t>
+                            </m:r>
+                            <m:r>
+                              <a:rPr lang="en-US" b="0" i="1" smtClean="0">
+                                <a:latin typeface="Cambria Math" charset="0"/>
+                              </a:rPr>
+                              <m:t>𝑗</m:t>
+                            </m:r>
+                          </m:sub>
+                        </m:sSub>
+                        <m:r>
+                          <a:rPr lang="en-US" b="0" i="1" smtClean="0">
+                            <a:latin typeface="Cambria Math" charset="0"/>
+                          </a:rPr>
+                          <m:t>+</m:t>
+                        </m:r>
+                        <m:sSub>
+                          <m:sSubPr>
+                            <m:ctrlPr>
+                              <a:rPr lang="en-US" b="0" i="1" smtClean="0">
+                                <a:latin typeface="Cambria Math" charset="0"/>
+                              </a:rPr>
+                            </m:ctrlPr>
+                          </m:sSubPr>
+                          <m:e>
+                            <m:r>
+                              <a:rPr lang="en-US" b="0" i="1" smtClean="0">
+                                <a:latin typeface="Cambria Math" charset="0"/>
+                              </a:rPr>
+                              <m:t>𝑝</m:t>
+                            </m:r>
+                          </m:e>
+                          <m:sub>
+                            <m:r>
+                              <a:rPr lang="en-US" b="0" i="1" smtClean="0">
+                                <a:latin typeface="Cambria Math" charset="0"/>
+                              </a:rPr>
+                              <m:t>𝑗</m:t>
+                            </m:r>
+                            <m:r>
+                              <a:rPr lang="en-US" b="0" i="1" smtClean="0">
+                                <a:latin typeface="Cambria Math" charset="0"/>
+                              </a:rPr>
+                              <m:t>|</m:t>
+                            </m:r>
+                            <m:r>
+                              <a:rPr lang="en-US" b="0" i="1" smtClean="0">
+                                <a:latin typeface="Cambria Math" charset="0"/>
+                              </a:rPr>
+                              <m:t>𝑖</m:t>
+                            </m:r>
+                          </m:sub>
+                        </m:sSub>
+                      </m:num>
+                      <m:den>
+                        <m:r>
+                          <a:rPr lang="en-US" b="0" i="1" smtClean="0">
+                            <a:latin typeface="Cambria Math" charset="0"/>
+                          </a:rPr>
+                          <m:t>2</m:t>
+                        </m:r>
+                      </m:den>
+                    </m:f>
+                  </m:oMath>
+                </a14:m>
+                <a:endParaRPr lang="en-US" dirty="0" smtClean="0"/>
+              </a:p>
+            </p:txBody>
+          </p:sp>
+        </mc:Choice>
+        <mc:Fallback>
+          <p:sp>
+            <p:nvSpPr>
+              <p:cNvPr id="3" name="Content Placeholder 2"/>
+              <p:cNvSpPr>
+                <a:spLocks noGrp="1" noRot="1" noChangeAspect="1" noMove="1" noResize="1" noEditPoints="1" noAdjustHandles="1" noChangeArrowheads="1" noChangeShapeType="1" noTextEdit="1"/>
+              </p:cNvSpPr>
+              <p:nvPr>
+                <p:ph idx="1"/>
+              </p:nvPr>
+            </p:nvSpPr>
+            <p:spPr>
+              <a:xfrm>
+                <a:off x="838200" y="1690688"/>
+                <a:ext cx="10515600" cy="4351338"/>
+              </a:xfrm>
+              <a:blipFill rotWithShape="0">
+                <a:blip r:embed="rId4"/>
+                <a:stretch>
+                  <a:fillRect l="-754" t="-1261"/>
+                </a:stretch>
+              </a:blipFill>
+            </p:spPr>
+            <p:txBody>
+              <a:bodyPr/>
+              <a:lstStyle/>
+              <a:p>
+                <a:r>
+                  <a:rPr lang="en-US">
+                    <a:noFill/>
+                  </a:rPr>
+                  <a:t> </a:t>
+                </a:r>
+              </a:p>
+            </p:txBody>
+          </p:sp>
+        </mc:Fallback>
+      </mc:AlternateContent>
     </p:spTree>
     <p:extLst>
       <p:ext uri="{BB962C8B-B14F-4D97-AF65-F5344CB8AC3E}">
@@ -5377,57 +7266,730 @@
           <a:chExt cx="0" cy="0"/>
         </a:xfrm>
       </p:grpSpPr>
-      <p:sp>
-        <p:nvSpPr>
-          <p:cNvPr id="2" name="Title 1"/>
-          <p:cNvSpPr>
-            <a:spLocks noGrp="1"/>
-          </p:cNvSpPr>
-          <p:nvPr>
-            <p:ph type="title"/>
-          </p:nvPr>
-        </p:nvSpPr>
-        <p:spPr/>
-        <p:txBody>
-          <a:bodyPr/>
+      <mc:AlternateContent xmlns:mc="http://schemas.openxmlformats.org/markup-compatibility/2006">
+        <mc:Choice xmlns:a14="http://schemas.microsoft.com/office/drawing/2010/main" Requires="a14">
+          <p:sp>
+            <p:nvSpPr>
+              <p:cNvPr id="2" name="Title 1"/>
+              <p:cNvSpPr>
+                <a:spLocks noGrp="1"/>
+              </p:cNvSpPr>
+              <p:nvPr>
+                <p:ph type="title"/>
+              </p:nvPr>
+            </p:nvSpPr>
+            <p:spPr/>
+            <p:txBody>
+              <a:bodyPr/>
+              <a:lstStyle/>
+              <a:p>
+                <a:r>
+                  <a:rPr lang="en-US" dirty="0" smtClean="0"/>
+                  <a:t>Similarity in </a:t>
+                </a:r>
+                <a14:m>
+                  <m:oMath xmlns:m="http://schemas.openxmlformats.org/officeDocument/2006/math">
+                    <m:sSup>
+                      <m:sSupPr>
+                        <m:ctrlPr>
+                          <a:rPr lang="en-US" b="0" i="1" smtClean="0">
+                            <a:latin typeface="Cambria Math" charset="0"/>
+                          </a:rPr>
+                        </m:ctrlPr>
+                      </m:sSupPr>
+                      <m:e>
+                        <m:r>
+                          <a:rPr lang="en-US" b="0" i="1" smtClean="0">
+                            <a:latin typeface="Cambria Math" charset="0"/>
+                          </a:rPr>
+                          <m:t>ℝ</m:t>
+                        </m:r>
+                      </m:e>
+                      <m:sup>
+                        <m:r>
+                          <a:rPr lang="en-US" b="0" i="1" smtClean="0">
+                            <a:latin typeface="Cambria Math" charset="0"/>
+                          </a:rPr>
+                          <m:t>𝑑</m:t>
+                        </m:r>
+                      </m:sup>
+                    </m:sSup>
+                  </m:oMath>
+                </a14:m>
+                <a:endParaRPr lang="en-US" dirty="0"/>
+              </a:p>
+            </p:txBody>
+          </p:sp>
+        </mc:Choice>
+        <mc:Fallback>
+          <p:sp>
+            <p:nvSpPr>
+              <p:cNvPr id="2" name="Title 1"/>
+              <p:cNvSpPr>
+                <a:spLocks noGrp="1" noRot="1" noChangeAspect="1" noMove="1" noResize="1" noEditPoints="1" noAdjustHandles="1" noChangeArrowheads="1" noChangeShapeType="1" noTextEdit="1"/>
+              </p:cNvSpPr>
+              <p:nvPr>
+                <p:ph type="title"/>
+              </p:nvPr>
+            </p:nvSpPr>
+            <p:spPr>
+              <a:blipFill rotWithShape="0">
+                <a:blip r:embed="rId3"/>
+                <a:stretch>
+                  <a:fillRect l="-2377"/>
+                </a:stretch>
+              </a:blipFill>
+            </p:spPr>
+            <p:txBody>
+              <a:bodyPr/>
+              <a:lstStyle/>
+              <a:p>
+                <a:r>
+                  <a:rPr lang="en-US">
+                    <a:noFill/>
+                  </a:rPr>
+                  <a:t> </a:t>
+                </a:r>
+              </a:p>
+            </p:txBody>
+          </p:sp>
+        </mc:Fallback>
+      </mc:AlternateContent>
+      <mc:AlternateContent xmlns:mc="http://schemas.openxmlformats.org/markup-compatibility/2006">
+        <mc:Choice xmlns:a14="http://schemas.microsoft.com/office/drawing/2010/main" Requires="a14">
+          <p:sp>
+            <p:nvSpPr>
+              <p:cNvPr id="8" name="Content Placeholder 7"/>
+              <p:cNvSpPr>
+                <a:spLocks noGrp="1"/>
+              </p:cNvSpPr>
+              <p:nvPr>
+                <p:ph sz="half" idx="1"/>
+              </p:nvPr>
+            </p:nvSpPr>
+            <p:spPr/>
+            <p:txBody>
+              <a:bodyPr/>
+              <a:lstStyle/>
+              <a:p>
+                <a:pPr marL="0" lvl="0" indent="0">
+                  <a:lnSpc>
+                    <a:spcPct val="100000"/>
+                  </a:lnSpc>
+                  <a:spcBef>
+                    <a:spcPts val="0"/>
+                  </a:spcBef>
+                  <a:buNone/>
+                </a:pPr>
+                <a14:m>
+                  <m:oMath xmlns:m="http://schemas.openxmlformats.org/officeDocument/2006/math">
+                    <m:sSub>
+                      <m:sSubPr>
+                        <m:ctrlPr>
+                          <a:rPr lang="en-US" i="1" smtClean="0">
+                            <a:latin typeface="Cambria Math" charset="0"/>
+                          </a:rPr>
+                        </m:ctrlPr>
+                      </m:sSubPr>
+                      <m:e>
+                        <m:r>
+                          <a:rPr lang="en-US" b="0" i="1" smtClean="0">
+                            <a:latin typeface="Cambria Math" charset="0"/>
+                          </a:rPr>
+                          <m:t>𝑞</m:t>
+                        </m:r>
+                      </m:e>
+                      <m:sub>
+                        <m:r>
+                          <a:rPr lang="en-US" i="1">
+                            <a:latin typeface="Cambria Math" charset="0"/>
+                          </a:rPr>
+                          <m:t>𝑗</m:t>
+                        </m:r>
+                        <m:r>
+                          <a:rPr lang="en-US" i="1">
+                            <a:latin typeface="Cambria Math" charset="0"/>
+                          </a:rPr>
+                          <m:t>|</m:t>
+                        </m:r>
+                        <m:r>
+                          <a:rPr lang="en-US" i="1">
+                            <a:latin typeface="Cambria Math" charset="0"/>
+                          </a:rPr>
+                          <m:t>𝑖</m:t>
+                        </m:r>
+                      </m:sub>
+                    </m:sSub>
+                    <m:r>
+                      <a:rPr lang="en-US" i="1">
+                        <a:latin typeface="Cambria Math" charset="0"/>
+                      </a:rPr>
+                      <m:t>=</m:t>
+                    </m:r>
+                  </m:oMath>
+                </a14:m>
+                <a:r>
+                  <a:rPr lang="en-US" dirty="0"/>
+                  <a:t> “neighborliness” </a:t>
+                </a:r>
+                <a:r>
+                  <a:rPr lang="en-US" i="1" dirty="0"/>
+                  <a:t>of </a:t>
+                </a:r>
+                <a14:m>
+                  <m:oMath xmlns:m="http://schemas.openxmlformats.org/officeDocument/2006/math">
+                    <m:sSub>
+                      <m:sSubPr>
+                        <m:ctrlPr>
+                          <a:rPr lang="en-US" b="1" i="1">
+                            <a:latin typeface="Cambria Math" charset="0"/>
+                          </a:rPr>
+                        </m:ctrlPr>
+                      </m:sSubPr>
+                      <m:e>
+                        <m:r>
+                          <a:rPr lang="en-US" b="1" i="1" smtClean="0">
+                            <a:latin typeface="Cambria Math" charset="0"/>
+                          </a:rPr>
+                          <m:t>𝒚</m:t>
+                        </m:r>
+                      </m:e>
+                      <m:sub>
+                        <m:r>
+                          <a:rPr lang="en-US" b="1" i="1">
+                            <a:latin typeface="Cambria Math" charset="0"/>
+                          </a:rPr>
+                          <m:t>𝒋</m:t>
+                        </m:r>
+                      </m:sub>
+                    </m:sSub>
+                  </m:oMath>
+                </a14:m>
+                <a:r>
+                  <a:rPr lang="en-US" dirty="0"/>
+                  <a:t> </a:t>
+                </a:r>
+                <a:r>
+                  <a:rPr lang="en-US" dirty="0"/>
+                  <a:t>g</a:t>
+                </a:r>
+                <a14:m>
+                  <m:oMath xmlns:m="http://schemas.openxmlformats.org/officeDocument/2006/math">
+                    <m:r>
+                      <m:rPr>
+                        <m:sty m:val="p"/>
+                      </m:rPr>
+                      <a:rPr lang="en-US">
+                        <a:latin typeface="Cambria Math" charset="0"/>
+                      </a:rPr>
+                      <m:t>iven</m:t>
+                    </m:r>
+                    <m:r>
+                      <a:rPr lang="en-US">
+                        <a:latin typeface="Cambria Math" charset="0"/>
+                      </a:rPr>
+                      <m:t> </m:t>
+                    </m:r>
+                    <m:sSub>
+                      <m:sSubPr>
+                        <m:ctrlPr>
+                          <a:rPr lang="en-US" b="1" i="1">
+                            <a:latin typeface="Cambria Math" charset="0"/>
+                          </a:rPr>
+                        </m:ctrlPr>
+                      </m:sSubPr>
+                      <m:e>
+                        <m:r>
+                          <a:rPr lang="en-US" b="1" i="1" smtClean="0">
+                            <a:latin typeface="Cambria Math" charset="0"/>
+                          </a:rPr>
+                          <m:t>𝒚</m:t>
+                        </m:r>
+                      </m:e>
+                      <m:sub>
+                        <m:r>
+                          <a:rPr lang="en-US" b="1" i="1">
+                            <a:latin typeface="Cambria Math" charset="0"/>
+                          </a:rPr>
+                          <m:t>𝒊</m:t>
+                        </m:r>
+                      </m:sub>
+                    </m:sSub>
+                    <m:r>
+                      <a:rPr lang="en-US" b="1" i="1" smtClean="0">
+                        <a:latin typeface="Cambria Math" charset="0"/>
+                      </a:rPr>
+                      <m:t>= </m:t>
+                    </m:r>
+                    <m:f>
+                      <m:fPr>
+                        <m:ctrlPr>
+                          <a:rPr lang="mr-IN" b="1" i="1" smtClean="0">
+                            <a:latin typeface="Cambria Math" charset="0"/>
+                          </a:rPr>
+                        </m:ctrlPr>
+                      </m:fPr>
+                      <m:num>
+                        <m:sSup>
+                          <m:sSupPr>
+                            <m:ctrlPr>
+                              <a:rPr lang="en-US" b="1" i="1" smtClean="0">
+                                <a:latin typeface="Cambria Math" charset="0"/>
+                              </a:rPr>
+                            </m:ctrlPr>
+                          </m:sSupPr>
+                          <m:e>
+                            <m:d>
+                              <m:dPr>
+                                <m:ctrlPr>
+                                  <a:rPr lang="en-US" b="1" i="1" smtClean="0">
+                                    <a:latin typeface="Cambria Math" charset="0"/>
+                                  </a:rPr>
+                                </m:ctrlPr>
+                              </m:dPr>
+                              <m:e>
+                                <m:r>
+                                  <a:rPr lang="en-US" b="1" i="1" smtClean="0">
+                                    <a:latin typeface="Cambria Math" charset="0"/>
+                                  </a:rPr>
+                                  <m:t>𝟏</m:t>
+                                </m:r>
+                                <m:r>
+                                  <a:rPr lang="en-US" b="1" i="1" smtClean="0">
+                                    <a:latin typeface="Cambria Math" charset="0"/>
+                                  </a:rPr>
+                                  <m:t>+</m:t>
+                                </m:r>
+                                <m:sSup>
+                                  <m:sSupPr>
+                                    <m:ctrlPr>
+                                      <a:rPr lang="en-US" b="1" i="1" smtClean="0">
+                                        <a:latin typeface="Cambria Math" charset="0"/>
+                                      </a:rPr>
+                                    </m:ctrlPr>
+                                  </m:sSupPr>
+                                  <m:e>
+                                    <m:d>
+                                      <m:dPr>
+                                        <m:begChr m:val="|"/>
+                                        <m:endChr m:val="|"/>
+                                        <m:ctrlPr>
+                                          <a:rPr lang="en-US" b="1" i="1" smtClean="0">
+                                            <a:latin typeface="Cambria Math" charset="0"/>
+                                          </a:rPr>
+                                        </m:ctrlPr>
+                                      </m:dPr>
+                                      <m:e>
+                                        <m:d>
+                                          <m:dPr>
+                                            <m:begChr m:val="|"/>
+                                            <m:endChr m:val="|"/>
+                                            <m:ctrlPr>
+                                              <a:rPr lang="en-US" b="1" i="1" smtClean="0">
+                                                <a:latin typeface="Cambria Math" charset="0"/>
+                                              </a:rPr>
+                                            </m:ctrlPr>
+                                          </m:dPr>
+                                          <m:e>
+                                            <m:sSub>
+                                              <m:sSubPr>
+                                                <m:ctrlPr>
+                                                  <a:rPr lang="en-US" b="1" i="1" smtClean="0">
+                                                    <a:latin typeface="Cambria Math" charset="0"/>
+                                                  </a:rPr>
+                                                </m:ctrlPr>
+                                              </m:sSubPr>
+                                              <m:e>
+                                                <m:r>
+                                                  <a:rPr lang="en-US" b="1" i="1" smtClean="0">
+                                                    <a:latin typeface="Cambria Math" charset="0"/>
+                                                  </a:rPr>
+                                                  <m:t>𝒚</m:t>
+                                                </m:r>
+                                              </m:e>
+                                              <m:sub>
+                                                <m:r>
+                                                  <a:rPr lang="en-US" b="1" i="1" smtClean="0">
+                                                    <a:latin typeface="Cambria Math" charset="0"/>
+                                                  </a:rPr>
+                                                  <m:t>𝒊</m:t>
+                                                </m:r>
+                                              </m:sub>
+                                            </m:sSub>
+                                            <m:r>
+                                              <a:rPr lang="en-US" b="1" i="1" smtClean="0">
+                                                <a:latin typeface="Cambria Math" charset="0"/>
+                                              </a:rPr>
+                                              <m:t>−</m:t>
+                                            </m:r>
+                                            <m:sSub>
+                                              <m:sSubPr>
+                                                <m:ctrlPr>
+                                                  <a:rPr lang="en-US" b="1" i="1" smtClean="0">
+                                                    <a:latin typeface="Cambria Math" charset="0"/>
+                                                  </a:rPr>
+                                                </m:ctrlPr>
+                                              </m:sSubPr>
+                                              <m:e>
+                                                <m:r>
+                                                  <a:rPr lang="en-US" b="1" i="1" smtClean="0">
+                                                    <a:latin typeface="Cambria Math" charset="0"/>
+                                                  </a:rPr>
+                                                  <m:t>𝒚</m:t>
+                                                </m:r>
+                                              </m:e>
+                                              <m:sub>
+                                                <m:r>
+                                                  <a:rPr lang="en-US" b="1" i="1" smtClean="0">
+                                                    <a:latin typeface="Cambria Math" charset="0"/>
+                                                  </a:rPr>
+                                                  <m:t>𝒋</m:t>
+                                                </m:r>
+                                              </m:sub>
+                                            </m:sSub>
+                                          </m:e>
+                                        </m:d>
+                                      </m:e>
+                                    </m:d>
+                                  </m:e>
+                                  <m:sup>
+                                    <m:r>
+                                      <a:rPr lang="en-US" b="1" i="1" smtClean="0">
+                                        <a:latin typeface="Cambria Math" charset="0"/>
+                                      </a:rPr>
+                                      <m:t>𝟐</m:t>
+                                    </m:r>
+                                  </m:sup>
+                                </m:sSup>
+                              </m:e>
+                            </m:d>
+                          </m:e>
+                          <m:sup>
+                            <m:r>
+                              <a:rPr lang="en-US" b="1" i="1" smtClean="0">
+                                <a:latin typeface="Cambria Math" charset="0"/>
+                              </a:rPr>
+                              <m:t>−</m:t>
+                            </m:r>
+                            <m:r>
+                              <a:rPr lang="en-US" b="1" i="1" smtClean="0">
+                                <a:latin typeface="Cambria Math" charset="0"/>
+                              </a:rPr>
+                              <m:t>𝟏</m:t>
+                            </m:r>
+                          </m:sup>
+                        </m:sSup>
+                      </m:num>
+                      <m:den>
+                        <m:nary>
+                          <m:naryPr>
+                            <m:chr m:val="∑"/>
+                            <m:limLoc m:val="subSup"/>
+                            <m:supHide m:val="on"/>
+                            <m:ctrlPr>
+                              <a:rPr lang="mr-IN" b="1" i="1" smtClean="0">
+                                <a:latin typeface="Cambria Math" charset="0"/>
+                              </a:rPr>
+                            </m:ctrlPr>
+                          </m:naryPr>
+                          <m:sub>
+                            <m:r>
+                              <m:rPr>
+                                <m:brk m:alnAt="9"/>
+                              </m:rPr>
+                              <a:rPr lang="en-US" b="1" i="1" smtClean="0">
+                                <a:latin typeface="Cambria Math" charset="0"/>
+                              </a:rPr>
+                              <m:t>𝒌</m:t>
+                            </m:r>
+                            <m:r>
+                              <a:rPr lang="en-US" b="1" i="1" smtClean="0">
+                                <a:latin typeface="Cambria Math" charset="0"/>
+                              </a:rPr>
+                              <m:t>≠</m:t>
+                            </m:r>
+                            <m:r>
+                              <a:rPr lang="en-US" b="1" i="1" smtClean="0">
+                                <a:latin typeface="Cambria Math" charset="0"/>
+                              </a:rPr>
+                              <m:t>𝒍</m:t>
+                            </m:r>
+                          </m:sub>
+                          <m:sup/>
+                          <m:e>
+                            <m:sSup>
+                              <m:sSupPr>
+                                <m:ctrlPr>
+                                  <a:rPr lang="en-US" b="1" i="1">
+                                    <a:latin typeface="Cambria Math" charset="0"/>
+                                  </a:rPr>
+                                </m:ctrlPr>
+                              </m:sSupPr>
+                              <m:e>
+                                <m:d>
+                                  <m:dPr>
+                                    <m:ctrlPr>
+                                      <a:rPr lang="en-US" b="1" i="1">
+                                        <a:latin typeface="Cambria Math" charset="0"/>
+                                      </a:rPr>
+                                    </m:ctrlPr>
+                                  </m:dPr>
+                                  <m:e>
+                                    <m:r>
+                                      <a:rPr lang="en-US" b="1" i="1">
+                                        <a:latin typeface="Cambria Math" charset="0"/>
+                                      </a:rPr>
+                                      <m:t>𝟏</m:t>
+                                    </m:r>
+                                    <m:r>
+                                      <a:rPr lang="en-US" b="1" i="1">
+                                        <a:latin typeface="Cambria Math" charset="0"/>
+                                      </a:rPr>
+                                      <m:t>+</m:t>
+                                    </m:r>
+                                    <m:sSup>
+                                      <m:sSupPr>
+                                        <m:ctrlPr>
+                                          <a:rPr lang="en-US" b="1" i="1">
+                                            <a:latin typeface="Cambria Math" charset="0"/>
+                                          </a:rPr>
+                                        </m:ctrlPr>
+                                      </m:sSupPr>
+                                      <m:e>
+                                        <m:d>
+                                          <m:dPr>
+                                            <m:begChr m:val="|"/>
+                                            <m:endChr m:val="|"/>
+                                            <m:ctrlPr>
+                                              <a:rPr lang="en-US" b="1" i="1">
+                                                <a:latin typeface="Cambria Math" charset="0"/>
+                                              </a:rPr>
+                                            </m:ctrlPr>
+                                          </m:dPr>
+                                          <m:e>
+                                            <m:d>
+                                              <m:dPr>
+                                                <m:begChr m:val="|"/>
+                                                <m:endChr m:val="|"/>
+                                                <m:ctrlPr>
+                                                  <a:rPr lang="en-US" b="1" i="1">
+                                                    <a:latin typeface="Cambria Math" charset="0"/>
+                                                  </a:rPr>
+                                                </m:ctrlPr>
+                                              </m:dPr>
+                                              <m:e>
+                                                <m:sSub>
+                                                  <m:sSubPr>
+                                                    <m:ctrlPr>
+                                                      <a:rPr lang="en-US" b="1" i="1">
+                                                        <a:latin typeface="Cambria Math" charset="0"/>
+                                                      </a:rPr>
+                                                    </m:ctrlPr>
+                                                  </m:sSubPr>
+                                                  <m:e>
+                                                    <m:r>
+                                                      <a:rPr lang="en-US" b="1" i="1">
+                                                        <a:latin typeface="Cambria Math" charset="0"/>
+                                                      </a:rPr>
+                                                      <m:t>𝒚</m:t>
+                                                    </m:r>
+                                                  </m:e>
+                                                  <m:sub>
+                                                    <m:r>
+                                                      <a:rPr lang="en-US" b="1" i="1">
+                                                        <a:latin typeface="Cambria Math" charset="0"/>
+                                                      </a:rPr>
+                                                      <m:t>𝒊</m:t>
+                                                    </m:r>
+                                                  </m:sub>
+                                                </m:sSub>
+                                                <m:r>
+                                                  <a:rPr lang="en-US" b="1" i="1">
+                                                    <a:latin typeface="Cambria Math" charset="0"/>
+                                                  </a:rPr>
+                                                  <m:t>−</m:t>
+                                                </m:r>
+                                                <m:sSub>
+                                                  <m:sSubPr>
+                                                    <m:ctrlPr>
+                                                      <a:rPr lang="en-US" b="1" i="1">
+                                                        <a:latin typeface="Cambria Math" charset="0"/>
+                                                      </a:rPr>
+                                                    </m:ctrlPr>
+                                                  </m:sSubPr>
+                                                  <m:e>
+                                                    <m:r>
+                                                      <a:rPr lang="en-US" b="1" i="1">
+                                                        <a:latin typeface="Cambria Math" charset="0"/>
+                                                      </a:rPr>
+                                                      <m:t>𝒚</m:t>
+                                                    </m:r>
+                                                  </m:e>
+                                                  <m:sub>
+                                                    <m:r>
+                                                      <a:rPr lang="en-US" b="1" i="1">
+                                                        <a:latin typeface="Cambria Math" charset="0"/>
+                                                      </a:rPr>
+                                                      <m:t>𝒋</m:t>
+                                                    </m:r>
+                                                  </m:sub>
+                                                </m:sSub>
+                                              </m:e>
+                                            </m:d>
+                                          </m:e>
+                                        </m:d>
+                                      </m:e>
+                                      <m:sup>
+                                        <m:r>
+                                          <a:rPr lang="en-US" b="1" i="1">
+                                            <a:latin typeface="Cambria Math" charset="0"/>
+                                          </a:rPr>
+                                          <m:t>𝟐</m:t>
+                                        </m:r>
+                                      </m:sup>
+                                    </m:sSup>
+                                  </m:e>
+                                </m:d>
+                              </m:e>
+                              <m:sup>
+                                <m:r>
+                                  <a:rPr lang="en-US" b="1" i="1">
+                                    <a:latin typeface="Cambria Math" charset="0"/>
+                                  </a:rPr>
+                                  <m:t>−</m:t>
+                                </m:r>
+                                <m:r>
+                                  <a:rPr lang="en-US" b="1" i="1">
+                                    <a:latin typeface="Cambria Math" charset="0"/>
+                                  </a:rPr>
+                                  <m:t>𝟏</m:t>
+                                </m:r>
+                              </m:sup>
+                            </m:sSup>
+                          </m:e>
+                        </m:nary>
+                      </m:den>
+                    </m:f>
+                  </m:oMath>
+                </a14:m>
+                <a:endParaRPr lang="en-US" dirty="0"/>
+              </a:p>
+            </p:txBody>
+          </p:sp>
+        </mc:Choice>
+        <mc:Fallback>
+          <p:sp>
+            <p:nvSpPr>
+              <p:cNvPr id="8" name="Content Placeholder 7"/>
+              <p:cNvSpPr>
+                <a:spLocks noGrp="1" noRot="1" noChangeAspect="1" noMove="1" noResize="1" noEditPoints="1" noAdjustHandles="1" noChangeArrowheads="1" noChangeShapeType="1" noTextEdit="1"/>
+              </p:cNvSpPr>
+              <p:nvPr>
+                <p:ph sz="half" idx="1"/>
+              </p:nvPr>
+            </p:nvSpPr>
+            <p:spPr>
+              <a:blipFill rotWithShape="0">
+                <a:blip r:embed="rId4"/>
+                <a:stretch>
+                  <a:fillRect l="-2471" t="-1261"/>
+                </a:stretch>
+              </a:blipFill>
+            </p:spPr>
+            <p:txBody>
+              <a:bodyPr/>
+              <a:lstStyle/>
+              <a:p>
+                <a:r>
+                  <a:rPr lang="en-US">
+                    <a:noFill/>
+                  </a:rPr>
+                  <a:t> </a:t>
+                </a:r>
+              </a:p>
+            </p:txBody>
+          </p:sp>
+        </mc:Fallback>
+      </mc:AlternateContent>
+      <p:pic>
+        <p:nvPicPr>
+          <p:cNvPr id="11" name="Content Placeholder 10"/>
+          <p:cNvPicPr>
+            <a:picLocks noGrp="1" noChangeAspect="1"/>
+          </p:cNvPicPr>
+          <p:nvPr>
+            <p:ph sz="half" idx="2"/>
+          </p:nvPr>
+        </p:nvPicPr>
+        <p:blipFill>
+          <a:blip r:embed="rId5">
+            <a:extLst>
+              <a:ext uri="{28A0092B-C50C-407E-A947-70E740481C1C}">
+                <a14:useLocalDpi xmlns:a14="http://schemas.microsoft.com/office/drawing/2010/main" val="0"/>
+              </a:ext>
+            </a:extLst>
+          </a:blip>
+          <a:stretch>
+            <a:fillRect/>
+          </a:stretch>
+        </p:blipFill>
+        <p:spPr>
+          <a:xfrm>
+            <a:off x="6940826" y="905461"/>
+            <a:ext cx="4351338" cy="4351338"/>
+          </a:xfrm>
+        </p:spPr>
+      </p:pic>
+      <p:sp>
+        <p:nvSpPr>
+          <p:cNvPr id="13" name="TextBox 12"/>
+          <p:cNvSpPr txBox="1"/>
+          <p:nvPr/>
+        </p:nvSpPr>
+        <p:spPr>
+          <a:xfrm>
+            <a:off x="6940826" y="5058471"/>
+            <a:ext cx="4412974" cy="830997"/>
+          </a:xfrm>
+          <a:prstGeom prst="rect">
+            <a:avLst/>
+          </a:prstGeom>
+          <a:noFill/>
+        </p:spPr>
+        <p:txBody>
+          <a:bodyPr wrap="square" rtlCol="0">
+            <a:spAutoFit/>
+          </a:bodyPr>
           <a:lstStyle/>
           <a:p>
             <a:r>
+              <a:rPr lang="en-US" dirty="0" smtClean="0"/>
+              <a:t>Figure 1: Student t-distribution with 1 degree </a:t>
+            </a:r>
+            <a:r>
               <a:rPr lang="en-US" dirty="0"/>
-              <a:t>Similarity </a:t>
-            </a:r>
-            <a:r>
-              <a:rPr lang="en-US" dirty="0" smtClean="0"/>
-              <a:t>Q </a:t>
-            </a:r>
-            <a:r>
-              <a:rPr lang="en-US" dirty="0"/>
-              <a:t>in </a:t>
-            </a:r>
-            <a:r>
-              <a:rPr lang="en-US" dirty="0" err="1" smtClean="0"/>
-              <a:t>R^d</a:t>
-            </a:r>
-            <a:endParaRPr lang="en-US" dirty="0"/>
-          </a:p>
-        </p:txBody>
-      </p:sp>
-      <p:sp>
-        <p:nvSpPr>
-          <p:cNvPr id="3" name="Content Placeholder 2"/>
-          <p:cNvSpPr>
-            <a:spLocks noGrp="1"/>
-          </p:cNvSpPr>
-          <p:nvPr>
-            <p:ph idx="1"/>
-          </p:nvPr>
-        </p:nvSpPr>
-        <p:spPr/>
-        <p:txBody>
-          <a:bodyPr/>
-          <a:lstStyle/>
-          <a:p>
-            <a:endParaRPr lang="en-US"/>
+              <a:t>of freedom </a:t>
+            </a:r>
+            <a:r>
+              <a:rPr lang="en-US" sz="1200" dirty="0"/>
+              <a:t>(https://</a:t>
+            </a:r>
+            <a:r>
+              <a:rPr lang="en-US" sz="1200" dirty="0" err="1"/>
+              <a:t>en.wikipedia.org</a:t>
+            </a:r>
+            <a:r>
+              <a:rPr lang="en-US" sz="1200" dirty="0"/>
+              <a:t>/wiki/</a:t>
+            </a:r>
+            <a:r>
+              <a:rPr lang="en-US" sz="1200" dirty="0" err="1"/>
+              <a:t>Student's_t</a:t>
+            </a:r>
+            <a:r>
+              <a:rPr lang="en-US" sz="1200" dirty="0"/>
+              <a:t>-distribution#/media/File:T_distribution_1df_enhanced.svg)</a:t>
+            </a:r>
           </a:p>
         </p:txBody>
       </p:sp>
@@ -5478,7 +8040,7 @@
           <a:p>
             <a:r>
               <a:rPr lang="en-US" dirty="0" smtClean="0"/>
-              <a:t>Choice of P and Q – why important?</a:t>
+              <a:t>Cost function – K-L divergence</a:t>
             </a:r>
             <a:endParaRPr lang="en-US" dirty="0"/>
           </a:p>
@@ -5501,10 +8063,17 @@
           <a:p>
             <a:r>
               <a:rPr lang="en-US" dirty="0" smtClean="0"/>
-              <a:t>Why student-t</a:t>
-            </a:r>
-          </a:p>
-          <a:p>
+              <a:t>Minimize “distance” between two distributions</a:t>
+            </a:r>
+          </a:p>
+          <a:p>
+            <a:endParaRPr lang="en-US" dirty="0"/>
+          </a:p>
+          <a:p>
+            <a:r>
+              <a:rPr lang="en-US" dirty="0" smtClean="0"/>
+              <a:t>Choice of P and Q allows for large distances to be weighted less</a:t>
+            </a:r>
             <a:endParaRPr lang="en-US" dirty="0"/>
           </a:p>
         </p:txBody>
@@ -5512,7 +8081,7 @@
     </p:spTree>
     <p:extLst>
       <p:ext uri="{BB962C8B-B14F-4D97-AF65-F5344CB8AC3E}">
-        <p14:creationId xmlns:p14="http://schemas.microsoft.com/office/powerpoint/2010/main" val="1288403930"/>
+        <p14:creationId xmlns:p14="http://schemas.microsoft.com/office/powerpoint/2010/main" val="657638561"/>
       </p:ext>
     </p:extLst>
   </p:cSld>
@@ -5556,7 +8125,11 @@
           <a:p>
             <a:r>
               <a:rPr lang="en-US" dirty="0" smtClean="0"/>
-              <a:t>Cost function – K-L divergence</a:t>
+              <a:t>Choice of P and Q – why </a:t>
+            </a:r>
+            <a:r>
+              <a:rPr lang="en-US" dirty="0" smtClean="0"/>
+              <a:t>important with respect to SNE?</a:t>
             </a:r>
             <a:endParaRPr lang="en-US" dirty="0"/>
           </a:p>
@@ -5579,17 +8152,21 @@
           <a:p>
             <a:r>
               <a:rPr lang="en-US" dirty="0" smtClean="0"/>
-              <a:t>Minimize “distance” between two distributions</a:t>
-            </a:r>
-          </a:p>
-          <a:p>
-            <a:endParaRPr lang="en-US" dirty="0"/>
-          </a:p>
-          <a:p>
+              <a:t>Why </a:t>
+            </a:r>
             <a:r>
               <a:rPr lang="en-US" dirty="0" smtClean="0"/>
-              <a:t>Choice of P and Q allows for large distances to be weighted less</a:t>
-            </a:r>
+              <a:t>student-t</a:t>
+            </a:r>
+          </a:p>
+          <a:p>
+            <a:r>
+              <a:rPr lang="en-US" dirty="0" smtClean="0"/>
+              <a:t>Why symmetric p’s and q’s</a:t>
+            </a:r>
+            <a:endParaRPr lang="en-US" dirty="0" smtClean="0"/>
+          </a:p>
+          <a:p>
             <a:endParaRPr lang="en-US" dirty="0"/>
           </a:p>
         </p:txBody>
@@ -5597,7 +8174,7 @@
     </p:spTree>
     <p:extLst>
       <p:ext uri="{BB962C8B-B14F-4D97-AF65-F5344CB8AC3E}">
-        <p14:creationId xmlns:p14="http://schemas.microsoft.com/office/powerpoint/2010/main" val="657638561"/>
+        <p14:creationId xmlns:p14="http://schemas.microsoft.com/office/powerpoint/2010/main" val="1288403930"/>
       </p:ext>
     </p:extLst>
   </p:cSld>
@@ -5713,8 +8290,11 @@
           <a:p>
             <a:r>
               <a:rPr lang="en-US" dirty="0" smtClean="0"/>
-              <a:t>Comparison to Other Methods</a:t>
-            </a:r>
+              <a:t>Strengths/Pitfalls</a:t>
+            </a:r>
+            <a:br>
+              <a:rPr lang="en-US" dirty="0" smtClean="0"/>
+            </a:br>
             <a:endParaRPr lang="en-US" dirty="0"/>
           </a:p>
         </p:txBody>
@@ -5741,7 +8321,7 @@
     </p:spTree>
     <p:extLst>
       <p:ext uri="{BB962C8B-B14F-4D97-AF65-F5344CB8AC3E}">
-        <p14:creationId xmlns:p14="http://schemas.microsoft.com/office/powerpoint/2010/main" val="1054989624"/>
+        <p14:creationId xmlns:p14="http://schemas.microsoft.com/office/powerpoint/2010/main" val="1889581618"/>
       </p:ext>
     </p:extLst>
   </p:cSld>

</xml_diff>

<commit_message>
Finished comments for crowding problem
</commit_message>
<xml_diff>
--- a/math465_tsne.pptx
+++ b/math465_tsne.pptx
@@ -5,7 +5,7 @@
     <p:sldMasterId id="2147483648" r:id="rId1"/>
   </p:sldMasterIdLst>
   <p:notesMasterIdLst>
-    <p:notesMasterId r:id="rId12"/>
+    <p:notesMasterId r:id="rId10"/>
   </p:notesMasterIdLst>
   <p:sldIdLst>
     <p:sldId id="256" r:id="rId2"/>
@@ -14,10 +14,8 @@
     <p:sldId id="259" r:id="rId5"/>
     <p:sldId id="260" r:id="rId6"/>
     <p:sldId id="261" r:id="rId7"/>
-    <p:sldId id="263" r:id="rId8"/>
-    <p:sldId id="265" r:id="rId9"/>
-    <p:sldId id="264" r:id="rId10"/>
-    <p:sldId id="266" r:id="rId11"/>
+    <p:sldId id="264" r:id="rId8"/>
+    <p:sldId id="266" r:id="rId9"/>
   </p:sldIdLst>
   <p:sldSz cx="12192000" cy="6858000"/>
   <p:notesSz cx="6858000" cy="9144000"/>
@@ -127,11 +125,7 @@
 <file path=ppt/commentAuthors.xml><?xml version="1.0" encoding="utf-8"?>
 <p:cmAuthorLst xmlns:a="http://schemas.openxmlformats.org/drawingml/2006/main" xmlns:r="http://schemas.openxmlformats.org/officeDocument/2006/relationships" xmlns:p="http://schemas.openxmlformats.org/presentationml/2006/main">
   <p:cmAuthor id="1" name="nvonturk@gmail.com" initials="" lastIdx="0" clrIdx="0">
-    <p:extLst>
-      <p:ext uri="{19B8F6BF-5375-455C-9EA6-DF929625EA0E}">
-        <p15:presenceInfo xmlns:p15="http://schemas.microsoft.com/office/powerpoint/2012/main" userId="" providerId=""/>
-      </p:ext>
-    </p:extLst>
+    <p:extLst/>
   </p:cmAuthor>
 </p:cmAuthorLst>
 </file>
@@ -681,8 +675,13 @@
             </a:r>
             <a:r>
               <a:rPr lang="en-US" baseline="0" dirty="0" smtClean="0"/>
-              <a:t> to account for outlier data points</a:t>
-            </a:r>
+              <a:t> to </a:t>
+            </a:r>
+            <a:r>
+              <a:rPr lang="en-US" baseline="0" dirty="0" smtClean="0"/>
+              <a:t>make the gradient easier to compute</a:t>
+            </a:r>
+            <a:endParaRPr lang="en-US" baseline="0" dirty="0" smtClean="0"/>
           </a:p>
           <a:p>
             <a:endParaRPr lang="en-US" baseline="0" dirty="0" smtClean="0"/>
@@ -791,16 +790,16 @@
               <a:t>In the case of TSNE, </a:t>
             </a:r>
             <a:r>
-              <a:rPr lang="en-US" dirty="0" err="1" smtClean="0"/>
-              <a:t>since</a:t>
-            </a:r>
-            <a:r>
-              <a:rPr lang="en-US" baseline="0" dirty="0" err="1" smtClean="0"/>
-              <a:t>local</a:t>
+              <a:rPr lang="en-US" dirty="0" smtClean="0"/>
+              <a:t>since </a:t>
             </a:r>
             <a:r>
               <a:rPr lang="en-US" baseline="0" dirty="0" smtClean="0"/>
-              <a:t> structure is preserved and prioritized, larger distances/more global structures can be distorted, specifically enlarged</a:t>
+              <a:t>local </a:t>
+            </a:r>
+            <a:r>
+              <a:rPr lang="en-US" baseline="0" dirty="0" smtClean="0"/>
+              <a:t>structure is preserved and prioritized, larger distances/more global structures can be distorted, specifically enlarged</a:t>
             </a:r>
           </a:p>
           <a:p>
@@ -809,8 +808,13 @@
           <a:p>
             <a:r>
               <a:rPr lang="en-US" baseline="0" dirty="0" smtClean="0"/>
-              <a:t>What that means is points that are not close in high dimensional space may be forced to be modeled farther from each other in low dimensions (recall the triangle of points demonstration)</a:t>
-            </a:r>
+              <a:t>What that means is points that are not close in high dimensional space may be forced to be modeled farther from each other in low dimensions (recall the triangle of points </a:t>
+            </a:r>
+            <a:r>
+              <a:rPr lang="en-US" baseline="0" dirty="0" smtClean="0"/>
+              <a:t>demonstration and show that the p and q values create an attractive force on the farthest points in the mapped dimension) </a:t>
+            </a:r>
+            <a:endParaRPr lang="en-US" baseline="0" dirty="0" smtClean="0"/>
           </a:p>
           <a:p>
             <a:endParaRPr lang="en-US" baseline="0" dirty="0" smtClean="0"/>
@@ -825,8 +829,12 @@
               <a:t>gaussian</a:t>
             </a:r>
             <a:r>
-              <a:rPr lang="en-US" baseline="0" smtClean="0"/>
+              <a:rPr lang="en-US" baseline="0" dirty="0" smtClean="0"/>
               <a:t>, </a:t>
+            </a:r>
+            <a:r>
+              <a:rPr lang="en-US" baseline="0" dirty="0" smtClean="0"/>
+              <a:t>the p value (say 0.05) on the blue line represents a point moderately distant from the rest. In the mapped dimension, to get the q value that would incur no difference in the gradient, the point must be even more distant. This prevents the issue of crowding</a:t>
             </a:r>
             <a:endParaRPr lang="en-US" dirty="0"/>
           </a:p>
@@ -859,6 +867,98 @@
     <p:extLst>
       <p:ext uri="{BB962C8B-B14F-4D97-AF65-F5344CB8AC3E}">
         <p14:creationId xmlns:p14="http://schemas.microsoft.com/office/powerpoint/2010/main" val="1972854954"/>
+      </p:ext>
+    </p:extLst>
+  </p:cSld>
+  <p:clrMapOvr>
+    <a:masterClrMapping/>
+  </p:clrMapOvr>
+</p:notes>
+</file>
+
+<file path=ppt/notesSlides/notesSlide4.xml><?xml version="1.0" encoding="utf-8"?>
+<p:notes xmlns:a="http://schemas.openxmlformats.org/drawingml/2006/main" xmlns:r="http://schemas.openxmlformats.org/officeDocument/2006/relationships" xmlns:p="http://schemas.openxmlformats.org/presentationml/2006/main">
+  <p:cSld>
+    <p:spTree>
+      <p:nvGrpSpPr>
+        <p:cNvPr id="1" name=""/>
+        <p:cNvGrpSpPr/>
+        <p:nvPr/>
+      </p:nvGrpSpPr>
+      <p:grpSpPr>
+        <a:xfrm>
+          <a:off x="0" y="0"/>
+          <a:ext cx="0" cy="0"/>
+          <a:chOff x="0" y="0"/>
+          <a:chExt cx="0" cy="0"/>
+        </a:xfrm>
+      </p:grpSpPr>
+      <p:sp>
+        <p:nvSpPr>
+          <p:cNvPr id="2" name="Slide Image Placeholder 1"/>
+          <p:cNvSpPr>
+            <a:spLocks noGrp="1" noRot="1" noChangeAspect="1"/>
+          </p:cNvSpPr>
+          <p:nvPr>
+            <p:ph type="sldImg"/>
+          </p:nvPr>
+        </p:nvSpPr>
+        <p:spPr/>
+      </p:sp>
+      <p:sp>
+        <p:nvSpPr>
+          <p:cNvPr id="3" name="Notes Placeholder 2"/>
+          <p:cNvSpPr>
+            <a:spLocks noGrp="1"/>
+          </p:cNvSpPr>
+          <p:nvPr>
+            <p:ph type="body" idx="1"/>
+          </p:nvPr>
+        </p:nvSpPr>
+        <p:spPr/>
+        <p:txBody>
+          <a:bodyPr/>
+          <a:lstStyle/>
+          <a:p>
+            <a:r>
+              <a:rPr lang="en-US" dirty="0" smtClean="0"/>
+              <a:t>Make sure to rehash the differences (symmetry and </a:t>
+            </a:r>
+            <a:r>
+              <a:rPr lang="en-US" smtClean="0"/>
+              <a:t>crowding problem)</a:t>
+            </a:r>
+            <a:endParaRPr lang="en-US"/>
+          </a:p>
+        </p:txBody>
+      </p:sp>
+      <p:sp>
+        <p:nvSpPr>
+          <p:cNvPr id="4" name="Slide Number Placeholder 3"/>
+          <p:cNvSpPr>
+            <a:spLocks noGrp="1"/>
+          </p:cNvSpPr>
+          <p:nvPr>
+            <p:ph type="sldNum" sz="quarter" idx="10"/>
+          </p:nvPr>
+        </p:nvSpPr>
+        <p:spPr/>
+        <p:txBody>
+          <a:bodyPr/>
+          <a:lstStyle/>
+          <a:p>
+            <a:fld id="{4ABACD3E-33D6-8842-A5DE-832FA4DFC58F}" type="slidenum">
+              <a:rPr lang="en-US" smtClean="0"/>
+              <a:t>6</a:t>
+            </a:fld>
+            <a:endParaRPr lang="en-US"/>
+          </a:p>
+        </p:txBody>
+      </p:sp>
+    </p:spTree>
+    <p:extLst>
+      <p:ext uri="{BB962C8B-B14F-4D97-AF65-F5344CB8AC3E}">
+        <p14:creationId xmlns:p14="http://schemas.microsoft.com/office/powerpoint/2010/main" val="726627987"/>
       </p:ext>
     </p:extLst>
   </p:cSld>
@@ -3841,78 +3941,6 @@
 </p:sld>
 </file>
 
-<file path=ppt/slides/slide10.xml><?xml version="1.0" encoding="utf-8"?>
-<p:sld xmlns:a="http://schemas.openxmlformats.org/drawingml/2006/main" xmlns:r="http://schemas.openxmlformats.org/officeDocument/2006/relationships" xmlns:p="http://schemas.openxmlformats.org/presentationml/2006/main">
-  <p:cSld>
-    <p:spTree>
-      <p:nvGrpSpPr>
-        <p:cNvPr id="1" name=""/>
-        <p:cNvGrpSpPr/>
-        <p:nvPr/>
-      </p:nvGrpSpPr>
-      <p:grpSpPr>
-        <a:xfrm>
-          <a:off x="0" y="0"/>
-          <a:ext cx="0" cy="0"/>
-          <a:chOff x="0" y="0"/>
-          <a:chExt cx="0" cy="0"/>
-        </a:xfrm>
-      </p:grpSpPr>
-      <p:sp>
-        <p:nvSpPr>
-          <p:cNvPr id="2" name="Title 1"/>
-          <p:cNvSpPr>
-            <a:spLocks noGrp="1"/>
-          </p:cNvSpPr>
-          <p:nvPr>
-            <p:ph type="title"/>
-          </p:nvPr>
-        </p:nvSpPr>
-        <p:spPr/>
-        <p:txBody>
-          <a:bodyPr/>
-          <a:lstStyle/>
-          <a:p>
-            <a:r>
-              <a:rPr lang="en-US" dirty="0" smtClean="0"/>
-              <a:t>Comparison to Other Methods</a:t>
-            </a:r>
-            <a:endParaRPr lang="en-US" dirty="0"/>
-          </a:p>
-        </p:txBody>
-      </p:sp>
-      <p:sp>
-        <p:nvSpPr>
-          <p:cNvPr id="3" name="Content Placeholder 2"/>
-          <p:cNvSpPr>
-            <a:spLocks noGrp="1"/>
-          </p:cNvSpPr>
-          <p:nvPr>
-            <p:ph idx="1"/>
-          </p:nvPr>
-        </p:nvSpPr>
-        <p:spPr/>
-        <p:txBody>
-          <a:bodyPr/>
-          <a:lstStyle/>
-          <a:p>
-            <a:endParaRPr lang="en-US"/>
-          </a:p>
-        </p:txBody>
-      </p:sp>
-    </p:spTree>
-    <p:extLst>
-      <p:ext uri="{BB962C8B-B14F-4D97-AF65-F5344CB8AC3E}">
-        <p14:creationId xmlns:p14="http://schemas.microsoft.com/office/powerpoint/2010/main" val="1054989624"/>
-      </p:ext>
-    </p:extLst>
-  </p:cSld>
-  <p:clrMapOvr>
-    <a:masterClrMapping/>
-  </p:clrMapOvr>
-</p:sld>
-</file>
-
 <file path=ppt/slides/slide2.xml><?xml version="1.0" encoding="utf-8"?>
 <p:sld xmlns:a="http://schemas.openxmlformats.org/drawingml/2006/main" xmlns:r="http://schemas.openxmlformats.org/officeDocument/2006/relationships" xmlns:p="http://schemas.openxmlformats.org/presentationml/2006/main">
   <p:cSld>
@@ -3953,8 +3981,8 @@
           </a:p>
         </p:txBody>
       </p:sp>
-      <mc:AlternateContent xmlns:mc="http://schemas.openxmlformats.org/markup-compatibility/2006" xmlns:a14="http://schemas.microsoft.com/office/drawing/2010/main">
-        <mc:Choice Requires="a14">
+      <mc:AlternateContent xmlns:mc="http://schemas.openxmlformats.org/markup-compatibility/2006">
+        <mc:Choice xmlns:a14="http://schemas.microsoft.com/office/drawing/2010/main" Requires="a14">
           <p:sp>
             <p:nvSpPr>
               <p:cNvPr id="3" name="Content Placeholder 2"/>
@@ -3967,12 +3995,21 @@
             </p:nvSpPr>
             <p:spPr/>
             <p:txBody>
-              <a:bodyPr/>
+              <a:bodyPr>
+                <a:normAutofit lnSpcReduction="10000"/>
+              </a:bodyPr>
               <a:lstStyle/>
               <a:p>
+                <a:pPr marL="0" indent="0">
+                  <a:buNone/>
+                </a:pPr>
+                <a:r>
+                  <a:rPr lang="en-US" b="1" dirty="0"/>
+                  <a:t>Goal</a:t>
+                </a:r>
                 <a:r>
                   <a:rPr lang="en-US" dirty="0"/>
-                  <a:t>Goal: Represent a set of </a:t>
+                  <a:t>: Represent a set of </a:t>
                 </a:r>
                 <a14:m>
                   <m:oMath xmlns:m="http://schemas.openxmlformats.org/officeDocument/2006/math">
@@ -4070,7 +4107,9 @@
                 <a:endParaRPr lang="en-US" dirty="0"/>
               </a:p>
               <a:p>
-                <a:pPr lvl="1"/>
+                <a:pPr marL="457200" lvl="1" indent="0">
+                  <a:buNone/>
+                </a:pPr>
                 <a:r>
                   <a:rPr lang="en-US" dirty="0"/>
                   <a:t>i.e. Need a map </a:t>
@@ -4157,22 +4196,65 @@
                 <a:endParaRPr lang="en-US" dirty="0"/>
               </a:p>
               <a:p>
+                <a:pPr marL="0" indent="0">
+                  <a:buNone/>
+                </a:pPr>
+                <a:r>
+                  <a:rPr lang="en-US" b="1" dirty="0"/>
+                  <a:t>Why</a:t>
+                </a:r>
                 <a:r>
                   <a:rPr lang="en-US" dirty="0"/>
-                  <a:t>Why?</a:t>
+                  <a:t>?</a:t>
+                </a:r>
+              </a:p>
+              <a:p>
+                <a:pPr marL="457200" lvl="1" indent="0">
+                  <a:buNone/>
+                </a:pPr>
+                <a:r>
+                  <a:rPr lang="en-US" dirty="0"/>
+                  <a:t>Visualizing naturally high-dimensional data, feature selection for machine </a:t>
+                </a:r>
+                <a:r>
+                  <a:rPr lang="en-US" dirty="0" smtClean="0"/>
+                  <a:t>learning</a:t>
                 </a:r>
               </a:p>
               <a:p>
                 <a:pPr lvl="1"/>
+                <a:endParaRPr lang="en-US" dirty="0" smtClean="0"/>
+              </a:p>
+              <a:p>
+                <a:pPr marL="0" indent="0">
+                  <a:buNone/>
+                </a:pPr>
                 <a:r>
-                  <a:rPr lang="en-US" dirty="0"/>
-                  <a:t>Visualizing naturally high-dimensional data, feature selection for machine learning</a:t>
+                  <a:rPr lang="en-US" b="1" dirty="0" smtClean="0"/>
+                  <a:t>Other Methods:</a:t>
                 </a:r>
+              </a:p>
+              <a:p>
+                <a:pPr marL="0" indent="0">
+                  <a:buNone/>
+                </a:pPr>
+                <a:r>
+                  <a:rPr lang="en-US" b="1" dirty="0"/>
+                  <a:t>	</a:t>
+                </a:r>
+                <a:r>
+                  <a:rPr lang="en-US" dirty="0" smtClean="0"/>
+                  <a:t>PCA, ISOMAP</a:t>
+                </a:r>
+                <a:endParaRPr lang="en-US" b="1" dirty="0"/>
+              </a:p>
+              <a:p>
+                <a:endParaRPr lang="en-US" dirty="0"/>
               </a:p>
             </p:txBody>
           </p:sp>
         </mc:Choice>
-        <mc:Fallback xmlns="">
+        <mc:Fallback>
           <p:sp>
             <p:nvSpPr>
               <p:cNvPr id="3" name="Content Placeholder 2"/>
@@ -4187,7 +4269,7 @@
               <a:blipFill rotWithShape="0">
                 <a:blip r:embed="rId2"/>
                 <a:stretch>
-                  <a:fillRect l="-1043" t="-2241"/>
+                  <a:fillRect l="-1217" t="-3081" b="-420"/>
                 </a:stretch>
               </a:blipFill>
             </p:spPr>
@@ -5612,8 +5694,8 @@
           <a:chExt cx="0" cy="0"/>
         </a:xfrm>
       </p:grpSpPr>
-      <mc:AlternateContent xmlns:mc="http://schemas.openxmlformats.org/markup-compatibility/2006">
-        <mc:Choice xmlns:a14="http://schemas.microsoft.com/office/drawing/2010/main" Requires="a14">
+      <mc:AlternateContent xmlns:mc="http://schemas.openxmlformats.org/markup-compatibility/2006" xmlns:a14="http://schemas.microsoft.com/office/drawing/2010/main">
+        <mc:Choice Requires="a14">
           <p:sp>
             <p:nvSpPr>
               <p:cNvPr id="2" name="Title 1"/>
@@ -5667,7 +5749,7 @@
             </p:txBody>
           </p:sp>
         </mc:Choice>
-        <mc:Fallback>
+        <mc:Fallback xmlns="">
           <p:sp>
             <p:nvSpPr>
               <p:cNvPr id="2" name="Title 1"/>
@@ -5701,8 +5783,8 @@
           </p:sp>
         </mc:Fallback>
       </mc:AlternateContent>
-      <mc:AlternateContent xmlns:mc="http://schemas.openxmlformats.org/markup-compatibility/2006">
-        <mc:Choice xmlns:a14="http://schemas.microsoft.com/office/drawing/2010/main" Requires="a14">
+      <mc:AlternateContent xmlns:mc="http://schemas.openxmlformats.org/markup-compatibility/2006" xmlns:a14="http://schemas.microsoft.com/office/drawing/2010/main">
+        <mc:Choice Requires="a14">
           <p:sp>
             <p:nvSpPr>
               <p:cNvPr id="3" name="Content Placeholder 2"/>
@@ -7224,7 +7306,7 @@
             </p:txBody>
           </p:sp>
         </mc:Choice>
-        <mc:Fallback>
+        <mc:Fallback xmlns="">
           <p:sp>
             <p:nvSpPr>
               <p:cNvPr id="3" name="Content Placeholder 2"/>
@@ -7292,8 +7374,8 @@
           <a:chExt cx="0" cy="0"/>
         </a:xfrm>
       </p:grpSpPr>
-      <mc:AlternateContent xmlns:mc="http://schemas.openxmlformats.org/markup-compatibility/2006">
-        <mc:Choice xmlns:a14="http://schemas.microsoft.com/office/drawing/2010/main" Requires="a14">
+      <mc:AlternateContent xmlns:mc="http://schemas.openxmlformats.org/markup-compatibility/2006" xmlns:a14="http://schemas.microsoft.com/office/drawing/2010/main">
+        <mc:Choice Requires="a14">
           <p:sp>
             <p:nvSpPr>
               <p:cNvPr id="2" name="Title 1"/>
@@ -7347,7 +7429,7 @@
             </p:txBody>
           </p:sp>
         </mc:Choice>
-        <mc:Fallback>
+        <mc:Fallback xmlns="">
           <p:sp>
             <p:nvSpPr>
               <p:cNvPr id="2" name="Title 1"/>
@@ -7427,22 +7509,16 @@
                       </m:e>
                       <m:sub>
                         <m:r>
-                          <a:rPr lang="en-US" i="1">
-                            <a:latin typeface="Cambria Math" charset="0"/>
-                          </a:rPr>
-                          <m:t>𝑗</m:t>
+                          <a:rPr lang="en-US" i="1" smtClean="0">
+                            <a:latin typeface="Cambria Math" charset="0"/>
+                          </a:rPr>
+                          <m:t>𝑖</m:t>
                         </m:r>
                         <m:r>
-                          <a:rPr lang="en-US" i="1">
-                            <a:latin typeface="Cambria Math" charset="0"/>
-                          </a:rPr>
-                          <m:t>|</m:t>
-                        </m:r>
-                        <m:r>
-                          <a:rPr lang="en-US" i="1">
-                            <a:latin typeface="Cambria Math" charset="0"/>
-                          </a:rPr>
-                          <m:t>𝑖</m:t>
+                          <a:rPr lang="en-US" b="0" i="1" smtClean="0">
+                            <a:latin typeface="Cambria Math" charset="0"/>
+                          </a:rPr>
+                          <m:t>𝑗</m:t>
                         </m:r>
                       </m:sub>
                     </m:sSub>
@@ -7459,8 +7535,8 @@
                   <a:t> “neighborliness” </a:t>
                 </a:r>
                 <a:r>
-                  <a:rPr lang="en-US" i="1" dirty="0"/>
-                  <a:t>of </a:t>
+                  <a:rPr lang="en-US" i="1" dirty="0" smtClean="0"/>
+                  <a:t>between </a:t>
                 </a:r>
                 <a14:m>
                   <m:oMath xmlns:m="http://schemas.openxmlformats.org/officeDocument/2006/math">
@@ -7496,8 +7572,8 @@
                   <a:t> </a:t>
                 </a:r>
                 <a:r>
-                  <a:rPr lang="en-US" dirty="0"/>
-                  <a:t>g</a:t>
+                  <a:rPr lang="en-US" dirty="0" smtClean="0"/>
+                  <a:t>a</a:t>
                 </a:r>
                 <a14:m>
                   <m:oMath xmlns:m="http://schemas.openxmlformats.org/officeDocument/2006/math">
@@ -7505,13 +7581,13 @@
                       <m:rPr>
                         <m:sty m:val="p"/>
                       </m:rPr>
-                      <a:rPr lang="en-US">
+                      <a:rPr lang="en-US" b="0" i="0" smtClean="0">
                         <a:latin typeface="Cambria Math" charset="0"/>
                       </a:rPr>
-                      <m:t>iven</m:t>
+                      <m:t>nd</m:t>
                     </m:r>
                     <m:r>
-                      <a:rPr lang="en-US">
+                      <a:rPr lang="en-US" b="0" i="0" smtClean="0">
                         <a:latin typeface="Cambria Math" charset="0"/>
                       </a:rPr>
                       <m:t> </m:t>
@@ -7822,10 +7898,10 @@
                                                   </m:e>
                                                   <m:sub>
                                                     <m:r>
-                                                      <a:rPr lang="en-US" b="1" i="1">
+                                                      <a:rPr lang="en-US" b="1" i="1" smtClean="0">
                                                         <a:latin typeface="Cambria Math" charset="0"/>
                                                       </a:rPr>
-                                                      <m:t>𝒊</m:t>
+                                                      <m:t>𝒌</m:t>
                                                     </m:r>
                                                   </m:sub>
                                                 </m:sSub>
@@ -7853,10 +7929,10 @@
                                                   </m:e>
                                                   <m:sub>
                                                     <m:r>
-                                                      <a:rPr lang="en-US" b="1" i="1">
+                                                      <a:rPr lang="en-US" b="1" i="1" smtClean="0">
                                                         <a:latin typeface="Cambria Math" charset="0"/>
                                                       </a:rPr>
-                                                      <m:t>𝒋</m:t>
+                                                      <m:t>𝒍</m:t>
                                                     </m:r>
                                                   </m:sub>
                                                 </m:sSub>
@@ -7898,7 +7974,117 @@
                     </m:f>
                   </m:oMath>
                 </a14:m>
-                <a:endParaRPr lang="en-US" dirty="0"/>
+                <a:endParaRPr lang="en-US" dirty="0" smtClean="0"/>
+              </a:p>
+              <a:p>
+                <a:pPr marL="0" lvl="0" indent="0">
+                  <a:lnSpc>
+                    <a:spcPct val="100000"/>
+                  </a:lnSpc>
+                  <a:spcBef>
+                    <a:spcPts val="0"/>
+                  </a:spcBef>
+                  <a:buNone/>
+                </a:pPr>
+                <a:endParaRPr lang="en-US" dirty="0" smtClean="0"/>
+              </a:p>
+              <a:p>
+                <a:pPr marL="0" lvl="0" indent="0">
+                  <a:lnSpc>
+                    <a:spcPct val="100000"/>
+                  </a:lnSpc>
+                  <a:spcBef>
+                    <a:spcPts val="0"/>
+                  </a:spcBef>
+                  <a:buNone/>
+                </a:pPr>
+                <a:r>
+                  <a:rPr lang="en-US" dirty="0" smtClean="0"/>
+                  <a:t>Note: different from </a:t>
+                </a:r>
+                <a14:m>
+                  <m:oMath xmlns:m="http://schemas.openxmlformats.org/officeDocument/2006/math">
+                    <m:sSub>
+                      <m:sSubPr>
+                        <m:ctrlPr>
+                          <a:rPr lang="en-US" b="0" i="1" smtClean="0">
+                            <a:latin typeface="Cambria Math" charset="0"/>
+                          </a:rPr>
+                        </m:ctrlPr>
+                      </m:sSubPr>
+                      <m:e>
+                        <m:r>
+                          <a:rPr lang="en-US" b="0" i="1" smtClean="0">
+                            <a:latin typeface="Cambria Math" charset="0"/>
+                          </a:rPr>
+                          <m:t>𝑝</m:t>
+                        </m:r>
+                      </m:e>
+                      <m:sub>
+                        <m:r>
+                          <a:rPr lang="en-US" b="0" i="1" smtClean="0">
+                            <a:latin typeface="Cambria Math" charset="0"/>
+                          </a:rPr>
+                          <m:t>𝑗</m:t>
+                        </m:r>
+                        <m:r>
+                          <a:rPr lang="en-US" b="0" i="1" smtClean="0">
+                            <a:latin typeface="Cambria Math" charset="0"/>
+                          </a:rPr>
+                          <m:t>|</m:t>
+                        </m:r>
+                        <m:r>
+                          <a:rPr lang="en-US" b="0" i="1" smtClean="0">
+                            <a:latin typeface="Cambria Math" charset="0"/>
+                          </a:rPr>
+                          <m:t>𝑖</m:t>
+                        </m:r>
+                      </m:sub>
+                    </m:sSub>
+                    <m:r>
+                      <a:rPr lang="en-US" b="0" i="0" smtClean="0">
+                        <a:latin typeface="Cambria Math" charset="0"/>
+                      </a:rPr>
+                      <m:t>!</m:t>
+                    </m:r>
+                  </m:oMath>
+                </a14:m>
+                <a:r>
+                  <a:rPr lang="en-US" dirty="0" smtClean="0"/>
+                  <a:t> </a:t>
+                </a:r>
+              </a:p>
+              <a:p>
+                <a:pPr marL="0" lvl="0" indent="0">
+                  <a:lnSpc>
+                    <a:spcPct val="100000"/>
+                  </a:lnSpc>
+                  <a:spcBef>
+                    <a:spcPts val="0"/>
+                  </a:spcBef>
+                  <a:buNone/>
+                </a:pPr>
+                <a:endParaRPr lang="en-US" dirty="0" smtClean="0"/>
+              </a:p>
+              <a:p>
+                <a:pPr marL="0" lvl="0" indent="0">
+                  <a:lnSpc>
+                    <a:spcPct val="100000"/>
+                  </a:lnSpc>
+                  <a:spcBef>
+                    <a:spcPts val="0"/>
+                  </a:spcBef>
+                  <a:buNone/>
+                </a:pPr>
+                <a:r>
+                  <a:rPr lang="en-US" b="1" dirty="0"/>
+                  <a:t>D</a:t>
+                </a:r>
+                <a:r>
+                  <a:rPr lang="en-US" b="1" dirty="0" smtClean="0"/>
+                  <a:t>ifferentiates t-SNE from SNE</a:t>
+                </a:r>
+                <a:endParaRPr lang="en-US" b="1" dirty="0"/>
               </a:p>
             </p:txBody>
           </p:sp>
@@ -8151,12 +8337,11 @@
           <a:p>
             <a:r>
               <a:rPr lang="en-US" dirty="0" smtClean="0"/>
-              <a:t>Choice of P and Q – why </a:t>
-            </a:r>
-            <a:r>
+              <a:t>Strengths/Pitfalls</a:t>
+            </a:r>
+            <a:br>
               <a:rPr lang="en-US" dirty="0" smtClean="0"/>
-              <a:t>important with respect to SNE?</a:t>
-            </a:r>
+            </a:br>
             <a:endParaRPr lang="en-US" dirty="0"/>
           </a:p>
         </p:txBody>
@@ -8176,31 +8361,14 @@
           <a:bodyPr/>
           <a:lstStyle/>
           <a:p>
-            <a:r>
-              <a:rPr lang="en-US" dirty="0" smtClean="0"/>
-              <a:t>Why </a:t>
-            </a:r>
-            <a:r>
-              <a:rPr lang="en-US" dirty="0" smtClean="0"/>
-              <a:t>student-t</a:t>
-            </a:r>
-          </a:p>
-          <a:p>
-            <a:r>
-              <a:rPr lang="en-US" dirty="0" smtClean="0"/>
-              <a:t>Why symmetric p’s and q’s</a:t>
-            </a:r>
-            <a:endParaRPr lang="en-US" dirty="0" smtClean="0"/>
-          </a:p>
-          <a:p>
-            <a:endParaRPr lang="en-US" dirty="0"/>
+            <a:endParaRPr lang="en-US"/>
           </a:p>
         </p:txBody>
       </p:sp>
     </p:spTree>
     <p:extLst>
       <p:ext uri="{BB962C8B-B14F-4D97-AF65-F5344CB8AC3E}">
-        <p14:creationId xmlns:p14="http://schemas.microsoft.com/office/powerpoint/2010/main" val="1288403930"/>
+        <p14:creationId xmlns:p14="http://schemas.microsoft.com/office/powerpoint/2010/main" val="1889581618"/>
       </p:ext>
     </p:extLst>
   </p:cSld>
@@ -8244,7 +8412,7 @@
           <a:p>
             <a:r>
               <a:rPr lang="en-US" dirty="0" smtClean="0"/>
-              <a:t>What is it Actually Doing?</a:t>
+              <a:t>Comparison to Other Methods</a:t>
             </a:r>
             <a:endParaRPr lang="en-US" dirty="0"/>
           </a:p>
@@ -8272,82 +8440,7 @@
     </p:spTree>
     <p:extLst>
       <p:ext uri="{BB962C8B-B14F-4D97-AF65-F5344CB8AC3E}">
-        <p14:creationId xmlns:p14="http://schemas.microsoft.com/office/powerpoint/2010/main" val="338520810"/>
-      </p:ext>
-    </p:extLst>
-  </p:cSld>
-  <p:clrMapOvr>
-    <a:masterClrMapping/>
-  </p:clrMapOvr>
-</p:sld>
-</file>
-
-<file path=ppt/slides/slide9.xml><?xml version="1.0" encoding="utf-8"?>
-<p:sld xmlns:a="http://schemas.openxmlformats.org/drawingml/2006/main" xmlns:r="http://schemas.openxmlformats.org/officeDocument/2006/relationships" xmlns:p="http://schemas.openxmlformats.org/presentationml/2006/main">
-  <p:cSld>
-    <p:spTree>
-      <p:nvGrpSpPr>
-        <p:cNvPr id="1" name=""/>
-        <p:cNvGrpSpPr/>
-        <p:nvPr/>
-      </p:nvGrpSpPr>
-      <p:grpSpPr>
-        <a:xfrm>
-          <a:off x="0" y="0"/>
-          <a:ext cx="0" cy="0"/>
-          <a:chOff x="0" y="0"/>
-          <a:chExt cx="0" cy="0"/>
-        </a:xfrm>
-      </p:grpSpPr>
-      <p:sp>
-        <p:nvSpPr>
-          <p:cNvPr id="2" name="Title 1"/>
-          <p:cNvSpPr>
-            <a:spLocks noGrp="1"/>
-          </p:cNvSpPr>
-          <p:nvPr>
-            <p:ph type="title"/>
-          </p:nvPr>
-        </p:nvSpPr>
-        <p:spPr/>
-        <p:txBody>
-          <a:bodyPr/>
-          <a:lstStyle/>
-          <a:p>
-            <a:r>
-              <a:rPr lang="en-US" dirty="0" smtClean="0"/>
-              <a:t>Strengths/Pitfalls</a:t>
-            </a:r>
-            <a:br>
-              <a:rPr lang="en-US" dirty="0" smtClean="0"/>
-            </a:br>
-            <a:endParaRPr lang="en-US" dirty="0"/>
-          </a:p>
-        </p:txBody>
-      </p:sp>
-      <p:sp>
-        <p:nvSpPr>
-          <p:cNvPr id="3" name="Content Placeholder 2"/>
-          <p:cNvSpPr>
-            <a:spLocks noGrp="1"/>
-          </p:cNvSpPr>
-          <p:nvPr>
-            <p:ph idx="1"/>
-          </p:nvPr>
-        </p:nvSpPr>
-        <p:spPr/>
-        <p:txBody>
-          <a:bodyPr/>
-          <a:lstStyle/>
-          <a:p>
-            <a:endParaRPr lang="en-US"/>
-          </a:p>
-        </p:txBody>
-      </p:sp>
-    </p:spTree>
-    <p:extLst>
-      <p:ext uri="{BB962C8B-B14F-4D97-AF65-F5344CB8AC3E}">
-        <p14:creationId xmlns:p14="http://schemas.microsoft.com/office/powerpoint/2010/main" val="1889581618"/>
+        <p14:creationId xmlns:p14="http://schemas.microsoft.com/office/powerpoint/2010/main" val="1054989624"/>
       </p:ext>
     </p:extLst>
   </p:cSld>

</xml_diff>

<commit_message>
Cost and KL Divergence explained
</commit_message>
<xml_diff>
--- a/math465_tsne.pptx
+++ b/math465_tsne.pptx
@@ -212,7 +212,7 @@
           <a:p>
             <a:fld id="{7C493B00-4CFE-D641-9B4F-A26DEC7B257F}" type="datetimeFigureOut">
               <a:rPr lang="en-US" smtClean="0"/>
-              <a:t>11/27/16</a:t>
+              <a:t>11/28/16</a:t>
             </a:fld>
             <a:endParaRPr lang="en-US"/>
           </a:p>
@@ -675,13 +675,8 @@
             </a:r>
             <a:r>
               <a:rPr lang="en-US" baseline="0" dirty="0" smtClean="0"/>
-              <a:t> to </a:t>
-            </a:r>
-            <a:r>
-              <a:rPr lang="en-US" baseline="0" dirty="0" smtClean="0"/>
-              <a:t>make the gradient easier to compute</a:t>
-            </a:r>
-            <a:endParaRPr lang="en-US" baseline="0" dirty="0" smtClean="0"/>
+              <a:t> to make the gradient easier to compute</a:t>
+            </a:r>
           </a:p>
           <a:p>
             <a:endParaRPr lang="en-US" baseline="0" dirty="0" smtClean="0"/>
@@ -787,34 +782,21 @@
           <a:p>
             <a:r>
               <a:rPr lang="en-US" dirty="0" smtClean="0"/>
-              <a:t>In the case of TSNE, </a:t>
-            </a:r>
-            <a:r>
-              <a:rPr lang="en-US" dirty="0" smtClean="0"/>
-              <a:t>since </a:t>
+              <a:t>In the case of TSNE, since </a:t>
             </a:r>
             <a:r>
               <a:rPr lang="en-US" baseline="0" dirty="0" smtClean="0"/>
-              <a:t>local </a:t>
-            </a:r>
+              <a:t>local structure is preserved and prioritized, larger distances/more global structures can be distorted, specifically enlarged</a:t>
+            </a:r>
+          </a:p>
+          <a:p>
+            <a:endParaRPr lang="en-US" baseline="0" dirty="0" smtClean="0"/>
+          </a:p>
+          <a:p>
             <a:r>
               <a:rPr lang="en-US" baseline="0" dirty="0" smtClean="0"/>
-              <a:t>structure is preserved and prioritized, larger distances/more global structures can be distorted, specifically enlarged</a:t>
-            </a:r>
-          </a:p>
-          <a:p>
-            <a:endParaRPr lang="en-US" baseline="0" dirty="0" smtClean="0"/>
-          </a:p>
-          <a:p>
-            <a:r>
-              <a:rPr lang="en-US" baseline="0" dirty="0" smtClean="0"/>
-              <a:t>What that means is points that are not close in high dimensional space may be forced to be modeled farther from each other in low dimensions (recall the triangle of points </a:t>
-            </a:r>
-            <a:r>
-              <a:rPr lang="en-US" baseline="0" dirty="0" smtClean="0"/>
-              <a:t>demonstration and show that the p and q values create an attractive force on the farthest points in the mapped dimension) </a:t>
-            </a:r>
-            <a:endParaRPr lang="en-US" baseline="0" dirty="0" smtClean="0"/>
+              <a:t>What that means is points that are not close in high dimensional space may be forced to be modeled farther from each other in low dimensions (recall the triangle of points demonstration and show that the p and q values create an attractive force on the farthest points in the mapped dimension) </a:t>
+            </a:r>
           </a:p>
           <a:p>
             <a:endParaRPr lang="en-US" baseline="0" dirty="0" smtClean="0"/>
@@ -830,11 +812,7 @@
             </a:r>
             <a:r>
               <a:rPr lang="en-US" baseline="0" dirty="0" smtClean="0"/>
-              <a:t>, </a:t>
-            </a:r>
-            <a:r>
-              <a:rPr lang="en-US" baseline="0" dirty="0" smtClean="0"/>
-              <a:t>the p value (say 0.05) on the blue line represents a point moderately distant from the rest. In the mapped dimension, to get the q value that would incur no difference in the gradient, the point must be even more distant. This prevents the issue of crowding</a:t>
+              <a:t>, the p value (say 0.05) on the blue line represents a point moderately distant from the rest. In the mapped dimension, to get the q value that would incur no difference in the gradient, the point must be even more distant. This prevents the issue of crowding</a:t>
             </a:r>
             <a:endParaRPr lang="en-US" dirty="0"/>
           </a:p>
@@ -922,13 +900,70 @@
           <a:p>
             <a:r>
               <a:rPr lang="en-US" dirty="0" smtClean="0"/>
-              <a:t>Make sure to rehash the differences (symmetry and </a:t>
-            </a:r>
-            <a:r>
-              <a:rPr lang="en-US" smtClean="0"/>
-              <a:t>crowding problem)</a:t>
-            </a:r>
-            <a:endParaRPr lang="en-US"/>
+              <a:t>Ideally, if the probability</a:t>
+            </a:r>
+            <a:r>
+              <a:rPr lang="en-US" baseline="0" dirty="0" smtClean="0"/>
+              <a:t> distributions between pairs of points are the same between the high dimensional space and the low dimensional mapping, then they’re relative distances from each other are also equal. However, when embedding data, most of the time this does not happen and distances get distorted. Recall a triangle of points in the 2 plane forced onto a 1 dimensional plane.</a:t>
+            </a:r>
+          </a:p>
+          <a:p>
+            <a:endParaRPr lang="en-US" baseline="0" dirty="0" smtClean="0"/>
+          </a:p>
+          <a:p>
+            <a:r>
+              <a:rPr lang="en-US" baseline="0" dirty="0" smtClean="0"/>
+              <a:t>Therefore, need to assign a metric or way of judging how bad the current embedding is. Note the C equation. This computes the sum of all mapping errors between the original data set and the mapped points. Note that the equation has a very specific idea of what constitutes an erroneous mapping of points. It assigns very high degree of error to a pair of points that are modeled as “close neighbors” in high d but are not close in low dimensions. Vice versa, being modeled as close in low dimension but far away in high dimension does not introduce much error.</a:t>
+            </a:r>
+          </a:p>
+          <a:p>
+            <a:endParaRPr lang="en-US" baseline="0" dirty="0" smtClean="0"/>
+          </a:p>
+          <a:p>
+            <a:r>
+              <a:rPr lang="en-US" baseline="0" dirty="0" smtClean="0"/>
+              <a:t>Gradient descent is a computational method used to iteratively reach a system with lower value of some stated function, in this case cost. It is </a:t>
+            </a:r>
+            <a:r>
+              <a:rPr lang="en-US" baseline="0" dirty="0" err="1" smtClean="0"/>
+              <a:t>analagous</a:t>
+            </a:r>
+            <a:r>
+              <a:rPr lang="en-US" baseline="0" dirty="0" smtClean="0"/>
+              <a:t> to a ball roll down the hill to reach a state of lower potential energy. In this case, our potential energy is C (cost) or the overall mistake in our mapping. The gradient descent will wiggle each of the mapping points in the direction that specifies a negative </a:t>
+            </a:r>
+            <a:r>
+              <a:rPr lang="en-US" baseline="0" dirty="0" err="1" smtClean="0"/>
+              <a:t>dC</a:t>
+            </a:r>
+            <a:r>
+              <a:rPr lang="en-US" baseline="0" dirty="0" smtClean="0"/>
+              <a:t>/</a:t>
+            </a:r>
+            <a:r>
+              <a:rPr lang="en-US" baseline="0" dirty="0" err="1" smtClean="0"/>
+              <a:t>dy</a:t>
+            </a:r>
+            <a:r>
+              <a:rPr lang="en-US" baseline="0" dirty="0" smtClean="0"/>
+              <a:t> in order to maximally reduce the cost function with respect to that point. Doing that repeatedly for each point until the overall mapping has reached a </a:t>
+            </a:r>
+            <a:r>
+              <a:rPr lang="en-US" baseline="0" smtClean="0"/>
+              <a:t>minimum state of cost.</a:t>
+            </a:r>
+          </a:p>
+          <a:p>
+            <a:endParaRPr lang="en-US" baseline="0" smtClean="0"/>
+          </a:p>
+          <a:p>
+            <a:endParaRPr lang="en-US" baseline="0" dirty="0" smtClean="0"/>
+          </a:p>
+          <a:p>
+            <a:endParaRPr lang="en-US" baseline="0" dirty="0" smtClean="0"/>
+          </a:p>
+          <a:p>
+            <a:endParaRPr lang="en-US" dirty="0"/>
           </a:p>
         </p:txBody>
       </p:sp>
@@ -1099,7 +1134,7 @@
           <a:p>
             <a:fld id="{FD923A10-4E68-FC41-8991-4436E033DC86}" type="datetimeFigureOut">
               <a:rPr lang="en-US" smtClean="0"/>
-              <a:t>11/27/16</a:t>
+              <a:t>11/28/16</a:t>
             </a:fld>
             <a:endParaRPr lang="en-US"/>
           </a:p>
@@ -1269,7 +1304,7 @@
           <a:p>
             <a:fld id="{FD923A10-4E68-FC41-8991-4436E033DC86}" type="datetimeFigureOut">
               <a:rPr lang="en-US" smtClean="0"/>
-              <a:t>11/27/16</a:t>
+              <a:t>11/28/16</a:t>
             </a:fld>
             <a:endParaRPr lang="en-US"/>
           </a:p>
@@ -1449,7 +1484,7 @@
           <a:p>
             <a:fld id="{FD923A10-4E68-FC41-8991-4436E033DC86}" type="datetimeFigureOut">
               <a:rPr lang="en-US" smtClean="0"/>
-              <a:t>11/27/16</a:t>
+              <a:t>11/28/16</a:t>
             </a:fld>
             <a:endParaRPr lang="en-US"/>
           </a:p>
@@ -1619,7 +1654,7 @@
           <a:p>
             <a:fld id="{FD923A10-4E68-FC41-8991-4436E033DC86}" type="datetimeFigureOut">
               <a:rPr lang="en-US" smtClean="0"/>
-              <a:t>11/27/16</a:t>
+              <a:t>11/28/16</a:t>
             </a:fld>
             <a:endParaRPr lang="en-US"/>
           </a:p>
@@ -1865,7 +1900,7 @@
           <a:p>
             <a:fld id="{FD923A10-4E68-FC41-8991-4436E033DC86}" type="datetimeFigureOut">
               <a:rPr lang="en-US" smtClean="0"/>
-              <a:t>11/27/16</a:t>
+              <a:t>11/28/16</a:t>
             </a:fld>
             <a:endParaRPr lang="en-US"/>
           </a:p>
@@ -2097,7 +2132,7 @@
           <a:p>
             <a:fld id="{FD923A10-4E68-FC41-8991-4436E033DC86}" type="datetimeFigureOut">
               <a:rPr lang="en-US" smtClean="0"/>
-              <a:t>11/27/16</a:t>
+              <a:t>11/28/16</a:t>
             </a:fld>
             <a:endParaRPr lang="en-US"/>
           </a:p>
@@ -2464,7 +2499,7 @@
           <a:p>
             <a:fld id="{FD923A10-4E68-FC41-8991-4436E033DC86}" type="datetimeFigureOut">
               <a:rPr lang="en-US" smtClean="0"/>
-              <a:t>11/27/16</a:t>
+              <a:t>11/28/16</a:t>
             </a:fld>
             <a:endParaRPr lang="en-US"/>
           </a:p>
@@ -2582,7 +2617,7 @@
           <a:p>
             <a:fld id="{FD923A10-4E68-FC41-8991-4436E033DC86}" type="datetimeFigureOut">
               <a:rPr lang="en-US" smtClean="0"/>
-              <a:t>11/27/16</a:t>
+              <a:t>11/28/16</a:t>
             </a:fld>
             <a:endParaRPr lang="en-US"/>
           </a:p>
@@ -2677,7 +2712,7 @@
           <a:p>
             <a:fld id="{FD923A10-4E68-FC41-8991-4436E033DC86}" type="datetimeFigureOut">
               <a:rPr lang="en-US" smtClean="0"/>
-              <a:t>11/27/16</a:t>
+              <a:t>11/28/16</a:t>
             </a:fld>
             <a:endParaRPr lang="en-US"/>
           </a:p>
@@ -2954,7 +2989,7 @@
           <a:p>
             <a:fld id="{FD923A10-4E68-FC41-8991-4436E033DC86}" type="datetimeFigureOut">
               <a:rPr lang="en-US" smtClean="0"/>
-              <a:t>11/27/16</a:t>
+              <a:t>11/28/16</a:t>
             </a:fld>
             <a:endParaRPr lang="en-US"/>
           </a:p>
@@ -3207,7 +3242,7 @@
           <a:p>
             <a:fld id="{FD923A10-4E68-FC41-8991-4436E033DC86}" type="datetimeFigureOut">
               <a:rPr lang="en-US" smtClean="0"/>
-              <a:t>11/27/16</a:t>
+              <a:t>11/28/16</a:t>
             </a:fld>
             <a:endParaRPr lang="en-US"/>
           </a:p>
@@ -3420,7 +3455,7 @@
           <a:p>
             <a:fld id="{FD923A10-4E68-FC41-8991-4436E033DC86}" type="datetimeFigureOut">
               <a:rPr lang="en-US" smtClean="0"/>
-              <a:t>11/27/16</a:t>
+              <a:t>11/28/16</a:t>
             </a:fld>
             <a:endParaRPr lang="en-US"/>
           </a:p>
@@ -3981,8 +4016,8 @@
           </a:p>
         </p:txBody>
       </p:sp>
-      <mc:AlternateContent xmlns:mc="http://schemas.openxmlformats.org/markup-compatibility/2006">
-        <mc:Choice xmlns:a14="http://schemas.microsoft.com/office/drawing/2010/main" Requires="a14">
+      <mc:AlternateContent xmlns:mc="http://schemas.openxmlformats.org/markup-compatibility/2006" xmlns:a14="http://schemas.microsoft.com/office/drawing/2010/main">
+        <mc:Choice Requires="a14">
           <p:sp>
             <p:nvSpPr>
               <p:cNvPr id="3" name="Content Placeholder 2"/>
@@ -4254,7 +4289,7 @@
             </p:txBody>
           </p:sp>
         </mc:Choice>
-        <mc:Fallback>
+        <mc:Fallback xmlns="">
           <p:sp>
             <p:nvSpPr>
               <p:cNvPr id="3" name="Content Placeholder 2"/>
@@ -8025,7 +8060,7 @@
                           <a:rPr lang="en-US" b="0" i="1" smtClean="0">
                             <a:latin typeface="Cambria Math" charset="0"/>
                           </a:rPr>
-                          <m:t>𝑗</m:t>
+                          <m:t>𝑖</m:t>
                         </m:r>
                         <m:r>
                           <a:rPr lang="en-US" b="0" i="1" smtClean="0">
@@ -8037,7 +8072,7 @@
                           <a:rPr lang="en-US" b="0" i="1" smtClean="0">
                             <a:latin typeface="Cambria Math" charset="0"/>
                           </a:rPr>
-                          <m:t>𝑖</m:t>
+                          <m:t>𝑗</m:t>
                         </m:r>
                       </m:sub>
                     </m:sSub>
@@ -8252,44 +8287,1059 @@
           <a:p>
             <a:r>
               <a:rPr lang="en-US" dirty="0" smtClean="0"/>
-              <a:t>Cost function – K-L divergence</a:t>
+              <a:t>The Cost of the Mapping</a:t>
             </a:r>
             <a:endParaRPr lang="en-US" dirty="0"/>
           </a:p>
         </p:txBody>
       </p:sp>
-      <p:sp>
-        <p:nvSpPr>
-          <p:cNvPr id="3" name="Content Placeholder 2"/>
-          <p:cNvSpPr>
-            <a:spLocks noGrp="1"/>
-          </p:cNvSpPr>
-          <p:nvPr>
-            <p:ph idx="1"/>
-          </p:nvPr>
-        </p:nvSpPr>
-        <p:spPr/>
-        <p:txBody>
-          <a:bodyPr/>
-          <a:lstStyle/>
-          <a:p>
-            <a:r>
-              <a:rPr lang="en-US" dirty="0" smtClean="0"/>
-              <a:t>Minimize “distance” between two distributions</a:t>
-            </a:r>
-          </a:p>
-          <a:p>
-            <a:endParaRPr lang="en-US" dirty="0"/>
-          </a:p>
-          <a:p>
-            <a:r>
-              <a:rPr lang="en-US" dirty="0" smtClean="0"/>
-              <a:t>Choice of P and Q allows for large distances to be weighted less</a:t>
-            </a:r>
-            <a:endParaRPr lang="en-US" dirty="0"/>
-          </a:p>
-        </p:txBody>
-      </p:sp>
+      <mc:AlternateContent xmlns:mc="http://schemas.openxmlformats.org/markup-compatibility/2006">
+        <mc:Choice xmlns:a14="http://schemas.microsoft.com/office/drawing/2010/main" Requires="a14">
+          <p:sp>
+            <p:nvSpPr>
+              <p:cNvPr id="4" name="Content Placeholder 3"/>
+              <p:cNvSpPr>
+                <a:spLocks noGrp="1"/>
+              </p:cNvSpPr>
+              <p:nvPr>
+                <p:ph idx="1"/>
+              </p:nvPr>
+            </p:nvSpPr>
+            <p:spPr/>
+            <p:txBody>
+              <a:bodyPr>
+                <a:normAutofit fontScale="70000" lnSpcReduction="20000"/>
+              </a:bodyPr>
+              <a:lstStyle/>
+              <a:p>
+                <a:pPr marL="0" marR="0" lvl="0" indent="0" defTabSz="914400" eaLnBrk="1" fontAlgn="auto" latinLnBrk="0" hangingPunct="1">
+                  <a:lnSpc>
+                    <a:spcPct val="100000"/>
+                  </a:lnSpc>
+                  <a:spcBef>
+                    <a:spcPts val="0"/>
+                  </a:spcBef>
+                  <a:spcAft>
+                    <a:spcPts val="0"/>
+                  </a:spcAft>
+                  <a:buClrTx/>
+                  <a:buSzTx/>
+                  <a:buFontTx/>
+                  <a:buNone/>
+                  <a:tabLst/>
+                  <a:defRPr/>
+                </a:pPr>
+                <a:r>
+                  <a:rPr lang="en-US" dirty="0" smtClean="0"/>
+                  <a:t>In an ideal world:</a:t>
+                </a:r>
+              </a:p>
+              <a:p>
+                <a:pPr marL="0" marR="0" lvl="0" indent="0" defTabSz="914400" eaLnBrk="1" fontAlgn="auto" latinLnBrk="0" hangingPunct="1">
+                  <a:lnSpc>
+                    <a:spcPct val="100000"/>
+                  </a:lnSpc>
+                  <a:spcBef>
+                    <a:spcPts val="0"/>
+                  </a:spcBef>
+                  <a:spcAft>
+                    <a:spcPts val="0"/>
+                  </a:spcAft>
+                  <a:buClrTx/>
+                  <a:buSzTx/>
+                  <a:buFontTx/>
+                  <a:buNone/>
+                  <a:tabLst/>
+                  <a:defRPr/>
+                </a:pPr>
+                <a:endParaRPr lang="en-US" dirty="0"/>
+              </a:p>
+              <a:p>
+                <a:pPr marL="0" marR="0" lvl="0" indent="0" algn="ctr" defTabSz="914400" eaLnBrk="1" fontAlgn="auto" latinLnBrk="0" hangingPunct="1">
+                  <a:lnSpc>
+                    <a:spcPct val="100000"/>
+                  </a:lnSpc>
+                  <a:spcBef>
+                    <a:spcPts val="0"/>
+                  </a:spcBef>
+                  <a:spcAft>
+                    <a:spcPts val="0"/>
+                  </a:spcAft>
+                  <a:buClrTx/>
+                  <a:buSzTx/>
+                  <a:buFontTx/>
+                  <a:buNone/>
+                  <a:tabLst/>
+                  <a:defRPr/>
+                </a:pPr>
+                <a14:m>
+                  <m:oMath xmlns:m="http://schemas.openxmlformats.org/officeDocument/2006/math">
+                    <m:sSub>
+                      <m:sSubPr>
+                        <m:ctrlPr>
+                          <a:rPr lang="en-US" b="0" i="1" smtClean="0">
+                            <a:latin typeface="Cambria Math" charset="0"/>
+                          </a:rPr>
+                        </m:ctrlPr>
+                      </m:sSubPr>
+                      <m:e>
+                        <m:r>
+                          <a:rPr lang="en-US" b="0" i="1" smtClean="0">
+                            <a:latin typeface="Cambria Math" charset="0"/>
+                          </a:rPr>
+                          <m:t>𝑝</m:t>
+                        </m:r>
+                      </m:e>
+                      <m:sub>
+                        <m:r>
+                          <a:rPr lang="en-US" b="0" i="1" smtClean="0">
+                            <a:latin typeface="Cambria Math" charset="0"/>
+                          </a:rPr>
+                          <m:t>𝑖𝑗</m:t>
+                        </m:r>
+                      </m:sub>
+                    </m:sSub>
+                    <m:r>
+                      <a:rPr lang="en-US" b="0" i="1" smtClean="0">
+                        <a:latin typeface="Cambria Math" charset="0"/>
+                      </a:rPr>
+                      <m:t>=</m:t>
+                    </m:r>
+                    <m:sSub>
+                      <m:sSubPr>
+                        <m:ctrlPr>
+                          <a:rPr lang="en-US" b="0" i="1" smtClean="0">
+                            <a:latin typeface="Cambria Math" charset="0"/>
+                          </a:rPr>
+                        </m:ctrlPr>
+                      </m:sSubPr>
+                      <m:e>
+                        <m:r>
+                          <a:rPr lang="en-US" b="0" i="1" smtClean="0">
+                            <a:latin typeface="Cambria Math" charset="0"/>
+                          </a:rPr>
+                          <m:t>𝑞</m:t>
+                        </m:r>
+                      </m:e>
+                      <m:sub>
+                        <m:r>
+                          <a:rPr lang="en-US" b="0" i="1" smtClean="0">
+                            <a:latin typeface="Cambria Math" charset="0"/>
+                          </a:rPr>
+                          <m:t>𝑖𝑗</m:t>
+                        </m:r>
+                      </m:sub>
+                    </m:sSub>
+                    <m:r>
+                      <a:rPr lang="en-US" b="0" i="1" smtClean="0">
+                        <a:latin typeface="Cambria Math" charset="0"/>
+                      </a:rPr>
+                      <m:t> ∀</m:t>
+                    </m:r>
+                    <m:r>
+                      <a:rPr lang="en-US" b="0" i="1" smtClean="0">
+                        <a:latin typeface="Cambria Math" charset="0"/>
+                      </a:rPr>
+                      <m:t>𝑖</m:t>
+                    </m:r>
+                    <m:r>
+                      <a:rPr lang="en-US" b="0" i="1" smtClean="0">
+                        <a:latin typeface="Cambria Math" charset="0"/>
+                      </a:rPr>
+                      <m:t>, </m:t>
+                    </m:r>
+                    <m:r>
+                      <a:rPr lang="en-US" b="0" i="1" smtClean="0">
+                        <a:latin typeface="Cambria Math" charset="0"/>
+                      </a:rPr>
+                      <m:t>𝑗</m:t>
+                    </m:r>
+                  </m:oMath>
+                </a14:m>
+                <a:r>
+                  <a:rPr lang="en-US" dirty="0" smtClean="0"/>
+                  <a:t>  (i.e. a perfect mapping)</a:t>
+                </a:r>
+              </a:p>
+              <a:p>
+                <a:pPr marL="0" marR="0" lvl="0" indent="0" defTabSz="914400" eaLnBrk="1" fontAlgn="auto" latinLnBrk="0" hangingPunct="1">
+                  <a:lnSpc>
+                    <a:spcPct val="100000"/>
+                  </a:lnSpc>
+                  <a:spcBef>
+                    <a:spcPts val="0"/>
+                  </a:spcBef>
+                  <a:spcAft>
+                    <a:spcPts val="0"/>
+                  </a:spcAft>
+                  <a:buClrTx/>
+                  <a:buSzTx/>
+                  <a:buFontTx/>
+                  <a:buNone/>
+                  <a:tabLst/>
+                  <a:defRPr/>
+                </a:pPr>
+                <a:endParaRPr lang="en-US" dirty="0"/>
+              </a:p>
+              <a:p>
+                <a:pPr marL="0" marR="0" lvl="0" indent="0" defTabSz="914400" eaLnBrk="1" fontAlgn="auto" latinLnBrk="0" hangingPunct="1">
+                  <a:lnSpc>
+                    <a:spcPct val="100000"/>
+                  </a:lnSpc>
+                  <a:spcBef>
+                    <a:spcPts val="0"/>
+                  </a:spcBef>
+                  <a:spcAft>
+                    <a:spcPts val="0"/>
+                  </a:spcAft>
+                  <a:buClrTx/>
+                  <a:buSzTx/>
+                  <a:buFontTx/>
+                  <a:buNone/>
+                  <a:tabLst/>
+                  <a:defRPr/>
+                </a:pPr>
+                <a:r>
+                  <a:rPr lang="en-US" dirty="0" smtClean="0"/>
+                  <a:t>Realistically, need to minimize the difference between </a:t>
+                </a:r>
+                <a14:m>
+                  <m:oMath xmlns:m="http://schemas.openxmlformats.org/officeDocument/2006/math">
+                    <m:sSub>
+                      <m:sSubPr>
+                        <m:ctrlPr>
+                          <a:rPr lang="en-US" b="0" i="1" smtClean="0">
+                            <a:latin typeface="Cambria Math" charset="0"/>
+                          </a:rPr>
+                        </m:ctrlPr>
+                      </m:sSubPr>
+                      <m:e>
+                        <m:r>
+                          <a:rPr lang="en-US" b="0" i="1" smtClean="0">
+                            <a:latin typeface="Cambria Math" charset="0"/>
+                          </a:rPr>
+                          <m:t>𝑝</m:t>
+                        </m:r>
+                      </m:e>
+                      <m:sub>
+                        <m:r>
+                          <a:rPr lang="en-US" b="0" i="1" smtClean="0">
+                            <a:latin typeface="Cambria Math" charset="0"/>
+                          </a:rPr>
+                          <m:t>𝑖𝑗</m:t>
+                        </m:r>
+                      </m:sub>
+                    </m:sSub>
+                  </m:oMath>
+                </a14:m>
+                <a:r>
+                  <a:rPr lang="en-US" dirty="0" smtClean="0"/>
+                  <a:t> and </a:t>
+                </a:r>
+                <a14:m>
+                  <m:oMath xmlns:m="http://schemas.openxmlformats.org/officeDocument/2006/math">
+                    <m:sSub>
+                      <m:sSubPr>
+                        <m:ctrlPr>
+                          <a:rPr lang="en-US" b="0" i="1" smtClean="0">
+                            <a:latin typeface="Cambria Math" charset="0"/>
+                          </a:rPr>
+                        </m:ctrlPr>
+                      </m:sSubPr>
+                      <m:e>
+                        <m:r>
+                          <a:rPr lang="en-US" b="0" i="1" smtClean="0">
+                            <a:latin typeface="Cambria Math" charset="0"/>
+                          </a:rPr>
+                          <m:t>𝑞</m:t>
+                        </m:r>
+                      </m:e>
+                      <m:sub>
+                        <m:r>
+                          <a:rPr lang="en-US" b="0" i="1" smtClean="0">
+                            <a:latin typeface="Cambria Math" charset="0"/>
+                          </a:rPr>
+                          <m:t>𝑖𝑗</m:t>
+                        </m:r>
+                      </m:sub>
+                    </m:sSub>
+                  </m:oMath>
+                </a14:m>
+                <a:r>
+                  <a:rPr lang="en-US" dirty="0" smtClean="0"/>
+                  <a:t>:</a:t>
+                </a:r>
+              </a:p>
+              <a:p>
+                <a:pPr marL="0" marR="0" lvl="0" indent="0" defTabSz="914400" eaLnBrk="1" fontAlgn="auto" latinLnBrk="0" hangingPunct="1">
+                  <a:lnSpc>
+                    <a:spcPct val="100000"/>
+                  </a:lnSpc>
+                  <a:spcBef>
+                    <a:spcPts val="0"/>
+                  </a:spcBef>
+                  <a:spcAft>
+                    <a:spcPts val="0"/>
+                  </a:spcAft>
+                  <a:buClrTx/>
+                  <a:buSzTx/>
+                  <a:buFontTx/>
+                  <a:buNone/>
+                  <a:tabLst/>
+                  <a:defRPr/>
+                </a:pPr>
+                <a:endParaRPr lang="en-US" dirty="0"/>
+              </a:p>
+              <a:p>
+                <a:pPr marL="0" marR="0" lvl="0" indent="0" algn="ctr" defTabSz="914400" eaLnBrk="1" fontAlgn="auto" latinLnBrk="0" hangingPunct="1">
+                  <a:lnSpc>
+                    <a:spcPct val="100000"/>
+                  </a:lnSpc>
+                  <a:spcBef>
+                    <a:spcPts val="0"/>
+                  </a:spcBef>
+                  <a:spcAft>
+                    <a:spcPts val="0"/>
+                  </a:spcAft>
+                  <a:buClrTx/>
+                  <a:buSzTx/>
+                  <a:buFontTx/>
+                  <a:buNone/>
+                  <a:tabLst/>
+                  <a:defRPr/>
+                </a:pPr>
+                <a14:m>
+                  <m:oMathPara xmlns:m="http://schemas.openxmlformats.org/officeDocument/2006/math">
+                    <m:oMathParaPr>
+                      <m:jc m:val="centerGroup"/>
+                    </m:oMathParaPr>
+                    <m:oMath xmlns:m="http://schemas.openxmlformats.org/officeDocument/2006/math">
+                      <m:r>
+                        <a:rPr lang="en-US" b="0" i="1" smtClean="0">
+                          <a:latin typeface="Cambria Math" charset="0"/>
+                        </a:rPr>
+                        <m:t>𝐶</m:t>
+                      </m:r>
+                      <m:r>
+                        <a:rPr lang="en-US" b="0" i="1" smtClean="0">
+                          <a:latin typeface="Cambria Math" charset="0"/>
+                        </a:rPr>
+                        <m:t>=</m:t>
+                      </m:r>
+                      <m:r>
+                        <a:rPr lang="en-US" b="0" i="1" smtClean="0">
+                          <a:latin typeface="Cambria Math" charset="0"/>
+                        </a:rPr>
+                        <m:t>𝐾𝐿</m:t>
+                      </m:r>
+                      <m:r>
+                        <a:rPr lang="en-US" b="0" i="1" smtClean="0">
+                          <a:latin typeface="Cambria Math" charset="0"/>
+                        </a:rPr>
+                        <m:t>(</m:t>
+                      </m:r>
+                      <m:r>
+                        <a:rPr lang="en-US" b="0" i="1" smtClean="0">
+                          <a:latin typeface="Cambria Math" charset="0"/>
+                        </a:rPr>
+                        <m:t>𝑃</m:t>
+                      </m:r>
+                      <m:r>
+                        <a:rPr lang="en-US" b="0" i="1" smtClean="0">
+                          <a:latin typeface="Cambria Math" charset="0"/>
+                        </a:rPr>
+                        <m:t>|</m:t>
+                      </m:r>
+                      <m:d>
+                        <m:dPr>
+                          <m:begChr m:val="|"/>
+                          <m:ctrlPr>
+                            <a:rPr lang="en-US" b="0" i="1" smtClean="0">
+                              <a:latin typeface="Cambria Math" charset="0"/>
+                            </a:rPr>
+                          </m:ctrlPr>
+                        </m:dPr>
+                        <m:e>
+                          <m:r>
+                            <a:rPr lang="en-US" b="0" i="1" smtClean="0">
+                              <a:latin typeface="Cambria Math" charset="0"/>
+                            </a:rPr>
+                            <m:t>𝑄</m:t>
+                          </m:r>
+                        </m:e>
+                      </m:d>
+                      <m:r>
+                        <a:rPr lang="en-US" b="0" i="1" smtClean="0">
+                          <a:latin typeface="Cambria Math" charset="0"/>
+                        </a:rPr>
+                        <m:t>=</m:t>
+                      </m:r>
+                      <m:nary>
+                        <m:naryPr>
+                          <m:chr m:val="∑"/>
+                          <m:supHide m:val="on"/>
+                          <m:ctrlPr>
+                            <a:rPr lang="en-US" b="0" i="1" smtClean="0">
+                              <a:latin typeface="Cambria Math" charset="0"/>
+                            </a:rPr>
+                          </m:ctrlPr>
+                        </m:naryPr>
+                        <m:sub>
+                          <m:r>
+                            <a:rPr lang="en-US" b="0" i="1" smtClean="0">
+                              <a:latin typeface="Cambria Math" charset="0"/>
+                            </a:rPr>
+                            <m:t>𝑖</m:t>
+                          </m:r>
+                        </m:sub>
+                        <m:sup/>
+                        <m:e>
+                          <m:nary>
+                            <m:naryPr>
+                              <m:chr m:val="∑"/>
+                              <m:supHide m:val="on"/>
+                              <m:ctrlPr>
+                                <a:rPr lang="en-US" b="0" i="1" smtClean="0">
+                                  <a:latin typeface="Cambria Math" charset="0"/>
+                                </a:rPr>
+                              </m:ctrlPr>
+                            </m:naryPr>
+                            <m:sub>
+                              <m:r>
+                                <a:rPr lang="en-US" b="0" i="1" smtClean="0">
+                                  <a:latin typeface="Cambria Math" charset="0"/>
+                                </a:rPr>
+                                <m:t>𝑗</m:t>
+                              </m:r>
+                            </m:sub>
+                            <m:sup/>
+                            <m:e>
+                              <m:sSub>
+                                <m:sSubPr>
+                                  <m:ctrlPr>
+                                    <a:rPr lang="en-US" b="0" i="1" smtClean="0">
+                                      <a:latin typeface="Cambria Math" charset="0"/>
+                                    </a:rPr>
+                                  </m:ctrlPr>
+                                </m:sSubPr>
+                                <m:e>
+                                  <m:r>
+                                    <a:rPr lang="en-US" b="0" i="1" smtClean="0">
+                                      <a:latin typeface="Cambria Math" charset="0"/>
+                                    </a:rPr>
+                                    <m:t>𝑝</m:t>
+                                  </m:r>
+                                </m:e>
+                                <m:sub>
+                                  <m:r>
+                                    <a:rPr lang="en-US" b="0" i="1" smtClean="0">
+                                      <a:latin typeface="Cambria Math" charset="0"/>
+                                    </a:rPr>
+                                    <m:t>𝑖𝑗</m:t>
+                                  </m:r>
+                                </m:sub>
+                              </m:sSub>
+                              <m:func>
+                                <m:funcPr>
+                                  <m:ctrlPr>
+                                    <a:rPr lang="en-US" b="0" i="1" smtClean="0">
+                                      <a:latin typeface="Cambria Math" charset="0"/>
+                                    </a:rPr>
+                                  </m:ctrlPr>
+                                </m:funcPr>
+                                <m:fName>
+                                  <m:r>
+                                    <m:rPr>
+                                      <m:sty m:val="p"/>
+                                    </m:rPr>
+                                    <a:rPr lang="en-US" b="0" i="0" smtClean="0">
+                                      <a:latin typeface="Cambria Math" charset="0"/>
+                                    </a:rPr>
+                                    <m:t>log</m:t>
+                                  </m:r>
+                                </m:fName>
+                                <m:e>
+                                  <m:f>
+                                    <m:fPr>
+                                      <m:ctrlPr>
+                                        <a:rPr lang="en-US" b="0" i="1" smtClean="0">
+                                          <a:latin typeface="Cambria Math" charset="0"/>
+                                        </a:rPr>
+                                      </m:ctrlPr>
+                                    </m:fPr>
+                                    <m:num>
+                                      <m:sSub>
+                                        <m:sSubPr>
+                                          <m:ctrlPr>
+                                            <a:rPr lang="en-US" b="0" i="1" smtClean="0">
+                                              <a:latin typeface="Cambria Math" charset="0"/>
+                                            </a:rPr>
+                                          </m:ctrlPr>
+                                        </m:sSubPr>
+                                        <m:e>
+                                          <m:r>
+                                            <a:rPr lang="en-US" b="0" i="1" smtClean="0">
+                                              <a:latin typeface="Cambria Math" charset="0"/>
+                                            </a:rPr>
+                                            <m:t>𝑝</m:t>
+                                          </m:r>
+                                        </m:e>
+                                        <m:sub>
+                                          <m:r>
+                                            <a:rPr lang="en-US" b="0" i="1" smtClean="0">
+                                              <a:latin typeface="Cambria Math" charset="0"/>
+                                            </a:rPr>
+                                            <m:t>𝑖𝑗</m:t>
+                                          </m:r>
+                                        </m:sub>
+                                      </m:sSub>
+                                    </m:num>
+                                    <m:den>
+                                      <m:sSub>
+                                        <m:sSubPr>
+                                          <m:ctrlPr>
+                                            <a:rPr lang="en-US" b="0" i="1" smtClean="0">
+                                              <a:latin typeface="Cambria Math" charset="0"/>
+                                            </a:rPr>
+                                          </m:ctrlPr>
+                                        </m:sSubPr>
+                                        <m:e>
+                                          <m:r>
+                                            <a:rPr lang="en-US" b="0" i="1" smtClean="0">
+                                              <a:latin typeface="Cambria Math" charset="0"/>
+                                            </a:rPr>
+                                            <m:t>𝑞</m:t>
+                                          </m:r>
+                                        </m:e>
+                                        <m:sub>
+                                          <m:r>
+                                            <a:rPr lang="en-US" b="0" i="1" smtClean="0">
+                                              <a:latin typeface="Cambria Math" charset="0"/>
+                                            </a:rPr>
+                                            <m:t>𝑖𝑗</m:t>
+                                          </m:r>
+                                        </m:sub>
+                                      </m:sSub>
+                                    </m:den>
+                                  </m:f>
+                                </m:e>
+                              </m:func>
+                            </m:e>
+                          </m:nary>
+                        </m:e>
+                      </m:nary>
+                    </m:oMath>
+                  </m:oMathPara>
+                </a14:m>
+                <a:endParaRPr lang="en-US" dirty="0" smtClean="0"/>
+              </a:p>
+              <a:p>
+                <a:pPr marL="0" marR="0" lvl="0" indent="0" algn="ctr" defTabSz="914400" eaLnBrk="1" fontAlgn="auto" latinLnBrk="0" hangingPunct="1">
+                  <a:lnSpc>
+                    <a:spcPct val="100000"/>
+                  </a:lnSpc>
+                  <a:spcBef>
+                    <a:spcPts val="0"/>
+                  </a:spcBef>
+                  <a:spcAft>
+                    <a:spcPts val="0"/>
+                  </a:spcAft>
+                  <a:buClrTx/>
+                  <a:buSzTx/>
+                  <a:buFontTx/>
+                  <a:buNone/>
+                  <a:tabLst/>
+                  <a:defRPr/>
+                </a:pPr>
+                <a:endParaRPr lang="en-US" dirty="0" smtClean="0"/>
+              </a:p>
+              <a:p>
+                <a:pPr marL="0" marR="0" lvl="0" indent="0" defTabSz="914400" eaLnBrk="1" fontAlgn="auto" latinLnBrk="0" hangingPunct="1">
+                  <a:lnSpc>
+                    <a:spcPct val="100000"/>
+                  </a:lnSpc>
+                  <a:spcBef>
+                    <a:spcPts val="0"/>
+                  </a:spcBef>
+                  <a:spcAft>
+                    <a:spcPts val="0"/>
+                  </a:spcAft>
+                  <a:buClrTx/>
+                  <a:buSzTx/>
+                  <a:buFontTx/>
+                  <a:buNone/>
+                  <a:tabLst/>
+                  <a:defRPr/>
+                </a:pPr>
+                <a:r>
+                  <a:rPr lang="en-US" dirty="0" smtClean="0"/>
+                  <a:t>By performing gradient descent:</a:t>
+                </a:r>
+              </a:p>
+              <a:p>
+                <a:pPr marL="0" marR="0" lvl="0" indent="0" defTabSz="914400" eaLnBrk="1" fontAlgn="auto" latinLnBrk="0" hangingPunct="1">
+                  <a:lnSpc>
+                    <a:spcPct val="100000"/>
+                  </a:lnSpc>
+                  <a:spcBef>
+                    <a:spcPts val="0"/>
+                  </a:spcBef>
+                  <a:spcAft>
+                    <a:spcPts val="0"/>
+                  </a:spcAft>
+                  <a:buClrTx/>
+                  <a:buSzTx/>
+                  <a:buFontTx/>
+                  <a:buNone/>
+                  <a:tabLst/>
+                  <a:defRPr/>
+                </a:pPr>
+                <a:endParaRPr lang="en-US" dirty="0"/>
+              </a:p>
+              <a:p>
+                <a:pPr marL="0" marR="0" lvl="0" indent="0" algn="ctr" defTabSz="914400" eaLnBrk="1" fontAlgn="auto" latinLnBrk="0" hangingPunct="1">
+                  <a:lnSpc>
+                    <a:spcPct val="100000"/>
+                  </a:lnSpc>
+                  <a:spcBef>
+                    <a:spcPts val="0"/>
+                  </a:spcBef>
+                  <a:spcAft>
+                    <a:spcPts val="0"/>
+                  </a:spcAft>
+                  <a:buClrTx/>
+                  <a:buSzTx/>
+                  <a:buFontTx/>
+                  <a:buNone/>
+                  <a:tabLst/>
+                  <a:defRPr/>
+                </a:pPr>
+                <a14:m>
+                  <m:oMathPara xmlns:m="http://schemas.openxmlformats.org/officeDocument/2006/math">
+                    <m:oMathParaPr>
+                      <m:jc m:val="centerGroup"/>
+                    </m:oMathParaPr>
+                    <m:oMath xmlns:m="http://schemas.openxmlformats.org/officeDocument/2006/math">
+                      <m:f>
+                        <m:fPr>
+                          <m:ctrlPr>
+                            <a:rPr lang="en-US" b="0" i="1" smtClean="0">
+                              <a:latin typeface="Cambria Math" charset="0"/>
+                            </a:rPr>
+                          </m:ctrlPr>
+                        </m:fPr>
+                        <m:num>
+                          <m:r>
+                            <a:rPr lang="en-US" b="0" i="1" smtClean="0">
+                              <a:latin typeface="Cambria Math" charset="0"/>
+                            </a:rPr>
+                            <m:t>𝛿</m:t>
+                          </m:r>
+                          <m:r>
+                            <a:rPr lang="en-US" b="0" i="1" smtClean="0">
+                              <a:latin typeface="Cambria Math" charset="0"/>
+                            </a:rPr>
+                            <m:t>𝐶</m:t>
+                          </m:r>
+                        </m:num>
+                        <m:den>
+                          <m:r>
+                            <a:rPr lang="en-US" b="0" i="1" smtClean="0">
+                              <a:latin typeface="Cambria Math" charset="0"/>
+                            </a:rPr>
+                            <m:t>𝛿</m:t>
+                          </m:r>
+                          <m:sSub>
+                            <m:sSubPr>
+                              <m:ctrlPr>
+                                <a:rPr lang="en-US" b="0" i="1" smtClean="0">
+                                  <a:latin typeface="Cambria Math" charset="0"/>
+                                </a:rPr>
+                              </m:ctrlPr>
+                            </m:sSubPr>
+                            <m:e>
+                              <m:r>
+                                <a:rPr lang="en-US" b="0" i="1" smtClean="0">
+                                  <a:latin typeface="Cambria Math" charset="0"/>
+                                </a:rPr>
+                                <m:t>𝑦</m:t>
+                              </m:r>
+                            </m:e>
+                            <m:sub>
+                              <m:r>
+                                <a:rPr lang="en-US" b="0" i="1" smtClean="0">
+                                  <a:latin typeface="Cambria Math" charset="0"/>
+                                </a:rPr>
+                                <m:t>𝑖</m:t>
+                              </m:r>
+                            </m:sub>
+                          </m:sSub>
+                        </m:den>
+                      </m:f>
+                      <m:r>
+                        <a:rPr lang="en-US" b="0" i="1" smtClean="0">
+                          <a:latin typeface="Cambria Math" charset="0"/>
+                        </a:rPr>
+                        <m:t>=4</m:t>
+                      </m:r>
+                      <m:nary>
+                        <m:naryPr>
+                          <m:chr m:val="∑"/>
+                          <m:supHide m:val="on"/>
+                          <m:ctrlPr>
+                            <a:rPr lang="en-US" b="0" i="1" smtClean="0">
+                              <a:latin typeface="Cambria Math" charset="0"/>
+                            </a:rPr>
+                          </m:ctrlPr>
+                        </m:naryPr>
+                        <m:sub>
+                          <m:r>
+                            <a:rPr lang="en-US" b="0" i="1" smtClean="0">
+                              <a:latin typeface="Cambria Math" charset="0"/>
+                            </a:rPr>
+                            <m:t>𝑗</m:t>
+                          </m:r>
+                        </m:sub>
+                        <m:sup/>
+                        <m:e>
+                          <m:f>
+                            <m:fPr>
+                              <m:ctrlPr>
+                                <a:rPr lang="en-US" b="0" i="1" smtClean="0">
+                                  <a:latin typeface="Cambria Math" charset="0"/>
+                                </a:rPr>
+                              </m:ctrlPr>
+                            </m:fPr>
+                            <m:num>
+                              <m:d>
+                                <m:dPr>
+                                  <m:ctrlPr>
+                                    <a:rPr lang="en-US" b="0" i="1" smtClean="0">
+                                      <a:latin typeface="Cambria Math" charset="0"/>
+                                    </a:rPr>
+                                  </m:ctrlPr>
+                                </m:dPr>
+                                <m:e>
+                                  <m:sSub>
+                                    <m:sSubPr>
+                                      <m:ctrlPr>
+                                        <a:rPr lang="en-US" b="0" i="1" smtClean="0">
+                                          <a:latin typeface="Cambria Math" charset="0"/>
+                                        </a:rPr>
+                                      </m:ctrlPr>
+                                    </m:sSubPr>
+                                    <m:e>
+                                      <m:r>
+                                        <a:rPr lang="en-US" b="0" i="1" smtClean="0">
+                                          <a:latin typeface="Cambria Math" charset="0"/>
+                                        </a:rPr>
+                                        <m:t>𝑝</m:t>
+                                      </m:r>
+                                    </m:e>
+                                    <m:sub>
+                                      <m:r>
+                                        <a:rPr lang="en-US" b="0" i="1" smtClean="0">
+                                          <a:latin typeface="Cambria Math" charset="0"/>
+                                        </a:rPr>
+                                        <m:t>𝑖𝑗</m:t>
+                                      </m:r>
+                                    </m:sub>
+                                  </m:sSub>
+                                  <m:r>
+                                    <a:rPr lang="en-US" b="0" i="1" smtClean="0">
+                                      <a:latin typeface="Cambria Math" charset="0"/>
+                                    </a:rPr>
+                                    <m:t>−</m:t>
+                                  </m:r>
+                                  <m:sSub>
+                                    <m:sSubPr>
+                                      <m:ctrlPr>
+                                        <a:rPr lang="en-US" b="0" i="1" smtClean="0">
+                                          <a:latin typeface="Cambria Math" charset="0"/>
+                                        </a:rPr>
+                                      </m:ctrlPr>
+                                    </m:sSubPr>
+                                    <m:e>
+                                      <m:r>
+                                        <a:rPr lang="en-US" b="0" i="1" smtClean="0">
+                                          <a:latin typeface="Cambria Math" charset="0"/>
+                                        </a:rPr>
+                                        <m:t>𝑞</m:t>
+                                      </m:r>
+                                    </m:e>
+                                    <m:sub>
+                                      <m:r>
+                                        <a:rPr lang="en-US" b="0" i="1" smtClean="0">
+                                          <a:latin typeface="Cambria Math" charset="0"/>
+                                        </a:rPr>
+                                        <m:t>𝑖𝑗</m:t>
+                                      </m:r>
+                                    </m:sub>
+                                  </m:sSub>
+                                </m:e>
+                              </m:d>
+                              <m:d>
+                                <m:dPr>
+                                  <m:ctrlPr>
+                                    <a:rPr lang="en-US" b="0" i="1" smtClean="0">
+                                      <a:latin typeface="Cambria Math" charset="0"/>
+                                    </a:rPr>
+                                  </m:ctrlPr>
+                                </m:dPr>
+                                <m:e>
+                                  <m:sSub>
+                                    <m:sSubPr>
+                                      <m:ctrlPr>
+                                        <a:rPr lang="en-US" b="0" i="1" smtClean="0">
+                                          <a:latin typeface="Cambria Math" charset="0"/>
+                                        </a:rPr>
+                                      </m:ctrlPr>
+                                    </m:sSubPr>
+                                    <m:e>
+                                      <m:r>
+                                        <a:rPr lang="en-US" b="0" i="1" smtClean="0">
+                                          <a:latin typeface="Cambria Math" charset="0"/>
+                                        </a:rPr>
+                                        <m:t>𝑦</m:t>
+                                      </m:r>
+                                    </m:e>
+                                    <m:sub>
+                                      <m:r>
+                                        <a:rPr lang="en-US" b="0" i="1" smtClean="0">
+                                          <a:latin typeface="Cambria Math" charset="0"/>
+                                        </a:rPr>
+                                        <m:t>𝑖</m:t>
+                                      </m:r>
+                                    </m:sub>
+                                  </m:sSub>
+                                  <m:r>
+                                    <a:rPr lang="en-US" b="0" i="1" smtClean="0">
+                                      <a:latin typeface="Cambria Math" charset="0"/>
+                                    </a:rPr>
+                                    <m:t>−</m:t>
+                                  </m:r>
+                                  <m:sSub>
+                                    <m:sSubPr>
+                                      <m:ctrlPr>
+                                        <a:rPr lang="en-US" b="0" i="1" smtClean="0">
+                                          <a:latin typeface="Cambria Math" charset="0"/>
+                                        </a:rPr>
+                                      </m:ctrlPr>
+                                    </m:sSubPr>
+                                    <m:e>
+                                      <m:r>
+                                        <a:rPr lang="en-US" b="0" i="1" smtClean="0">
+                                          <a:latin typeface="Cambria Math" charset="0"/>
+                                        </a:rPr>
+                                        <m:t>𝑦</m:t>
+                                      </m:r>
+                                    </m:e>
+                                    <m:sub>
+                                      <m:r>
+                                        <a:rPr lang="en-US" b="0" i="1" smtClean="0">
+                                          <a:latin typeface="Cambria Math" charset="0"/>
+                                        </a:rPr>
+                                        <m:t>𝑗</m:t>
+                                      </m:r>
+                                    </m:sub>
+                                  </m:sSub>
+                                </m:e>
+                              </m:d>
+                            </m:num>
+                            <m:den>
+                              <m:r>
+                                <a:rPr lang="en-US" b="0" i="1" smtClean="0">
+                                  <a:latin typeface="Cambria Math" charset="0"/>
+                                </a:rPr>
+                                <m:t>1+</m:t>
+                              </m:r>
+                              <m:sSup>
+                                <m:sSupPr>
+                                  <m:ctrlPr>
+                                    <a:rPr lang="en-US" b="0" i="1" smtClean="0">
+                                      <a:latin typeface="Cambria Math" charset="0"/>
+                                    </a:rPr>
+                                  </m:ctrlPr>
+                                </m:sSupPr>
+                                <m:e>
+                                  <m:d>
+                                    <m:dPr>
+                                      <m:begChr m:val="|"/>
+                                      <m:endChr m:val="|"/>
+                                      <m:ctrlPr>
+                                        <a:rPr lang="en-US" b="0" i="1" smtClean="0">
+                                          <a:latin typeface="Cambria Math" charset="0"/>
+                                        </a:rPr>
+                                      </m:ctrlPr>
+                                    </m:dPr>
+                                    <m:e>
+                                      <m:d>
+                                        <m:dPr>
+                                          <m:begChr m:val="|"/>
+                                          <m:endChr m:val="|"/>
+                                          <m:ctrlPr>
+                                            <a:rPr lang="en-US" b="0" i="1" smtClean="0">
+                                              <a:latin typeface="Cambria Math" charset="0"/>
+                                            </a:rPr>
+                                          </m:ctrlPr>
+                                        </m:dPr>
+                                        <m:e>
+                                          <m:sSub>
+                                            <m:sSubPr>
+                                              <m:ctrlPr>
+                                                <a:rPr lang="en-US" b="0" i="1" smtClean="0">
+                                                  <a:latin typeface="Cambria Math" charset="0"/>
+                                                </a:rPr>
+                                              </m:ctrlPr>
+                                            </m:sSubPr>
+                                            <m:e>
+                                              <m:r>
+                                                <a:rPr lang="en-US" b="0" i="1" smtClean="0">
+                                                  <a:latin typeface="Cambria Math" charset="0"/>
+                                                </a:rPr>
+                                                <m:t>𝑦</m:t>
+                                              </m:r>
+                                            </m:e>
+                                            <m:sub>
+                                              <m:r>
+                                                <a:rPr lang="en-US" b="0" i="1" smtClean="0">
+                                                  <a:latin typeface="Cambria Math" charset="0"/>
+                                                </a:rPr>
+                                                <m:t>𝑖</m:t>
+                                              </m:r>
+                                            </m:sub>
+                                          </m:sSub>
+                                          <m:r>
+                                            <a:rPr lang="en-US" b="0" i="1" smtClean="0">
+                                              <a:latin typeface="Cambria Math" charset="0"/>
+                                            </a:rPr>
+                                            <m:t>−</m:t>
+                                          </m:r>
+                                          <m:sSub>
+                                            <m:sSubPr>
+                                              <m:ctrlPr>
+                                                <a:rPr lang="en-US" b="0" i="1" smtClean="0">
+                                                  <a:latin typeface="Cambria Math" charset="0"/>
+                                                </a:rPr>
+                                              </m:ctrlPr>
+                                            </m:sSubPr>
+                                            <m:e>
+                                              <m:r>
+                                                <a:rPr lang="en-US" b="0" i="1" smtClean="0">
+                                                  <a:latin typeface="Cambria Math" charset="0"/>
+                                                </a:rPr>
+                                                <m:t>𝑦</m:t>
+                                              </m:r>
+                                            </m:e>
+                                            <m:sub>
+                                              <m:r>
+                                                <a:rPr lang="en-US" b="0" i="1" smtClean="0">
+                                                  <a:latin typeface="Cambria Math" charset="0"/>
+                                                </a:rPr>
+                                                <m:t>𝑗</m:t>
+                                              </m:r>
+                                            </m:sub>
+                                          </m:sSub>
+                                        </m:e>
+                                      </m:d>
+                                    </m:e>
+                                  </m:d>
+                                </m:e>
+                                <m:sup>
+                                  <m:r>
+                                    <a:rPr lang="en-US" b="0" i="1" smtClean="0">
+                                      <a:latin typeface="Cambria Math" charset="0"/>
+                                    </a:rPr>
+                                    <m:t>2</m:t>
+                                  </m:r>
+                                </m:sup>
+                              </m:sSup>
+                            </m:den>
+                          </m:f>
+                        </m:e>
+                      </m:nary>
+                    </m:oMath>
+                  </m:oMathPara>
+                </a14:m>
+                <a:endParaRPr lang="en-US" dirty="0" smtClean="0"/>
+              </a:p>
+              <a:p>
+                <a:pPr marL="0" marR="0" lvl="0" indent="0" defTabSz="914400" eaLnBrk="1" fontAlgn="auto" latinLnBrk="0" hangingPunct="1">
+                  <a:lnSpc>
+                    <a:spcPct val="100000"/>
+                  </a:lnSpc>
+                  <a:spcBef>
+                    <a:spcPts val="0"/>
+                  </a:spcBef>
+                  <a:spcAft>
+                    <a:spcPts val="0"/>
+                  </a:spcAft>
+                  <a:buClrTx/>
+                  <a:buSzTx/>
+                  <a:buFontTx/>
+                  <a:buNone/>
+                  <a:tabLst/>
+                  <a:defRPr/>
+                </a:pPr>
+                <a:endParaRPr lang="en-US" dirty="0"/>
+              </a:p>
+              <a:p>
+                <a:pPr marL="0" marR="0" lvl="0" indent="0" defTabSz="914400" eaLnBrk="1" fontAlgn="auto" latinLnBrk="0" hangingPunct="1">
+                  <a:lnSpc>
+                    <a:spcPct val="100000"/>
+                  </a:lnSpc>
+                  <a:spcBef>
+                    <a:spcPts val="0"/>
+                  </a:spcBef>
+                  <a:spcAft>
+                    <a:spcPts val="0"/>
+                  </a:spcAft>
+                  <a:buClrTx/>
+                  <a:buSzTx/>
+                  <a:buFontTx/>
+                  <a:buNone/>
+                  <a:tabLst/>
+                  <a:defRPr/>
+                </a:pPr>
+                <a:endParaRPr lang="en-US" dirty="0" smtClean="0"/>
+              </a:p>
+            </p:txBody>
+          </p:sp>
+        </mc:Choice>
+        <mc:Fallback>
+          <p:sp>
+            <p:nvSpPr>
+              <p:cNvPr id="4" name="Content Placeholder 3"/>
+              <p:cNvSpPr>
+                <a:spLocks noGrp="1" noRot="1" noChangeAspect="1" noMove="1" noResize="1" noEditPoints="1" noAdjustHandles="1" noChangeArrowheads="1" noChangeShapeType="1" noTextEdit="1"/>
+              </p:cNvSpPr>
+              <p:nvPr>
+                <p:ph idx="1"/>
+              </p:nvPr>
+            </p:nvSpPr>
+            <p:spPr>
+              <a:blipFill rotWithShape="0">
+                <a:blip r:embed="rId3"/>
+                <a:stretch>
+                  <a:fillRect l="-638" t="-1961"/>
+                </a:stretch>
+              </a:blipFill>
+            </p:spPr>
+            <p:txBody>
+              <a:bodyPr/>
+              <a:lstStyle/>
+              <a:p>
+                <a:r>
+                  <a:rPr lang="en-US">
+                    <a:noFill/>
+                  </a:rPr>
+                  <a:t> </a:t>
+                </a:r>
+              </a:p>
+            </p:txBody>
+          </p:sp>
+        </mc:Fallback>
+      </mc:AlternateContent>
     </p:spTree>
     <p:extLst>
       <p:ext uri="{BB962C8B-B14F-4D97-AF65-F5344CB8AC3E}">

</xml_diff>

<commit_message>
Photos and more edits
</commit_message>
<xml_diff>
--- a/math465_tsne.pptx
+++ b/math465_tsne.pptx
@@ -5,7 +5,7 @@
     <p:sldMasterId id="2147483648" r:id="rId1"/>
   </p:sldMasterIdLst>
   <p:notesMasterIdLst>
-    <p:notesMasterId r:id="rId10"/>
+    <p:notesMasterId r:id="rId13"/>
   </p:notesMasterIdLst>
   <p:sldIdLst>
     <p:sldId id="256" r:id="rId2"/>
@@ -14,8 +14,11 @@
     <p:sldId id="259" r:id="rId5"/>
     <p:sldId id="260" r:id="rId6"/>
     <p:sldId id="261" r:id="rId7"/>
-    <p:sldId id="264" r:id="rId8"/>
-    <p:sldId id="266" r:id="rId9"/>
+    <p:sldId id="267" r:id="rId8"/>
+    <p:sldId id="264" r:id="rId9"/>
+    <p:sldId id="266" r:id="rId10"/>
+    <p:sldId id="268" r:id="rId11"/>
+    <p:sldId id="269" r:id="rId12"/>
   </p:sldIdLst>
   <p:sldSz cx="12192000" cy="6858000"/>
   <p:notesSz cx="6858000" cy="9144000"/>
@@ -610,79 +613,13 @@
           <a:p>
             <a:r>
               <a:rPr lang="en-US" dirty="0" smtClean="0"/>
-              <a:t>Use analogy</a:t>
+              <a:t>Fix P</a:t>
             </a:r>
             <a:r>
               <a:rPr lang="en-US" baseline="0" dirty="0" smtClean="0"/>
-              <a:t> to describe more intuitively what similarity means especially depending on your location within the point cloud</a:t>
-            </a:r>
-          </a:p>
-          <a:p>
-            <a:endParaRPr lang="en-US" baseline="0" dirty="0" smtClean="0"/>
-          </a:p>
-          <a:p>
-            <a:r>
-              <a:rPr lang="en-US" baseline="0" dirty="0" smtClean="0"/>
-              <a:t>How this works:</a:t>
-            </a:r>
-          </a:p>
-          <a:p>
-            <a:endParaRPr lang="en-US" baseline="0" dirty="0" smtClean="0"/>
-          </a:p>
-          <a:p>
-            <a:r>
-              <a:rPr lang="en-US" baseline="0" dirty="0" smtClean="0"/>
-              <a:t>Iterate over values of sigma</a:t>
-            </a:r>
-          </a:p>
-          <a:p>
-            <a:r>
-              <a:rPr lang="en-US" baseline="0" dirty="0" smtClean="0"/>
-              <a:t>Sigma induces a change in the values of </a:t>
-            </a:r>
-            <a:r>
-              <a:rPr lang="en-US" baseline="0" dirty="0" err="1" smtClean="0"/>
-              <a:t>p_j|j</a:t>
-            </a:r>
-            <a:endParaRPr lang="en-US" baseline="0" dirty="0" smtClean="0"/>
-          </a:p>
-          <a:p>
-            <a:r>
-              <a:rPr lang="en-US" baseline="0" dirty="0" smtClean="0"/>
-              <a:t>Iterate over different distributions or values for sigma until the entropy value is reached</a:t>
-            </a:r>
-          </a:p>
-          <a:p>
-            <a:endParaRPr lang="en-US" baseline="0" dirty="0" smtClean="0"/>
-          </a:p>
-          <a:p>
-            <a:r>
-              <a:rPr lang="en-US" baseline="0" dirty="0" smtClean="0"/>
-              <a:t>This is a way of determining distributions that biases the algorithm to care more about preserving local structure</a:t>
-            </a:r>
-          </a:p>
-          <a:p>
-            <a:endParaRPr lang="en-US" baseline="0" dirty="0" smtClean="0"/>
-          </a:p>
-          <a:p>
-            <a:r>
-              <a:rPr lang="en-US" baseline="0" dirty="0" smtClean="0"/>
-              <a:t>Symmetric </a:t>
-            </a:r>
-            <a:r>
-              <a:rPr lang="en-US" baseline="0" dirty="0" err="1" smtClean="0"/>
-              <a:t>pij</a:t>
-            </a:r>
-            <a:r>
-              <a:rPr lang="en-US" baseline="0" dirty="0" smtClean="0"/>
-              <a:t> to make the gradient easier to compute</a:t>
-            </a:r>
-          </a:p>
-          <a:p>
-            <a:endParaRPr lang="en-US" baseline="0" dirty="0" smtClean="0"/>
-          </a:p>
-          <a:p>
-            <a:endParaRPr lang="en-US" baseline="0" dirty="0" smtClean="0"/>
+              <a:t> and N to D and d</a:t>
+            </a:r>
+            <a:endParaRPr lang="en-US" dirty="0"/>
           </a:p>
         </p:txBody>
       </p:sp>
@@ -703,7 +640,7 @@
           <a:p>
             <a:fld id="{4ABACD3E-33D6-8842-A5DE-832FA4DFC58F}" type="slidenum">
               <a:rPr lang="en-US" smtClean="0"/>
-              <a:t>4</a:t>
+              <a:t>2</a:t>
             </a:fld>
             <a:endParaRPr lang="en-US"/>
           </a:p>
@@ -712,7 +649,7 @@
     </p:spTree>
     <p:extLst>
       <p:ext uri="{BB962C8B-B14F-4D97-AF65-F5344CB8AC3E}">
-        <p14:creationId xmlns:p14="http://schemas.microsoft.com/office/powerpoint/2010/main" val="311709685"/>
+        <p14:creationId xmlns:p14="http://schemas.microsoft.com/office/powerpoint/2010/main" val="210699497"/>
       </p:ext>
     </p:extLst>
   </p:cSld>
@@ -768,25 +705,20 @@
           <a:p>
             <a:r>
               <a:rPr lang="en-US" dirty="0" smtClean="0"/>
-              <a:t>As you go from high dimension to low dimension,</a:t>
+              <a:t>Use analogy</a:t>
             </a:r>
             <a:r>
               <a:rPr lang="en-US" baseline="0" dirty="0" smtClean="0"/>
-              <a:t> unless there were redundant variables/feature of your data points, some distances will be distorted</a:t>
-            </a:r>
-            <a:endParaRPr lang="en-US" dirty="0" smtClean="0"/>
-          </a:p>
-          <a:p>
-            <a:endParaRPr lang="en-US" dirty="0" smtClean="0"/>
-          </a:p>
-          <a:p>
-            <a:r>
-              <a:rPr lang="en-US" dirty="0" smtClean="0"/>
-              <a:t>In the case of TSNE, since </a:t>
-            </a:r>
+              <a:t> to describe more intuitively what similarity means especially depending on your location within the point cloud</a:t>
+            </a:r>
+          </a:p>
+          <a:p>
+            <a:endParaRPr lang="en-US" baseline="0" dirty="0" smtClean="0"/>
+          </a:p>
+          <a:p>
             <a:r>
               <a:rPr lang="en-US" baseline="0" dirty="0" smtClean="0"/>
-              <a:t>local structure is preserved and prioritized, larger distances/more global structures can be distorted, specifically enlarged</a:t>
+              <a:t>How this works:</a:t>
             </a:r>
           </a:p>
           <a:p>
@@ -795,26 +727,57 @@
           <a:p>
             <a:r>
               <a:rPr lang="en-US" baseline="0" dirty="0" smtClean="0"/>
-              <a:t>What that means is points that are not close in high dimensional space may be forced to be modeled farther from each other in low dimensions (recall the triangle of points demonstration and show that the p and q values create an attractive force on the farthest points in the mapped dimension) </a:t>
-            </a:r>
-          </a:p>
-          <a:p>
+              <a:t>Iterate over values of sigma</a:t>
+            </a:r>
+          </a:p>
+          <a:p>
+            <a:r>
+              <a:rPr lang="en-US" baseline="0" dirty="0" smtClean="0"/>
+              <a:t>Sigma induces a change in the values of </a:t>
+            </a:r>
+            <a:r>
+              <a:rPr lang="en-US" baseline="0" dirty="0" err="1" smtClean="0"/>
+              <a:t>p_j|j</a:t>
+            </a:r>
             <a:endParaRPr lang="en-US" baseline="0" dirty="0" smtClean="0"/>
           </a:p>
           <a:p>
             <a:r>
               <a:rPr lang="en-US" baseline="0" dirty="0" smtClean="0"/>
-              <a:t>To compensate for this reality, the paper writers used a student t-distribution with 1 degree of freedom to reflect/describe the increased probability of points existing far away from each other in the smaller dimension. Since the distribution has fatter tails than the </a:t>
+              <a:t>Iterate over different distributions or values for sigma until the entropy value is reached</a:t>
+            </a:r>
+          </a:p>
+          <a:p>
+            <a:endParaRPr lang="en-US" baseline="0" dirty="0" smtClean="0"/>
+          </a:p>
+          <a:p>
+            <a:r>
+              <a:rPr lang="en-US" baseline="0" dirty="0" smtClean="0"/>
+              <a:t>This is a way of determining distributions that biases the algorithm to care more about preserving local structure</a:t>
+            </a:r>
+          </a:p>
+          <a:p>
+            <a:endParaRPr lang="en-US" baseline="0" dirty="0" smtClean="0"/>
+          </a:p>
+          <a:p>
+            <a:r>
+              <a:rPr lang="en-US" baseline="0" dirty="0" smtClean="0"/>
+              <a:t>Symmetric </a:t>
             </a:r>
             <a:r>
               <a:rPr lang="en-US" baseline="0" dirty="0" err="1" smtClean="0"/>
-              <a:t>gaussian</a:t>
+              <a:t>pij</a:t>
             </a:r>
             <a:r>
               <a:rPr lang="en-US" baseline="0" dirty="0" smtClean="0"/>
-              <a:t>, the p value (say 0.05) on the blue line represents a point moderately distant from the rest. In the mapped dimension, to get the q value that would incur no difference in the gradient, the point must be even more distant. This prevents the issue of crowding</a:t>
-            </a:r>
-            <a:endParaRPr lang="en-US" dirty="0"/>
+              <a:t> to make the gradient easier to compute</a:t>
+            </a:r>
+          </a:p>
+          <a:p>
+            <a:endParaRPr lang="en-US" baseline="0" dirty="0" smtClean="0"/>
+          </a:p>
+          <a:p>
+            <a:endParaRPr lang="en-US" baseline="0" dirty="0" smtClean="0"/>
           </a:p>
         </p:txBody>
       </p:sp>
@@ -835,7 +798,7 @@
           <a:p>
             <a:fld id="{4ABACD3E-33D6-8842-A5DE-832FA4DFC58F}" type="slidenum">
               <a:rPr lang="en-US" smtClean="0"/>
-              <a:t>5</a:t>
+              <a:t>4</a:t>
             </a:fld>
             <a:endParaRPr lang="en-US"/>
           </a:p>
@@ -844,7 +807,7 @@
     </p:spTree>
     <p:extLst>
       <p:ext uri="{BB962C8B-B14F-4D97-AF65-F5344CB8AC3E}">
-        <p14:creationId xmlns:p14="http://schemas.microsoft.com/office/powerpoint/2010/main" val="1972854954"/>
+        <p14:creationId xmlns:p14="http://schemas.microsoft.com/office/powerpoint/2010/main" val="311709685"/>
       </p:ext>
     </p:extLst>
   </p:cSld>
@@ -900,11 +863,25 @@
           <a:p>
             <a:r>
               <a:rPr lang="en-US" dirty="0" smtClean="0"/>
-              <a:t>Ideally, if the probability</a:t>
+              <a:t>As you go from high dimension to low dimension,</a:t>
             </a:r>
             <a:r>
               <a:rPr lang="en-US" baseline="0" dirty="0" smtClean="0"/>
-              <a:t> distributions between pairs of points are the same between the high dimensional space and the low dimensional mapping, then they’re relative distances from each other are also equal. However, when embedding data, most of the time this does not happen and distances get distorted. Recall a triangle of points in the 2 plane forced onto a 1 dimensional plane.</a:t>
+              <a:t> unless there were redundant variables/feature of your data points, some distances will be distorted</a:t>
+            </a:r>
+            <a:endParaRPr lang="en-US" dirty="0" smtClean="0"/>
+          </a:p>
+          <a:p>
+            <a:endParaRPr lang="en-US" dirty="0" smtClean="0"/>
+          </a:p>
+          <a:p>
+            <a:r>
+              <a:rPr lang="en-US" dirty="0" smtClean="0"/>
+              <a:t>In the case of TSNE, since </a:t>
+            </a:r>
+            <a:r>
+              <a:rPr lang="en-US" baseline="0" dirty="0" smtClean="0"/>
+              <a:t>local structure is preserved and prioritized, larger distances/more global structures can be distorted, specifically enlarged</a:t>
             </a:r>
           </a:p>
           <a:p>
@@ -913,7 +890,7 @@
           <a:p>
             <a:r>
               <a:rPr lang="en-US" baseline="0" dirty="0" smtClean="0"/>
-              <a:t>Therefore, need to assign a metric or way of judging how bad the current embedding is. Note the C equation. This computes the sum of all mapping errors between the original data set and the mapped points. Note that the equation has a very specific idea of what constitutes an erroneous mapping of points. It assigns very high degree of error to a pair of points that are modeled as “close neighbors” in high d but are not close in low dimensions. Vice versa, being modeled as close in low dimension but far away in high dimension does not introduce much error.</a:t>
+              <a:t>What that means is points that are not close in high dimensional space may be forced to be modeled farther from each other in low dimensions (recall the triangle of points demonstration and show that the p and q values create an attractive force on the farthest points in the mapped dimension) </a:t>
             </a:r>
           </a:p>
           <a:p>
@@ -922,47 +899,16 @@
           <a:p>
             <a:r>
               <a:rPr lang="en-US" baseline="0" dirty="0" smtClean="0"/>
-              <a:t>Gradient descent is a computational method used to iteratively reach a system with lower value of some stated function, in this case cost. It is </a:t>
+              <a:t>To compensate for this reality, the paper writers used a student t-distribution with 1 degree of freedom to reflect/describe the increased probability of points existing far away from each other in the smaller dimension. Since the distribution has fatter tails than the </a:t>
             </a:r>
             <a:r>
               <a:rPr lang="en-US" baseline="0" dirty="0" err="1" smtClean="0"/>
-              <a:t>analagous</a:t>
+              <a:t>gaussian</a:t>
             </a:r>
             <a:r>
               <a:rPr lang="en-US" baseline="0" dirty="0" smtClean="0"/>
-              <a:t> to a ball roll down the hill to reach a state of lower potential energy. In this case, our potential energy is C (cost) or the overall mistake in our mapping. The gradient descent will wiggle each of the mapping points in the direction that specifies a negative </a:t>
-            </a:r>
-            <a:r>
-              <a:rPr lang="en-US" baseline="0" dirty="0" err="1" smtClean="0"/>
-              <a:t>dC</a:t>
-            </a:r>
-            <a:r>
-              <a:rPr lang="en-US" baseline="0" dirty="0" smtClean="0"/>
-              <a:t>/</a:t>
-            </a:r>
-            <a:r>
-              <a:rPr lang="en-US" baseline="0" dirty="0" err="1" smtClean="0"/>
-              <a:t>dy</a:t>
-            </a:r>
-            <a:r>
-              <a:rPr lang="en-US" baseline="0" dirty="0" smtClean="0"/>
-              <a:t> in order to maximally reduce the cost function with respect to that point. Doing that repeatedly for each point until the overall mapping has reached a </a:t>
-            </a:r>
-            <a:r>
-              <a:rPr lang="en-US" baseline="0" smtClean="0"/>
-              <a:t>minimum state of cost.</a:t>
-            </a:r>
-          </a:p>
-          <a:p>
-            <a:endParaRPr lang="en-US" baseline="0" smtClean="0"/>
-          </a:p>
-          <a:p>
-            <a:endParaRPr lang="en-US" baseline="0" dirty="0" smtClean="0"/>
-          </a:p>
-          <a:p>
-            <a:endParaRPr lang="en-US" baseline="0" dirty="0" smtClean="0"/>
-          </a:p>
-          <a:p>
+              <a:t>, the p value (say 0.05) on the blue line represents a point moderately distant from the rest. In the mapped dimension, to get the q value that would incur no difference in the gradient, the point must be even more distant. This prevents the issue of crowding</a:t>
+            </a:r>
             <a:endParaRPr lang="en-US" dirty="0"/>
           </a:p>
         </p:txBody>
@@ -984,6 +930,151 @@
           <a:p>
             <a:fld id="{4ABACD3E-33D6-8842-A5DE-832FA4DFC58F}" type="slidenum">
               <a:rPr lang="en-US" smtClean="0"/>
+              <a:t>5</a:t>
+            </a:fld>
+            <a:endParaRPr lang="en-US"/>
+          </a:p>
+        </p:txBody>
+      </p:sp>
+    </p:spTree>
+    <p:extLst>
+      <p:ext uri="{BB962C8B-B14F-4D97-AF65-F5344CB8AC3E}">
+        <p14:creationId xmlns:p14="http://schemas.microsoft.com/office/powerpoint/2010/main" val="1972854954"/>
+      </p:ext>
+    </p:extLst>
+  </p:cSld>
+  <p:clrMapOvr>
+    <a:masterClrMapping/>
+  </p:clrMapOvr>
+</p:notes>
+</file>
+
+<file path=ppt/notesSlides/notesSlide5.xml><?xml version="1.0" encoding="utf-8"?>
+<p:notes xmlns:a="http://schemas.openxmlformats.org/drawingml/2006/main" xmlns:r="http://schemas.openxmlformats.org/officeDocument/2006/relationships" xmlns:p="http://schemas.openxmlformats.org/presentationml/2006/main">
+  <p:cSld>
+    <p:spTree>
+      <p:nvGrpSpPr>
+        <p:cNvPr id="1" name=""/>
+        <p:cNvGrpSpPr/>
+        <p:nvPr/>
+      </p:nvGrpSpPr>
+      <p:grpSpPr>
+        <a:xfrm>
+          <a:off x="0" y="0"/>
+          <a:ext cx="0" cy="0"/>
+          <a:chOff x="0" y="0"/>
+          <a:chExt cx="0" cy="0"/>
+        </a:xfrm>
+      </p:grpSpPr>
+      <p:sp>
+        <p:nvSpPr>
+          <p:cNvPr id="2" name="Slide Image Placeholder 1"/>
+          <p:cNvSpPr>
+            <a:spLocks noGrp="1" noRot="1" noChangeAspect="1"/>
+          </p:cNvSpPr>
+          <p:nvPr>
+            <p:ph type="sldImg"/>
+          </p:nvPr>
+        </p:nvSpPr>
+        <p:spPr/>
+      </p:sp>
+      <p:sp>
+        <p:nvSpPr>
+          <p:cNvPr id="3" name="Notes Placeholder 2"/>
+          <p:cNvSpPr>
+            <a:spLocks noGrp="1"/>
+          </p:cNvSpPr>
+          <p:nvPr>
+            <p:ph type="body" idx="1"/>
+          </p:nvPr>
+        </p:nvSpPr>
+        <p:spPr/>
+        <p:txBody>
+          <a:bodyPr/>
+          <a:lstStyle/>
+          <a:p>
+            <a:r>
+              <a:rPr lang="en-US" dirty="0" smtClean="0"/>
+              <a:t>Ideally, if the probability</a:t>
+            </a:r>
+            <a:r>
+              <a:rPr lang="en-US" baseline="0" dirty="0" smtClean="0"/>
+              <a:t> distributions between pairs of points are the same between the high dimensional space and the low dimensional mapping, then they’re relative distances from each other are also equal. However, when embedding data, most of the time this does not happen and distances get distorted. Recall a triangle of points in the 2 plane forced onto a 1 dimensional plane.</a:t>
+            </a:r>
+          </a:p>
+          <a:p>
+            <a:endParaRPr lang="en-US" baseline="0" dirty="0" smtClean="0"/>
+          </a:p>
+          <a:p>
+            <a:r>
+              <a:rPr lang="en-US" baseline="0" dirty="0" smtClean="0"/>
+              <a:t>Therefore, need to assign a metric or way of judging how bad the current embedding is. Note the C equation. This computes the sum of all mapping errors between the original data set and the mapped points. Note that the equation has a very specific idea of what constitutes an erroneous mapping of points. It assigns very high degree of error to a pair of points that are modeled as “close neighbors” in high d but are not close in low dimensions. Vice versa, being modeled as close in low dimension but far away in high dimension does not introduce much error.</a:t>
+            </a:r>
+          </a:p>
+          <a:p>
+            <a:endParaRPr lang="en-US" baseline="0" dirty="0" smtClean="0"/>
+          </a:p>
+          <a:p>
+            <a:r>
+              <a:rPr lang="en-US" baseline="0" dirty="0" smtClean="0"/>
+              <a:t>Gradient descent is a computational method used to iteratively reach a system with lower value of some stated function, in this case cost. It is </a:t>
+            </a:r>
+            <a:r>
+              <a:rPr lang="en-US" baseline="0" dirty="0" err="1" smtClean="0"/>
+              <a:t>analagous</a:t>
+            </a:r>
+            <a:r>
+              <a:rPr lang="en-US" baseline="0" dirty="0" smtClean="0"/>
+              <a:t> to a ball roll down the hill to reach a state of lower potential energy. In this case, our potential energy is C (cost) or the overall mistake in our mapping. The gradient descent will wiggle each of the mapping points in the direction that specifies a negative </a:t>
+            </a:r>
+            <a:r>
+              <a:rPr lang="en-US" baseline="0" dirty="0" err="1" smtClean="0"/>
+              <a:t>dC</a:t>
+            </a:r>
+            <a:r>
+              <a:rPr lang="en-US" baseline="0" dirty="0" smtClean="0"/>
+              <a:t>/</a:t>
+            </a:r>
+            <a:r>
+              <a:rPr lang="en-US" baseline="0" dirty="0" err="1" smtClean="0"/>
+              <a:t>dy</a:t>
+            </a:r>
+            <a:r>
+              <a:rPr lang="en-US" baseline="0" dirty="0" smtClean="0"/>
+              <a:t> in order to maximally reduce the cost function with respect to that point. Doing that repeatedly for each point until the overall mapping has reached a minimum state of cost.</a:t>
+            </a:r>
+          </a:p>
+          <a:p>
+            <a:endParaRPr lang="en-US" baseline="0" dirty="0" smtClean="0"/>
+          </a:p>
+          <a:p>
+            <a:endParaRPr lang="en-US" baseline="0" dirty="0" smtClean="0"/>
+          </a:p>
+          <a:p>
+            <a:endParaRPr lang="en-US" baseline="0" dirty="0" smtClean="0"/>
+          </a:p>
+          <a:p>
+            <a:endParaRPr lang="en-US" dirty="0"/>
+          </a:p>
+        </p:txBody>
+      </p:sp>
+      <p:sp>
+        <p:nvSpPr>
+          <p:cNvPr id="4" name="Slide Number Placeholder 3"/>
+          <p:cNvSpPr>
+            <a:spLocks noGrp="1"/>
+          </p:cNvSpPr>
+          <p:nvPr>
+            <p:ph type="sldNum" sz="quarter" idx="10"/>
+          </p:nvPr>
+        </p:nvSpPr>
+        <p:spPr/>
+        <p:txBody>
+          <a:bodyPr/>
+          <a:lstStyle/>
+          <a:p>
+            <a:fld id="{4ABACD3E-33D6-8842-A5DE-832FA4DFC58F}" type="slidenum">
+              <a:rPr lang="en-US" smtClean="0"/>
               <a:t>6</a:t>
             </a:fld>
             <a:endParaRPr lang="en-US"/>
@@ -994,6 +1085,118 @@
     <p:extLst>
       <p:ext uri="{BB962C8B-B14F-4D97-AF65-F5344CB8AC3E}">
         <p14:creationId xmlns:p14="http://schemas.microsoft.com/office/powerpoint/2010/main" val="726627987"/>
+      </p:ext>
+    </p:extLst>
+  </p:cSld>
+  <p:clrMapOvr>
+    <a:masterClrMapping/>
+  </p:clrMapOvr>
+</p:notes>
+</file>
+
+<file path=ppt/notesSlides/notesSlide6.xml><?xml version="1.0" encoding="utf-8"?>
+<p:notes xmlns:a="http://schemas.openxmlformats.org/drawingml/2006/main" xmlns:r="http://schemas.openxmlformats.org/officeDocument/2006/relationships" xmlns:p="http://schemas.openxmlformats.org/presentationml/2006/main">
+  <p:cSld>
+    <p:spTree>
+      <p:nvGrpSpPr>
+        <p:cNvPr id="1" name=""/>
+        <p:cNvGrpSpPr/>
+        <p:nvPr/>
+      </p:nvGrpSpPr>
+      <p:grpSpPr>
+        <a:xfrm>
+          <a:off x="0" y="0"/>
+          <a:ext cx="0" cy="0"/>
+          <a:chOff x="0" y="0"/>
+          <a:chExt cx="0" cy="0"/>
+        </a:xfrm>
+      </p:grpSpPr>
+      <p:sp>
+        <p:nvSpPr>
+          <p:cNvPr id="2" name="Slide Image Placeholder 1"/>
+          <p:cNvSpPr>
+            <a:spLocks noGrp="1" noRot="1" noChangeAspect="1"/>
+          </p:cNvSpPr>
+          <p:nvPr>
+            <p:ph type="sldImg"/>
+          </p:nvPr>
+        </p:nvSpPr>
+        <p:spPr/>
+      </p:sp>
+      <p:sp>
+        <p:nvSpPr>
+          <p:cNvPr id="3" name="Notes Placeholder 2"/>
+          <p:cNvSpPr>
+            <a:spLocks noGrp="1"/>
+          </p:cNvSpPr>
+          <p:nvPr>
+            <p:ph type="body" idx="1"/>
+          </p:nvPr>
+        </p:nvSpPr>
+        <p:spPr/>
+        <p:txBody>
+          <a:bodyPr/>
+          <a:lstStyle/>
+          <a:p>
+            <a:r>
+              <a:rPr lang="en-US" dirty="0" smtClean="0"/>
+              <a:t>MNIST data</a:t>
+            </a:r>
+            <a:r>
+              <a:rPr lang="en-US" baseline="0" dirty="0" smtClean="0"/>
+              <a:t> set is a large number of images of handwritten digits. </a:t>
+            </a:r>
+          </a:p>
+          <a:p>
+            <a:endParaRPr lang="en-US" baseline="0" dirty="0" smtClean="0"/>
+          </a:p>
+          <a:p>
+            <a:r>
+              <a:rPr lang="en-US" baseline="0" dirty="0" smtClean="0"/>
+              <a:t>Each of the images (gray scale) are composed of 764 pixels (28 by 28). Therefore we can think of each image as a data point in R^784.</a:t>
+            </a:r>
+          </a:p>
+          <a:p>
+            <a:endParaRPr lang="en-US" baseline="0" dirty="0" smtClean="0"/>
+          </a:p>
+          <a:p>
+            <a:endParaRPr lang="en-US" baseline="0" dirty="0" smtClean="0"/>
+          </a:p>
+          <a:p>
+            <a:endParaRPr lang="en-US" baseline="0" dirty="0" smtClean="0"/>
+          </a:p>
+          <a:p>
+            <a:endParaRPr lang="en-US" dirty="0"/>
+          </a:p>
+        </p:txBody>
+      </p:sp>
+      <p:sp>
+        <p:nvSpPr>
+          <p:cNvPr id="4" name="Slide Number Placeholder 3"/>
+          <p:cNvSpPr>
+            <a:spLocks noGrp="1"/>
+          </p:cNvSpPr>
+          <p:nvPr>
+            <p:ph type="sldNum" sz="quarter" idx="10"/>
+          </p:nvPr>
+        </p:nvSpPr>
+        <p:spPr/>
+        <p:txBody>
+          <a:bodyPr/>
+          <a:lstStyle/>
+          <a:p>
+            <a:fld id="{4ABACD3E-33D6-8842-A5DE-832FA4DFC58F}" type="slidenum">
+              <a:rPr lang="en-US" smtClean="0"/>
+              <a:t>8</a:t>
+            </a:fld>
+            <a:endParaRPr lang="en-US"/>
+          </a:p>
+        </p:txBody>
+      </p:sp>
+    </p:spTree>
+    <p:extLst>
+      <p:ext uri="{BB962C8B-B14F-4D97-AF65-F5344CB8AC3E}">
+        <p14:creationId xmlns:p14="http://schemas.microsoft.com/office/powerpoint/2010/main" val="29456995"/>
       </p:ext>
     </p:extLst>
   </p:cSld>
@@ -3976,6 +4179,150 @@
 </p:sld>
 </file>
 
+<file path=ppt/slides/slide10.xml><?xml version="1.0" encoding="utf-8"?>
+<p:sld xmlns:a="http://schemas.openxmlformats.org/drawingml/2006/main" xmlns:r="http://schemas.openxmlformats.org/officeDocument/2006/relationships" xmlns:p="http://schemas.openxmlformats.org/presentationml/2006/main">
+  <p:cSld>
+    <p:spTree>
+      <p:nvGrpSpPr>
+        <p:cNvPr id="1" name=""/>
+        <p:cNvGrpSpPr/>
+        <p:nvPr/>
+      </p:nvGrpSpPr>
+      <p:grpSpPr>
+        <a:xfrm>
+          <a:off x="0" y="0"/>
+          <a:ext cx="0" cy="0"/>
+          <a:chOff x="0" y="0"/>
+          <a:chExt cx="0" cy="0"/>
+        </a:xfrm>
+      </p:grpSpPr>
+      <p:sp>
+        <p:nvSpPr>
+          <p:cNvPr id="2" name="Title 1"/>
+          <p:cNvSpPr>
+            <a:spLocks noGrp="1"/>
+          </p:cNvSpPr>
+          <p:nvPr>
+            <p:ph type="title"/>
+          </p:nvPr>
+        </p:nvSpPr>
+        <p:spPr/>
+        <p:txBody>
+          <a:bodyPr/>
+          <a:lstStyle/>
+          <a:p>
+            <a:r>
+              <a:rPr lang="en-US" dirty="0" smtClean="0"/>
+              <a:t>Strengths and Weaknesses</a:t>
+            </a:r>
+            <a:endParaRPr lang="en-US" dirty="0"/>
+          </a:p>
+        </p:txBody>
+      </p:sp>
+      <p:sp>
+        <p:nvSpPr>
+          <p:cNvPr id="3" name="Content Placeholder 2"/>
+          <p:cNvSpPr>
+            <a:spLocks noGrp="1"/>
+          </p:cNvSpPr>
+          <p:nvPr>
+            <p:ph idx="1"/>
+          </p:nvPr>
+        </p:nvSpPr>
+        <p:spPr/>
+        <p:txBody>
+          <a:bodyPr/>
+          <a:lstStyle/>
+          <a:p>
+            <a:endParaRPr lang="en-US"/>
+          </a:p>
+        </p:txBody>
+      </p:sp>
+    </p:spTree>
+    <p:extLst>
+      <p:ext uri="{BB962C8B-B14F-4D97-AF65-F5344CB8AC3E}">
+        <p14:creationId xmlns:p14="http://schemas.microsoft.com/office/powerpoint/2010/main" val="1384873944"/>
+      </p:ext>
+    </p:extLst>
+  </p:cSld>
+  <p:clrMapOvr>
+    <a:masterClrMapping/>
+  </p:clrMapOvr>
+</p:sld>
+</file>
+
+<file path=ppt/slides/slide11.xml><?xml version="1.0" encoding="utf-8"?>
+<p:sld xmlns:a="http://schemas.openxmlformats.org/drawingml/2006/main" xmlns:r="http://schemas.openxmlformats.org/officeDocument/2006/relationships" xmlns:p="http://schemas.openxmlformats.org/presentationml/2006/main">
+  <p:cSld>
+    <p:spTree>
+      <p:nvGrpSpPr>
+        <p:cNvPr id="1" name=""/>
+        <p:cNvGrpSpPr/>
+        <p:nvPr/>
+      </p:nvGrpSpPr>
+      <p:grpSpPr>
+        <a:xfrm>
+          <a:off x="0" y="0"/>
+          <a:ext cx="0" cy="0"/>
+          <a:chOff x="0" y="0"/>
+          <a:chExt cx="0" cy="0"/>
+        </a:xfrm>
+      </p:grpSpPr>
+      <p:sp>
+        <p:nvSpPr>
+          <p:cNvPr id="2" name="Title 1"/>
+          <p:cNvSpPr>
+            <a:spLocks noGrp="1"/>
+          </p:cNvSpPr>
+          <p:nvPr>
+            <p:ph type="title"/>
+          </p:nvPr>
+        </p:nvSpPr>
+        <p:spPr/>
+        <p:txBody>
+          <a:bodyPr/>
+          <a:lstStyle/>
+          <a:p>
+            <a:r>
+              <a:rPr lang="en-US" dirty="0" smtClean="0"/>
+              <a:t>Conclusion and Ideas for Future Use</a:t>
+            </a:r>
+            <a:endParaRPr lang="en-US" dirty="0"/>
+          </a:p>
+        </p:txBody>
+      </p:sp>
+      <p:sp>
+        <p:nvSpPr>
+          <p:cNvPr id="3" name="Content Placeholder 2"/>
+          <p:cNvSpPr>
+            <a:spLocks noGrp="1"/>
+          </p:cNvSpPr>
+          <p:nvPr>
+            <p:ph idx="1"/>
+          </p:nvPr>
+        </p:nvSpPr>
+        <p:spPr/>
+        <p:txBody>
+          <a:bodyPr/>
+          <a:lstStyle/>
+          <a:p>
+            <a:endParaRPr lang="en-US"/>
+          </a:p>
+        </p:txBody>
+      </p:sp>
+    </p:spTree>
+    <p:extLst>
+      <p:ext uri="{BB962C8B-B14F-4D97-AF65-F5344CB8AC3E}">
+        <p14:creationId xmlns:p14="http://schemas.microsoft.com/office/powerpoint/2010/main" val="125776943"/>
+      </p:ext>
+    </p:extLst>
+  </p:cSld>
+  <p:clrMapOvr>
+    <a:masterClrMapping/>
+  </p:clrMapOvr>
+</p:sld>
+</file>
+
 <file path=ppt/slides/slide2.xml><?xml version="1.0" encoding="utf-8"?>
 <p:sld xmlns:a="http://schemas.openxmlformats.org/drawingml/2006/main" xmlns:r="http://schemas.openxmlformats.org/officeDocument/2006/relationships" xmlns:p="http://schemas.openxmlformats.org/presentationml/2006/main">
   <p:cSld>
@@ -4016,8 +4363,8 @@
           </a:p>
         </p:txBody>
       </p:sp>
-      <mc:AlternateContent xmlns:mc="http://schemas.openxmlformats.org/markup-compatibility/2006" xmlns:a14="http://schemas.microsoft.com/office/drawing/2010/main">
-        <mc:Choice Requires="a14">
+      <mc:AlternateContent xmlns:mc="http://schemas.openxmlformats.org/markup-compatibility/2006">
+        <mc:Choice xmlns:a14="http://schemas.microsoft.com/office/drawing/2010/main" Requires="a14">
           <p:sp>
             <p:nvSpPr>
               <p:cNvPr id="3" name="Content Placeholder 2"/>
@@ -4031,7 +4378,7 @@
             <p:spPr/>
             <p:txBody>
               <a:bodyPr>
-                <a:normAutofit lnSpcReduction="10000"/>
+                <a:normAutofit fontScale="92500" lnSpcReduction="20000"/>
               </a:bodyPr>
               <a:lstStyle/>
               <a:p>
@@ -4279,7 +4626,30 @@
                 </a:r>
                 <a:r>
                   <a:rPr lang="en-US" dirty="0" smtClean="0"/>
-                  <a:t>PCA, ISOMAP</a:t>
+                  <a:t>PCA, </a:t>
+                </a:r>
+                <a:r>
+                  <a:rPr lang="en-US" dirty="0" smtClean="0"/>
+                  <a:t>ISOMAP</a:t>
+                </a:r>
+              </a:p>
+              <a:p>
+                <a:pPr marL="0" indent="0">
+                  <a:buNone/>
+                </a:pPr>
+                <a:endParaRPr lang="en-US" b="1" dirty="0"/>
+              </a:p>
+              <a:p>
+                <a:pPr marL="0" indent="0">
+                  <a:buNone/>
+                </a:pPr>
+                <a:r>
+                  <a:rPr lang="en-US" b="1" dirty="0" smtClean="0"/>
+                  <a:t>Note: </a:t>
+                </a:r>
+                <a:r>
+                  <a:rPr lang="en-US" dirty="0" smtClean="0"/>
+                  <a:t>* indicates where a particular piece of information differentiates t-SNE 	from SNE</a:t>
                 </a:r>
                 <a:endParaRPr lang="en-US" b="1" dirty="0"/>
               </a:p>
@@ -4289,7 +4659,7 @@
             </p:txBody>
           </p:sp>
         </mc:Choice>
-        <mc:Fallback xmlns="">
+        <mc:Fallback>
           <p:sp>
             <p:nvSpPr>
               <p:cNvPr id="3" name="Content Placeholder 2"/>
@@ -4302,9 +4672,9 @@
             </p:nvSpPr>
             <p:spPr>
               <a:blipFill rotWithShape="0">
-                <a:blip r:embed="rId2"/>
+                <a:blip r:embed="rId3"/>
                 <a:stretch>
-                  <a:fillRect l="-1217" t="-3081" b="-420"/>
+                  <a:fillRect l="-1043" t="-3501" r="-1043"/>
                 </a:stretch>
               </a:blipFill>
             </p:spPr>
@@ -5818,8 +6188,8 @@
           </p:sp>
         </mc:Fallback>
       </mc:AlternateContent>
-      <mc:AlternateContent xmlns:mc="http://schemas.openxmlformats.org/markup-compatibility/2006" xmlns:a14="http://schemas.microsoft.com/office/drawing/2010/main">
-        <mc:Choice Requires="a14">
+      <mc:AlternateContent xmlns:mc="http://schemas.openxmlformats.org/markup-compatibility/2006">
+        <mc:Choice xmlns:a14="http://schemas.microsoft.com/office/drawing/2010/main" Requires="a14">
           <p:sp>
             <p:nvSpPr>
               <p:cNvPr id="3" name="Content Placeholder 2"/>
@@ -7200,7 +7570,7 @@
                 </a:pPr>
                 <a:r>
                   <a:rPr lang="en-US" dirty="0" smtClean="0"/>
-                  <a:t>Define </a:t>
+                  <a:t>* Define </a:t>
                 </a:r>
                 <a14:m>
                   <m:oMath xmlns:m="http://schemas.openxmlformats.org/officeDocument/2006/math">
@@ -7336,12 +7706,16 @@
                     </m:f>
                   </m:oMath>
                 </a14:m>
+                <a:r>
+                  <a:rPr lang="en-US" dirty="0" smtClean="0"/>
+                  <a:t> </a:t>
+                </a:r>
                 <a:endParaRPr lang="en-US" dirty="0" smtClean="0"/>
               </a:p>
             </p:txBody>
           </p:sp>
         </mc:Choice>
-        <mc:Fallback xmlns="">
+        <mc:Fallback>
           <p:sp>
             <p:nvSpPr>
               <p:cNvPr id="3" name="Content Placeholder 2"/>
@@ -7535,6 +7909,12 @@
                         </m:ctrlPr>
                       </m:sSubPr>
                       <m:e>
+                        <m:r>
+                          <a:rPr lang="en-US" b="0" i="1" smtClean="0">
+                            <a:latin typeface="Cambria Math" charset="0"/>
+                          </a:rPr>
+                          <m:t>∗</m:t>
+                        </m:r>
                         <m:r>
                           <a:rPr lang="en-US" b="0" i="1" smtClean="0">
                             <a:latin typeface="Cambria Math" charset="0"/>
@@ -8033,6 +8413,18 @@
                   </a:spcBef>
                   <a:buNone/>
                 </a:pPr>
+                <a:endParaRPr lang="en-US" dirty="0" smtClean="0"/>
+              </a:p>
+              <a:p>
+                <a:pPr marL="0" lvl="0" indent="0">
+                  <a:lnSpc>
+                    <a:spcPct val="100000"/>
+                  </a:lnSpc>
+                  <a:spcBef>
+                    <a:spcPts val="0"/>
+                  </a:spcBef>
+                  <a:buNone/>
+                </a:pPr>
                 <a:r>
                   <a:rPr lang="en-US" dirty="0" smtClean="0"/>
                   <a:t>Note: different from </a:t>
@@ -8088,38 +8480,6 @@
                   <a:rPr lang="en-US" dirty="0" smtClean="0"/>
                   <a:t> </a:t>
                 </a:r>
-              </a:p>
-              <a:p>
-                <a:pPr marL="0" lvl="0" indent="0">
-                  <a:lnSpc>
-                    <a:spcPct val="100000"/>
-                  </a:lnSpc>
-                  <a:spcBef>
-                    <a:spcPts val="0"/>
-                  </a:spcBef>
-                  <a:buNone/>
-                </a:pPr>
-                <a:endParaRPr lang="en-US" dirty="0" smtClean="0"/>
-              </a:p>
-              <a:p>
-                <a:pPr marL="0" lvl="0" indent="0">
-                  <a:lnSpc>
-                    <a:spcPct val="100000"/>
-                  </a:lnSpc>
-                  <a:spcBef>
-                    <a:spcPts val="0"/>
-                  </a:spcBef>
-                  <a:buNone/>
-                </a:pPr>
-                <a:r>
-                  <a:rPr lang="en-US" b="1" dirty="0"/>
-                  <a:t>D</a:t>
-                </a:r>
-                <a:r>
-                  <a:rPr lang="en-US" b="1" dirty="0" smtClean="0"/>
-                  <a:t>ifferentiates t-SNE from SNE</a:t>
-                </a:r>
-                <a:endParaRPr lang="en-US" b="1" dirty="0"/>
               </a:p>
             </p:txBody>
           </p:sp>
@@ -8308,7 +8668,7 @@
             <p:spPr/>
             <p:txBody>
               <a:bodyPr>
-                <a:normAutofit fontScale="70000" lnSpcReduction="20000"/>
+                <a:normAutofit fontScale="77500" lnSpcReduction="20000"/>
               </a:bodyPr>
               <a:lstStyle/>
               <a:p>
@@ -8914,352 +9274,351 @@
                   <a:tabLst/>
                   <a:defRPr/>
                 </a:pPr>
+                <a:r>
+                  <a:rPr lang="en-US" b="0" dirty="0" smtClean="0"/>
+                  <a:t>* </a:t>
+                </a:r>
                 <a14:m>
-                  <m:oMathPara xmlns:m="http://schemas.openxmlformats.org/officeDocument/2006/math">
-                    <m:oMathParaPr>
-                      <m:jc m:val="centerGroup"/>
-                    </m:oMathParaPr>
-                    <m:oMath xmlns:m="http://schemas.openxmlformats.org/officeDocument/2006/math">
-                      <m:f>
-                        <m:fPr>
-                          <m:ctrlPr>
-                            <a:rPr lang="en-US" b="0" i="1" smtClean="0">
-                              <a:latin typeface="Cambria Math" charset="0"/>
-                            </a:rPr>
-                          </m:ctrlPr>
-                        </m:fPr>
-                        <m:num>
-                          <m:r>
-                            <a:rPr lang="en-US" b="0" i="1" smtClean="0">
-                              <a:latin typeface="Cambria Math" charset="0"/>
-                            </a:rPr>
-                            <m:t>𝛿</m:t>
-                          </m:r>
-                          <m:r>
-                            <a:rPr lang="en-US" b="0" i="1" smtClean="0">
-                              <a:latin typeface="Cambria Math" charset="0"/>
-                            </a:rPr>
-                            <m:t>𝐶</m:t>
-                          </m:r>
-                        </m:num>
-                        <m:den>
-                          <m:r>
-                            <a:rPr lang="en-US" b="0" i="1" smtClean="0">
-                              <a:latin typeface="Cambria Math" charset="0"/>
-                            </a:rPr>
-                            <m:t>𝛿</m:t>
-                          </m:r>
-                          <m:sSub>
-                            <m:sSubPr>
-                              <m:ctrlPr>
-                                <a:rPr lang="en-US" b="0" i="1" smtClean="0">
-                                  <a:latin typeface="Cambria Math" charset="0"/>
-                                </a:rPr>
-                              </m:ctrlPr>
-                            </m:sSubPr>
-                            <m:e>
-                              <m:r>
-                                <a:rPr lang="en-US" b="0" i="1" smtClean="0">
-                                  <a:latin typeface="Cambria Math" charset="0"/>
-                                </a:rPr>
-                                <m:t>𝑦</m:t>
-                              </m:r>
-                            </m:e>
-                            <m:sub>
-                              <m:r>
-                                <a:rPr lang="en-US" b="0" i="1" smtClean="0">
-                                  <a:latin typeface="Cambria Math" charset="0"/>
-                                </a:rPr>
-                                <m:t>𝑖</m:t>
-                              </m:r>
-                            </m:sub>
-                          </m:sSub>
-                        </m:den>
-                      </m:f>
-                      <m:r>
-                        <a:rPr lang="en-US" b="0" i="1" smtClean="0">
-                          <a:latin typeface="Cambria Math" charset="0"/>
-                        </a:rPr>
-                        <m:t>=4</m:t>
-                      </m:r>
-                      <m:nary>
-                        <m:naryPr>
-                          <m:chr m:val="∑"/>
-                          <m:supHide m:val="on"/>
-                          <m:ctrlPr>
-                            <a:rPr lang="en-US" b="0" i="1" smtClean="0">
-                              <a:latin typeface="Cambria Math" charset="0"/>
-                            </a:rPr>
-                          </m:ctrlPr>
-                        </m:naryPr>
-                        <m:sub>
-                          <m:r>
-                            <a:rPr lang="en-US" b="0" i="1" smtClean="0">
-                              <a:latin typeface="Cambria Math" charset="0"/>
-                            </a:rPr>
-                            <m:t>𝑗</m:t>
-                          </m:r>
-                        </m:sub>
-                        <m:sup/>
-                        <m:e>
-                          <m:f>
-                            <m:fPr>
-                              <m:ctrlPr>
-                                <a:rPr lang="en-US" b="0" i="1" smtClean="0">
-                                  <a:latin typeface="Cambria Math" charset="0"/>
-                                </a:rPr>
-                              </m:ctrlPr>
-                            </m:fPr>
-                            <m:num>
-                              <m:d>
-                                <m:dPr>
-                                  <m:ctrlPr>
-                                    <a:rPr lang="en-US" b="0" i="1" smtClean="0">
-                                      <a:latin typeface="Cambria Math" charset="0"/>
-                                    </a:rPr>
-                                  </m:ctrlPr>
-                                </m:dPr>
-                                <m:e>
-                                  <m:sSub>
-                                    <m:sSubPr>
-                                      <m:ctrlPr>
-                                        <a:rPr lang="en-US" b="0" i="1" smtClean="0">
-                                          <a:latin typeface="Cambria Math" charset="0"/>
-                                        </a:rPr>
-                                      </m:ctrlPr>
-                                    </m:sSubPr>
-                                    <m:e>
-                                      <m:r>
-                                        <a:rPr lang="en-US" b="0" i="1" smtClean="0">
-                                          <a:latin typeface="Cambria Math" charset="0"/>
-                                        </a:rPr>
-                                        <m:t>𝑝</m:t>
-                                      </m:r>
-                                    </m:e>
-                                    <m:sub>
-                                      <m:r>
-                                        <a:rPr lang="en-US" b="0" i="1" smtClean="0">
-                                          <a:latin typeface="Cambria Math" charset="0"/>
-                                        </a:rPr>
-                                        <m:t>𝑖𝑗</m:t>
-                                      </m:r>
-                                    </m:sub>
-                                  </m:sSub>
-                                  <m:r>
-                                    <a:rPr lang="en-US" b="0" i="1" smtClean="0">
-                                      <a:latin typeface="Cambria Math" charset="0"/>
-                                    </a:rPr>
-                                    <m:t>−</m:t>
-                                  </m:r>
-                                  <m:sSub>
-                                    <m:sSubPr>
-                                      <m:ctrlPr>
-                                        <a:rPr lang="en-US" b="0" i="1" smtClean="0">
-                                          <a:latin typeface="Cambria Math" charset="0"/>
-                                        </a:rPr>
-                                      </m:ctrlPr>
-                                    </m:sSubPr>
-                                    <m:e>
-                                      <m:r>
-                                        <a:rPr lang="en-US" b="0" i="1" smtClean="0">
-                                          <a:latin typeface="Cambria Math" charset="0"/>
-                                        </a:rPr>
-                                        <m:t>𝑞</m:t>
-                                      </m:r>
-                                    </m:e>
-                                    <m:sub>
-                                      <m:r>
-                                        <a:rPr lang="en-US" b="0" i="1" smtClean="0">
-                                          <a:latin typeface="Cambria Math" charset="0"/>
-                                        </a:rPr>
-                                        <m:t>𝑖𝑗</m:t>
-                                      </m:r>
-                                    </m:sub>
-                                  </m:sSub>
-                                </m:e>
-                              </m:d>
-                              <m:d>
-                                <m:dPr>
-                                  <m:ctrlPr>
-                                    <a:rPr lang="en-US" b="0" i="1" smtClean="0">
-                                      <a:latin typeface="Cambria Math" charset="0"/>
-                                    </a:rPr>
-                                  </m:ctrlPr>
-                                </m:dPr>
-                                <m:e>
-                                  <m:sSub>
-                                    <m:sSubPr>
-                                      <m:ctrlPr>
-                                        <a:rPr lang="en-US" b="0" i="1" smtClean="0">
-                                          <a:latin typeface="Cambria Math" charset="0"/>
-                                        </a:rPr>
-                                      </m:ctrlPr>
-                                    </m:sSubPr>
-                                    <m:e>
-                                      <m:r>
-                                        <a:rPr lang="en-US" b="0" i="1" smtClean="0">
-                                          <a:latin typeface="Cambria Math" charset="0"/>
-                                        </a:rPr>
-                                        <m:t>𝑦</m:t>
-                                      </m:r>
-                                    </m:e>
-                                    <m:sub>
-                                      <m:r>
-                                        <a:rPr lang="en-US" b="0" i="1" smtClean="0">
-                                          <a:latin typeface="Cambria Math" charset="0"/>
-                                        </a:rPr>
-                                        <m:t>𝑖</m:t>
-                                      </m:r>
-                                    </m:sub>
-                                  </m:sSub>
-                                  <m:r>
-                                    <a:rPr lang="en-US" b="0" i="1" smtClean="0">
-                                      <a:latin typeface="Cambria Math" charset="0"/>
-                                    </a:rPr>
-                                    <m:t>−</m:t>
-                                  </m:r>
-                                  <m:sSub>
-                                    <m:sSubPr>
-                                      <m:ctrlPr>
-                                        <a:rPr lang="en-US" b="0" i="1" smtClean="0">
-                                          <a:latin typeface="Cambria Math" charset="0"/>
-                                        </a:rPr>
-                                      </m:ctrlPr>
-                                    </m:sSubPr>
-                                    <m:e>
-                                      <m:r>
-                                        <a:rPr lang="en-US" b="0" i="1" smtClean="0">
-                                          <a:latin typeface="Cambria Math" charset="0"/>
-                                        </a:rPr>
-                                        <m:t>𝑦</m:t>
-                                      </m:r>
-                                    </m:e>
-                                    <m:sub>
-                                      <m:r>
-                                        <a:rPr lang="en-US" b="0" i="1" smtClean="0">
-                                          <a:latin typeface="Cambria Math" charset="0"/>
-                                        </a:rPr>
-                                        <m:t>𝑗</m:t>
-                                      </m:r>
-                                    </m:sub>
-                                  </m:sSub>
-                                </m:e>
-                              </m:d>
-                            </m:num>
-                            <m:den>
-                              <m:r>
-                                <a:rPr lang="en-US" b="0" i="1" smtClean="0">
-                                  <a:latin typeface="Cambria Math" charset="0"/>
-                                </a:rPr>
-                                <m:t>1+</m:t>
-                              </m:r>
-                              <m:sSup>
-                                <m:sSupPr>
-                                  <m:ctrlPr>
-                                    <a:rPr lang="en-US" b="0" i="1" smtClean="0">
-                                      <a:latin typeface="Cambria Math" charset="0"/>
-                                    </a:rPr>
-                                  </m:ctrlPr>
-                                </m:sSupPr>
-                                <m:e>
-                                  <m:d>
-                                    <m:dPr>
-                                      <m:begChr m:val="|"/>
-                                      <m:endChr m:val="|"/>
-                                      <m:ctrlPr>
-                                        <a:rPr lang="en-US" b="0" i="1" smtClean="0">
-                                          <a:latin typeface="Cambria Math" charset="0"/>
-                                        </a:rPr>
-                                      </m:ctrlPr>
-                                    </m:dPr>
-                                    <m:e>
-                                      <m:d>
-                                        <m:dPr>
-                                          <m:begChr m:val="|"/>
-                                          <m:endChr m:val="|"/>
-                                          <m:ctrlPr>
-                                            <a:rPr lang="en-US" b="0" i="1" smtClean="0">
-                                              <a:latin typeface="Cambria Math" charset="0"/>
-                                            </a:rPr>
-                                          </m:ctrlPr>
-                                        </m:dPr>
-                                        <m:e>
-                                          <m:sSub>
-                                            <m:sSubPr>
-                                              <m:ctrlPr>
-                                                <a:rPr lang="en-US" b="0" i="1" smtClean="0">
-                                                  <a:latin typeface="Cambria Math" charset="0"/>
-                                                </a:rPr>
-                                              </m:ctrlPr>
-                                            </m:sSubPr>
-                                            <m:e>
-                                              <m:r>
-                                                <a:rPr lang="en-US" b="0" i="1" smtClean="0">
-                                                  <a:latin typeface="Cambria Math" charset="0"/>
-                                                </a:rPr>
-                                                <m:t>𝑦</m:t>
-                                              </m:r>
-                                            </m:e>
-                                            <m:sub>
-                                              <m:r>
-                                                <a:rPr lang="en-US" b="0" i="1" smtClean="0">
-                                                  <a:latin typeface="Cambria Math" charset="0"/>
-                                                </a:rPr>
-                                                <m:t>𝑖</m:t>
-                                              </m:r>
-                                            </m:sub>
-                                          </m:sSub>
-                                          <m:r>
-                                            <a:rPr lang="en-US" b="0" i="1" smtClean="0">
-                                              <a:latin typeface="Cambria Math" charset="0"/>
-                                            </a:rPr>
-                                            <m:t>−</m:t>
-                                          </m:r>
-                                          <m:sSub>
-                                            <m:sSubPr>
-                                              <m:ctrlPr>
-                                                <a:rPr lang="en-US" b="0" i="1" smtClean="0">
-                                                  <a:latin typeface="Cambria Math" charset="0"/>
-                                                </a:rPr>
-                                              </m:ctrlPr>
-                                            </m:sSubPr>
-                                            <m:e>
-                                              <m:r>
-                                                <a:rPr lang="en-US" b="0" i="1" smtClean="0">
-                                                  <a:latin typeface="Cambria Math" charset="0"/>
-                                                </a:rPr>
-                                                <m:t>𝑦</m:t>
-                                              </m:r>
-                                            </m:e>
-                                            <m:sub>
-                                              <m:r>
-                                                <a:rPr lang="en-US" b="0" i="1" smtClean="0">
-                                                  <a:latin typeface="Cambria Math" charset="0"/>
-                                                </a:rPr>
-                                                <m:t>𝑗</m:t>
-                                              </m:r>
-                                            </m:sub>
-                                          </m:sSub>
-                                        </m:e>
-                                      </m:d>
-                                    </m:e>
-                                  </m:d>
-                                </m:e>
-                                <m:sup>
-                                  <m:r>
-                                    <a:rPr lang="en-US" b="0" i="1" smtClean="0">
-                                      <a:latin typeface="Cambria Math" charset="0"/>
-                                    </a:rPr>
-                                    <m:t>2</m:t>
-                                  </m:r>
-                                </m:sup>
-                              </m:sSup>
-                            </m:den>
-                          </m:f>
-                        </m:e>
-                      </m:nary>
-                    </m:oMath>
-                  </m:oMathPara>
+                  <m:oMath xmlns:m="http://schemas.openxmlformats.org/officeDocument/2006/math">
+                    <m:f>
+                      <m:fPr>
+                        <m:ctrlPr>
+                          <a:rPr lang="en-US" b="0" i="1" smtClean="0">
+                            <a:latin typeface="Cambria Math" charset="0"/>
+                          </a:rPr>
+                        </m:ctrlPr>
+                      </m:fPr>
+                      <m:num>
+                        <m:r>
+                          <a:rPr lang="en-US" b="0" i="1" smtClean="0">
+                            <a:latin typeface="Cambria Math" charset="0"/>
+                          </a:rPr>
+                          <m:t>𝛿</m:t>
+                        </m:r>
+                        <m:r>
+                          <a:rPr lang="en-US" b="0" i="1" smtClean="0">
+                            <a:latin typeface="Cambria Math" charset="0"/>
+                          </a:rPr>
+                          <m:t>𝐶</m:t>
+                        </m:r>
+                      </m:num>
+                      <m:den>
+                        <m:r>
+                          <a:rPr lang="en-US" b="0" i="1" smtClean="0">
+                            <a:latin typeface="Cambria Math" charset="0"/>
+                          </a:rPr>
+                          <m:t>𝛿</m:t>
+                        </m:r>
+                        <m:sSub>
+                          <m:sSubPr>
+                            <m:ctrlPr>
+                              <a:rPr lang="en-US" b="0" i="1" smtClean="0">
+                                <a:latin typeface="Cambria Math" charset="0"/>
+                              </a:rPr>
+                            </m:ctrlPr>
+                          </m:sSubPr>
+                          <m:e>
+                            <m:r>
+                              <a:rPr lang="en-US" b="0" i="1" smtClean="0">
+                                <a:latin typeface="Cambria Math" charset="0"/>
+                              </a:rPr>
+                              <m:t>𝑦</m:t>
+                            </m:r>
+                          </m:e>
+                          <m:sub>
+                            <m:r>
+                              <a:rPr lang="en-US" b="0" i="1" smtClean="0">
+                                <a:latin typeface="Cambria Math" charset="0"/>
+                              </a:rPr>
+                              <m:t>𝑖</m:t>
+                            </m:r>
+                          </m:sub>
+                        </m:sSub>
+                      </m:den>
+                    </m:f>
+                    <m:r>
+                      <a:rPr lang="en-US" b="0" i="1" smtClean="0">
+                        <a:latin typeface="Cambria Math" charset="0"/>
+                      </a:rPr>
+                      <m:t>=4</m:t>
+                    </m:r>
+                    <m:nary>
+                      <m:naryPr>
+                        <m:chr m:val="∑"/>
+                        <m:supHide m:val="on"/>
+                        <m:ctrlPr>
+                          <a:rPr lang="en-US" b="0" i="1" smtClean="0">
+                            <a:latin typeface="Cambria Math" charset="0"/>
+                          </a:rPr>
+                        </m:ctrlPr>
+                      </m:naryPr>
+                      <m:sub>
+                        <m:r>
+                          <a:rPr lang="en-US" b="0" i="1" smtClean="0">
+                            <a:latin typeface="Cambria Math" charset="0"/>
+                          </a:rPr>
+                          <m:t>𝑗</m:t>
+                        </m:r>
+                      </m:sub>
+                      <m:sup/>
+                      <m:e>
+                        <m:f>
+                          <m:fPr>
+                            <m:ctrlPr>
+                              <a:rPr lang="en-US" b="0" i="1" smtClean="0">
+                                <a:latin typeface="Cambria Math" charset="0"/>
+                              </a:rPr>
+                            </m:ctrlPr>
+                          </m:fPr>
+                          <m:num>
+                            <m:d>
+                              <m:dPr>
+                                <m:ctrlPr>
+                                  <a:rPr lang="en-US" b="0" i="1" smtClean="0">
+                                    <a:latin typeface="Cambria Math" charset="0"/>
+                                  </a:rPr>
+                                </m:ctrlPr>
+                              </m:dPr>
+                              <m:e>
+                                <m:sSub>
+                                  <m:sSubPr>
+                                    <m:ctrlPr>
+                                      <a:rPr lang="en-US" b="0" i="1" smtClean="0">
+                                        <a:latin typeface="Cambria Math" charset="0"/>
+                                      </a:rPr>
+                                    </m:ctrlPr>
+                                  </m:sSubPr>
+                                  <m:e>
+                                    <m:r>
+                                      <a:rPr lang="en-US" b="0" i="1" smtClean="0">
+                                        <a:latin typeface="Cambria Math" charset="0"/>
+                                      </a:rPr>
+                                      <m:t>𝑝</m:t>
+                                    </m:r>
+                                  </m:e>
+                                  <m:sub>
+                                    <m:r>
+                                      <a:rPr lang="en-US" b="0" i="1" smtClean="0">
+                                        <a:latin typeface="Cambria Math" charset="0"/>
+                                      </a:rPr>
+                                      <m:t>𝑖𝑗</m:t>
+                                    </m:r>
+                                  </m:sub>
+                                </m:sSub>
+                                <m:r>
+                                  <a:rPr lang="en-US" b="0" i="1" smtClean="0">
+                                    <a:latin typeface="Cambria Math" charset="0"/>
+                                  </a:rPr>
+                                  <m:t>−</m:t>
+                                </m:r>
+                                <m:sSub>
+                                  <m:sSubPr>
+                                    <m:ctrlPr>
+                                      <a:rPr lang="en-US" b="0" i="1" smtClean="0">
+                                        <a:latin typeface="Cambria Math" charset="0"/>
+                                      </a:rPr>
+                                    </m:ctrlPr>
+                                  </m:sSubPr>
+                                  <m:e>
+                                    <m:r>
+                                      <a:rPr lang="en-US" b="0" i="1" smtClean="0">
+                                        <a:latin typeface="Cambria Math" charset="0"/>
+                                      </a:rPr>
+                                      <m:t>𝑞</m:t>
+                                    </m:r>
+                                  </m:e>
+                                  <m:sub>
+                                    <m:r>
+                                      <a:rPr lang="en-US" b="0" i="1" smtClean="0">
+                                        <a:latin typeface="Cambria Math" charset="0"/>
+                                      </a:rPr>
+                                      <m:t>𝑖𝑗</m:t>
+                                    </m:r>
+                                  </m:sub>
+                                </m:sSub>
+                              </m:e>
+                            </m:d>
+                            <m:d>
+                              <m:dPr>
+                                <m:ctrlPr>
+                                  <a:rPr lang="en-US" b="0" i="1" smtClean="0">
+                                    <a:latin typeface="Cambria Math" charset="0"/>
+                                  </a:rPr>
+                                </m:ctrlPr>
+                              </m:dPr>
+                              <m:e>
+                                <m:sSub>
+                                  <m:sSubPr>
+                                    <m:ctrlPr>
+                                      <a:rPr lang="en-US" b="0" i="1" smtClean="0">
+                                        <a:latin typeface="Cambria Math" charset="0"/>
+                                      </a:rPr>
+                                    </m:ctrlPr>
+                                  </m:sSubPr>
+                                  <m:e>
+                                    <m:r>
+                                      <a:rPr lang="en-US" b="0" i="1" smtClean="0">
+                                        <a:latin typeface="Cambria Math" charset="0"/>
+                                      </a:rPr>
+                                      <m:t>𝑦</m:t>
+                                    </m:r>
+                                  </m:e>
+                                  <m:sub>
+                                    <m:r>
+                                      <a:rPr lang="en-US" b="0" i="1" smtClean="0">
+                                        <a:latin typeface="Cambria Math" charset="0"/>
+                                      </a:rPr>
+                                      <m:t>𝑖</m:t>
+                                    </m:r>
+                                  </m:sub>
+                                </m:sSub>
+                                <m:r>
+                                  <a:rPr lang="en-US" b="0" i="1" smtClean="0">
+                                    <a:latin typeface="Cambria Math" charset="0"/>
+                                  </a:rPr>
+                                  <m:t>−</m:t>
+                                </m:r>
+                                <m:sSub>
+                                  <m:sSubPr>
+                                    <m:ctrlPr>
+                                      <a:rPr lang="en-US" b="0" i="1" smtClean="0">
+                                        <a:latin typeface="Cambria Math" charset="0"/>
+                                      </a:rPr>
+                                    </m:ctrlPr>
+                                  </m:sSubPr>
+                                  <m:e>
+                                    <m:r>
+                                      <a:rPr lang="en-US" b="0" i="1" smtClean="0">
+                                        <a:latin typeface="Cambria Math" charset="0"/>
+                                      </a:rPr>
+                                      <m:t>𝑦</m:t>
+                                    </m:r>
+                                  </m:e>
+                                  <m:sub>
+                                    <m:r>
+                                      <a:rPr lang="en-US" b="0" i="1" smtClean="0">
+                                        <a:latin typeface="Cambria Math" charset="0"/>
+                                      </a:rPr>
+                                      <m:t>𝑗</m:t>
+                                    </m:r>
+                                  </m:sub>
+                                </m:sSub>
+                              </m:e>
+                            </m:d>
+                          </m:num>
+                          <m:den>
+                            <m:r>
+                              <a:rPr lang="en-US" b="0" i="1" smtClean="0">
+                                <a:latin typeface="Cambria Math" charset="0"/>
+                              </a:rPr>
+                              <m:t>1+</m:t>
+                            </m:r>
+                            <m:sSup>
+                              <m:sSupPr>
+                                <m:ctrlPr>
+                                  <a:rPr lang="en-US" b="0" i="1" smtClean="0">
+                                    <a:latin typeface="Cambria Math" charset="0"/>
+                                  </a:rPr>
+                                </m:ctrlPr>
+                              </m:sSupPr>
+                              <m:e>
+                                <m:d>
+                                  <m:dPr>
+                                    <m:begChr m:val="|"/>
+                                    <m:endChr m:val="|"/>
+                                    <m:ctrlPr>
+                                      <a:rPr lang="en-US" b="0" i="1" smtClean="0">
+                                        <a:latin typeface="Cambria Math" charset="0"/>
+                                      </a:rPr>
+                                    </m:ctrlPr>
+                                  </m:dPr>
+                                  <m:e>
+                                    <m:d>
+                                      <m:dPr>
+                                        <m:begChr m:val="|"/>
+                                        <m:endChr m:val="|"/>
+                                        <m:ctrlPr>
+                                          <a:rPr lang="en-US" b="0" i="1" smtClean="0">
+                                            <a:latin typeface="Cambria Math" charset="0"/>
+                                          </a:rPr>
+                                        </m:ctrlPr>
+                                      </m:dPr>
+                                      <m:e>
+                                        <m:sSub>
+                                          <m:sSubPr>
+                                            <m:ctrlPr>
+                                              <a:rPr lang="en-US" b="0" i="1" smtClean="0">
+                                                <a:latin typeface="Cambria Math" charset="0"/>
+                                              </a:rPr>
+                                            </m:ctrlPr>
+                                          </m:sSubPr>
+                                          <m:e>
+                                            <m:r>
+                                              <a:rPr lang="en-US" b="0" i="1" smtClean="0">
+                                                <a:latin typeface="Cambria Math" charset="0"/>
+                                              </a:rPr>
+                                              <m:t>𝑦</m:t>
+                                            </m:r>
+                                          </m:e>
+                                          <m:sub>
+                                            <m:r>
+                                              <a:rPr lang="en-US" b="0" i="1" smtClean="0">
+                                                <a:latin typeface="Cambria Math" charset="0"/>
+                                              </a:rPr>
+                                              <m:t>𝑖</m:t>
+                                            </m:r>
+                                          </m:sub>
+                                        </m:sSub>
+                                        <m:r>
+                                          <a:rPr lang="en-US" b="0" i="1" smtClean="0">
+                                            <a:latin typeface="Cambria Math" charset="0"/>
+                                          </a:rPr>
+                                          <m:t>−</m:t>
+                                        </m:r>
+                                        <m:sSub>
+                                          <m:sSubPr>
+                                            <m:ctrlPr>
+                                              <a:rPr lang="en-US" b="0" i="1" smtClean="0">
+                                                <a:latin typeface="Cambria Math" charset="0"/>
+                                              </a:rPr>
+                                            </m:ctrlPr>
+                                          </m:sSubPr>
+                                          <m:e>
+                                            <m:r>
+                                              <a:rPr lang="en-US" b="0" i="1" smtClean="0">
+                                                <a:latin typeface="Cambria Math" charset="0"/>
+                                              </a:rPr>
+                                              <m:t>𝑦</m:t>
+                                            </m:r>
+                                          </m:e>
+                                          <m:sub>
+                                            <m:r>
+                                              <a:rPr lang="en-US" b="0" i="1" smtClean="0">
+                                                <a:latin typeface="Cambria Math" charset="0"/>
+                                              </a:rPr>
+                                              <m:t>𝑗</m:t>
+                                            </m:r>
+                                          </m:sub>
+                                        </m:sSub>
+                                      </m:e>
+                                    </m:d>
+                                  </m:e>
+                                </m:d>
+                              </m:e>
+                              <m:sup>
+                                <m:r>
+                                  <a:rPr lang="en-US" b="0" i="1" smtClean="0">
+                                    <a:latin typeface="Cambria Math" charset="0"/>
+                                  </a:rPr>
+                                  <m:t>2</m:t>
+                                </m:r>
+                              </m:sup>
+                            </m:sSup>
+                          </m:den>
+                        </m:f>
+                      </m:e>
+                    </m:nary>
+                  </m:oMath>
                 </a14:m>
                 <a:endParaRPr lang="en-US" dirty="0" smtClean="0"/>
               </a:p>
@@ -9321,7 +9680,7 @@
               <a:blipFill rotWithShape="0">
                 <a:blip r:embed="rId3"/>
                 <a:stretch>
-                  <a:fillRect l="-638" t="-1961"/>
+                  <a:fillRect l="-754" t="-2241"/>
                 </a:stretch>
               </a:blipFill>
             </p:spPr>
@@ -9387,44 +9746,325 @@
           <a:p>
             <a:r>
               <a:rPr lang="en-US" dirty="0" smtClean="0"/>
-              <a:t>Strengths/Pitfalls</a:t>
-            </a:r>
-            <a:br>
-              <a:rPr lang="en-US" dirty="0" smtClean="0"/>
-            </a:br>
+              <a:t>Putting the “t” in t-SNE</a:t>
+            </a:r>
             <a:endParaRPr lang="en-US" dirty="0"/>
           </a:p>
         </p:txBody>
       </p:sp>
+      <mc:AlternateContent xmlns:mc="http://schemas.openxmlformats.org/markup-compatibility/2006">
+        <mc:Choice xmlns:a14="http://schemas.microsoft.com/office/drawing/2010/main" Requires="a14">
+          <p:sp>
+            <p:nvSpPr>
+              <p:cNvPr id="3" name="Content Placeholder 2"/>
+              <p:cNvSpPr>
+                <a:spLocks noGrp="1"/>
+              </p:cNvSpPr>
+              <p:nvPr>
+                <p:ph idx="1"/>
+              </p:nvPr>
+            </p:nvSpPr>
+            <p:spPr/>
+            <p:txBody>
+              <a:bodyPr/>
+              <a:lstStyle/>
+              <a:p>
+                <a:pPr marL="0" indent="0">
+                  <a:lnSpc>
+                    <a:spcPct val="100000"/>
+                  </a:lnSpc>
+                  <a:spcBef>
+                    <a:spcPts val="0"/>
+                  </a:spcBef>
+                  <a:buNone/>
+                </a:pPr>
+                <a:r>
+                  <a:rPr lang="en-US" sz="2000" dirty="0" smtClean="0"/>
+                  <a:t>Recall that </a:t>
+                </a:r>
+                <a14:m>
+                  <m:oMath xmlns:m="http://schemas.openxmlformats.org/officeDocument/2006/math">
+                    <m:sSub>
+                      <m:sSubPr>
+                        <m:ctrlPr>
+                          <a:rPr lang="en-US" sz="2000" b="0" i="1" smtClean="0">
+                            <a:latin typeface="Cambria Math" charset="0"/>
+                          </a:rPr>
+                        </m:ctrlPr>
+                      </m:sSubPr>
+                      <m:e>
+                        <m:r>
+                          <a:rPr lang="en-US" sz="2000" b="0" i="1" smtClean="0">
+                            <a:latin typeface="Cambria Math" charset="0"/>
+                          </a:rPr>
+                          <m:t>𝑞</m:t>
+                        </m:r>
+                      </m:e>
+                      <m:sub>
+                        <m:r>
+                          <a:rPr lang="en-US" sz="2000" b="0" i="1" smtClean="0">
+                            <a:latin typeface="Cambria Math" charset="0"/>
+                          </a:rPr>
+                          <m:t>𝑖𝑗</m:t>
+                        </m:r>
+                      </m:sub>
+                    </m:sSub>
+                  </m:oMath>
+                </a14:m>
+                <a:r>
+                  <a:rPr lang="en-US" sz="2000" dirty="0" smtClean="0"/>
+                  <a:t> modeled using a Student t-distribution:</a:t>
+                </a:r>
+              </a:p>
+              <a:p>
+                <a:pPr marL="0" indent="0">
+                  <a:lnSpc>
+                    <a:spcPct val="100000"/>
+                  </a:lnSpc>
+                  <a:spcBef>
+                    <a:spcPts val="0"/>
+                  </a:spcBef>
+                  <a:buNone/>
+                </a:pPr>
+                <a:r>
+                  <a:rPr lang="en-US" sz="2000" dirty="0"/>
+                  <a:t>	</a:t>
+                </a:r>
+                <a:r>
+                  <a:rPr lang="en-US" sz="2000" dirty="0" smtClean="0"/>
+                  <a:t>Why? -&gt; The Crowding Problem</a:t>
+                </a:r>
+              </a:p>
+              <a:p>
+                <a:pPr marL="0" indent="0">
+                  <a:lnSpc>
+                    <a:spcPct val="100000"/>
+                  </a:lnSpc>
+                  <a:spcBef>
+                    <a:spcPts val="0"/>
+                  </a:spcBef>
+                  <a:buNone/>
+                </a:pPr>
+                <a:endParaRPr lang="en-US" dirty="0"/>
+              </a:p>
+              <a:p>
+                <a:pPr marL="0" indent="0">
+                  <a:lnSpc>
+                    <a:spcPct val="100000"/>
+                  </a:lnSpc>
+                  <a:spcBef>
+                    <a:spcPts val="0"/>
+                  </a:spcBef>
+                  <a:buNone/>
+                </a:pPr>
+                <a:endParaRPr lang="en-US" dirty="0" smtClean="0"/>
+              </a:p>
+              <a:p>
+                <a:pPr marL="0" indent="0">
+                  <a:lnSpc>
+                    <a:spcPct val="100000"/>
+                  </a:lnSpc>
+                  <a:spcBef>
+                    <a:spcPts val="0"/>
+                  </a:spcBef>
+                  <a:buNone/>
+                </a:pPr>
+                <a:endParaRPr lang="en-US" dirty="0" smtClean="0"/>
+              </a:p>
+              <a:p>
+                <a:pPr marL="0" marR="0" lvl="0" indent="0" defTabSz="914400" eaLnBrk="1" fontAlgn="auto" latinLnBrk="0" hangingPunct="1">
+                  <a:lnSpc>
+                    <a:spcPct val="100000"/>
+                  </a:lnSpc>
+                  <a:spcBef>
+                    <a:spcPts val="0"/>
+                  </a:spcBef>
+                  <a:spcAft>
+                    <a:spcPts val="0"/>
+                  </a:spcAft>
+                  <a:buClrTx/>
+                  <a:buSzTx/>
+                  <a:buFontTx/>
+                  <a:buNone/>
+                  <a:tabLst/>
+                  <a:defRPr/>
+                </a:pPr>
+                <a:endParaRPr lang="en-US" dirty="0" smtClean="0"/>
+              </a:p>
+              <a:p>
+                <a:pPr marL="0" marR="0" lvl="0" indent="0" defTabSz="914400" eaLnBrk="1" fontAlgn="auto" latinLnBrk="0" hangingPunct="1">
+                  <a:lnSpc>
+                    <a:spcPct val="100000"/>
+                  </a:lnSpc>
+                  <a:spcBef>
+                    <a:spcPts val="0"/>
+                  </a:spcBef>
+                  <a:spcAft>
+                    <a:spcPts val="0"/>
+                  </a:spcAft>
+                  <a:buClrTx/>
+                  <a:buSzTx/>
+                  <a:buFontTx/>
+                  <a:buNone/>
+                  <a:tabLst/>
+                  <a:defRPr/>
+                </a:pPr>
+                <a:endParaRPr lang="en-US" dirty="0"/>
+              </a:p>
+              <a:p>
+                <a:pPr marL="0" marR="0" lvl="0" indent="0" algn="ctr" defTabSz="914400" eaLnBrk="1" fontAlgn="auto" latinLnBrk="0" hangingPunct="1">
+                  <a:lnSpc>
+                    <a:spcPct val="100000"/>
+                  </a:lnSpc>
+                  <a:spcBef>
+                    <a:spcPts val="0"/>
+                  </a:spcBef>
+                  <a:spcAft>
+                    <a:spcPts val="0"/>
+                  </a:spcAft>
+                  <a:buClrTx/>
+                  <a:buSzTx/>
+                  <a:buFontTx/>
+                  <a:buNone/>
+                  <a:tabLst/>
+                  <a:defRPr/>
+                </a:pPr>
+                <a:endParaRPr lang="en-US" dirty="0"/>
+              </a:p>
+            </p:txBody>
+          </p:sp>
+        </mc:Choice>
+        <mc:Fallback>
+          <p:sp>
+            <p:nvSpPr>
+              <p:cNvPr id="3" name="Content Placeholder 2"/>
+              <p:cNvSpPr>
+                <a:spLocks noGrp="1" noRot="1" noChangeAspect="1" noMove="1" noResize="1" noEditPoints="1" noAdjustHandles="1" noChangeArrowheads="1" noChangeShapeType="1" noTextEdit="1"/>
+              </p:cNvSpPr>
+              <p:nvPr>
+                <p:ph idx="1"/>
+              </p:nvPr>
+            </p:nvSpPr>
+            <p:spPr>
+              <a:blipFill rotWithShape="0">
+                <a:blip r:embed="rId2"/>
+                <a:stretch>
+                  <a:fillRect l="-638" t="-560"/>
+                </a:stretch>
+              </a:blipFill>
+            </p:spPr>
+            <p:txBody>
+              <a:bodyPr/>
+              <a:lstStyle/>
+              <a:p>
+                <a:r>
+                  <a:rPr lang="en-US">
+                    <a:noFill/>
+                  </a:rPr>
+                  <a:t> </a:t>
+                </a:r>
+              </a:p>
+            </p:txBody>
+          </p:sp>
+        </mc:Fallback>
+      </mc:AlternateContent>
+      <p:pic>
+        <p:nvPicPr>
+          <p:cNvPr id="4" name="Picture 3"/>
+          <p:cNvPicPr>
+            <a:picLocks noChangeAspect="1"/>
+          </p:cNvPicPr>
+          <p:nvPr/>
+        </p:nvPicPr>
+        <p:blipFill>
+          <a:blip r:embed="rId3">
+            <a:extLst>
+              <a:ext uri="{28A0092B-C50C-407E-A947-70E740481C1C}">
+                <a14:useLocalDpi xmlns:a14="http://schemas.microsoft.com/office/drawing/2010/main" val="0"/>
+              </a:ext>
+            </a:extLst>
+          </a:blip>
+          <a:stretch>
+            <a:fillRect/>
+          </a:stretch>
+        </p:blipFill>
+        <p:spPr>
+          <a:xfrm>
+            <a:off x="1477911" y="2997441"/>
+            <a:ext cx="9236177" cy="2846767"/>
+          </a:xfrm>
+          <a:prstGeom prst="rect">
+            <a:avLst/>
+          </a:prstGeom>
+        </p:spPr>
+      </p:pic>
       <p:sp>
         <p:nvSpPr>
-          <p:cNvPr id="3" name="Content Placeholder 2"/>
-          <p:cNvSpPr>
-            <a:spLocks noGrp="1"/>
-          </p:cNvSpPr>
-          <p:nvPr>
-            <p:ph idx="1"/>
-          </p:nvPr>
+          <p:cNvPr id="6" name="TextBox 5"/>
+          <p:cNvSpPr txBox="1"/>
+          <p:nvPr/>
         </p:nvSpPr>
-        <p:spPr/>
+        <p:spPr>
+          <a:xfrm>
+            <a:off x="2667001" y="5988734"/>
+            <a:ext cx="10515600" cy="646331"/>
+          </a:xfrm>
+          <a:prstGeom prst="rect">
+            <a:avLst/>
+          </a:prstGeom>
+          <a:noFill/>
+        </p:spPr>
         <p:txBody>
-          <a:bodyPr/>
+          <a:bodyPr wrap="square" rtlCol="0">
+            <a:spAutoFit/>
+          </a:bodyPr>
           <a:lstStyle/>
           <a:p>
-            <a:endParaRPr lang="en-US"/>
+            <a:r>
+              <a:rPr lang="en-US" dirty="0" smtClean="0"/>
+              <a:t>Figure 2: Visualization of </a:t>
+            </a:r>
+            <a:r>
+              <a:rPr lang="en-US" dirty="0"/>
+              <a:t>Cost Function Gradients for Two Points (</a:t>
+            </a:r>
+            <a:r>
+              <a:rPr lang="en-US" dirty="0">
+                <a:hlinkClick r:id="rId4"/>
+              </a:rPr>
+              <a:t>https://</a:t>
+            </a:r>
+            <a:r>
+              <a:rPr lang="en-US" dirty="0" smtClean="0">
+                <a:hlinkClick r:id="rId4"/>
+              </a:rPr>
+              <a:t>lvdmaaten.github.io/publications/papers/JMLR_2008.pdf</a:t>
+            </a:r>
+            <a:r>
+              <a:rPr lang="en-US" dirty="0" smtClean="0"/>
+              <a:t>)</a:t>
+            </a:r>
+            <a:endParaRPr lang="en-US" dirty="0"/>
           </a:p>
         </p:txBody>
       </p:sp>
     </p:spTree>
     <p:extLst>
       <p:ext uri="{BB962C8B-B14F-4D97-AF65-F5344CB8AC3E}">
-        <p14:creationId xmlns:p14="http://schemas.microsoft.com/office/powerpoint/2010/main" val="1889581618"/>
+        <p14:creationId xmlns:p14="http://schemas.microsoft.com/office/powerpoint/2010/main" val="1276050119"/>
       </p:ext>
     </p:extLst>
   </p:cSld>
   <p:clrMapOvr>
     <a:masterClrMapping/>
   </p:clrMapOvr>
+  <p:timing>
+    <p:tnLst>
+      <p:par>
+        <p:cTn id="1" dur="indefinite" restart="never" nodeType="tmRoot"/>
+      </p:par>
+    </p:tnLst>
+  </p:timing>
 </p:sld>
 </file>
 
@@ -9462,6 +10102,297 @@
           <a:p>
             <a:r>
               <a:rPr lang="en-US" dirty="0" smtClean="0"/>
+              <a:t>Performance on Data (MNIST)</a:t>
+            </a:r>
+            <a:r>
+              <a:rPr lang="en-US" dirty="0" smtClean="0"/>
+              <a:t/>
+            </a:r>
+            <a:br>
+              <a:rPr lang="en-US" dirty="0" smtClean="0"/>
+            </a:br>
+            <a:endParaRPr lang="en-US" dirty="0"/>
+          </a:p>
+        </p:txBody>
+      </p:sp>
+      <p:sp>
+        <p:nvSpPr>
+          <p:cNvPr id="14" name="Text Placeholder 13"/>
+          <p:cNvSpPr>
+            <a:spLocks noGrp="1"/>
+          </p:cNvSpPr>
+          <p:nvPr>
+            <p:ph type="body" idx="1"/>
+          </p:nvPr>
+        </p:nvSpPr>
+        <p:spPr>
+          <a:xfrm>
+            <a:off x="839788" y="1320353"/>
+            <a:ext cx="5157787" cy="823912"/>
+          </a:xfrm>
+        </p:spPr>
+        <p:txBody>
+          <a:bodyPr/>
+          <a:lstStyle/>
+          <a:p>
+            <a:pPr algn="ctr"/>
+            <a:r>
+              <a:rPr lang="en-US" dirty="0" smtClean="0"/>
+              <a:t>SNE</a:t>
+            </a:r>
+            <a:endParaRPr lang="en-US" dirty="0"/>
+          </a:p>
+        </p:txBody>
+      </p:sp>
+      <p:pic>
+        <p:nvPicPr>
+          <p:cNvPr id="12" name="Content Placeholder 11"/>
+          <p:cNvPicPr>
+            <a:picLocks noGrp="1" noChangeAspect="1"/>
+          </p:cNvPicPr>
+          <p:nvPr>
+            <p:ph sz="half" idx="2"/>
+          </p:nvPr>
+        </p:nvPicPr>
+        <p:blipFill>
+          <a:blip r:embed="rId3">
+            <a:extLst>
+              <a:ext uri="{28A0092B-C50C-407E-A947-70E740481C1C}">
+                <a14:useLocalDpi xmlns:a14="http://schemas.microsoft.com/office/drawing/2010/main" val="0"/>
+              </a:ext>
+            </a:extLst>
+          </a:blip>
+          <a:stretch>
+            <a:fillRect/>
+          </a:stretch>
+        </p:blipFill>
+        <p:spPr>
+          <a:xfrm>
+            <a:off x="1572857" y="2217806"/>
+            <a:ext cx="3903187" cy="3895725"/>
+          </a:xfrm>
+        </p:spPr>
+      </p:pic>
+      <p:sp>
+        <p:nvSpPr>
+          <p:cNvPr id="15" name="Text Placeholder 14"/>
+          <p:cNvSpPr>
+            <a:spLocks noGrp="1"/>
+          </p:cNvSpPr>
+          <p:nvPr>
+            <p:ph type="body" sz="quarter" idx="3"/>
+          </p:nvPr>
+        </p:nvSpPr>
+        <p:spPr>
+          <a:xfrm>
+            <a:off x="6172200" y="1320353"/>
+            <a:ext cx="5183188" cy="823912"/>
+          </a:xfrm>
+        </p:spPr>
+        <p:txBody>
+          <a:bodyPr/>
+          <a:lstStyle/>
+          <a:p>
+            <a:pPr algn="ctr"/>
+            <a:r>
+              <a:rPr lang="en-US" dirty="0" smtClean="0"/>
+              <a:t>t-SNE</a:t>
+            </a:r>
+            <a:endParaRPr lang="en-US" dirty="0"/>
+          </a:p>
+        </p:txBody>
+      </p:sp>
+      <p:pic>
+        <p:nvPicPr>
+          <p:cNvPr id="13" name="Content Placeholder 12"/>
+          <p:cNvPicPr>
+            <a:picLocks noGrp="1" noChangeAspect="1"/>
+          </p:cNvPicPr>
+          <p:nvPr>
+            <p:ph sz="quarter" idx="4"/>
+          </p:nvPr>
+        </p:nvPicPr>
+        <p:blipFill>
+          <a:blip r:embed="rId4">
+            <a:extLst>
+              <a:ext uri="{28A0092B-C50C-407E-A947-70E740481C1C}">
+                <a14:useLocalDpi xmlns:a14="http://schemas.microsoft.com/office/drawing/2010/main" val="0"/>
+              </a:ext>
+            </a:extLst>
+          </a:blip>
+          <a:stretch>
+            <a:fillRect/>
+          </a:stretch>
+        </p:blipFill>
+        <p:spPr>
+          <a:xfrm>
+            <a:off x="6608693" y="2217806"/>
+            <a:ext cx="4050900" cy="3895725"/>
+          </a:xfrm>
+        </p:spPr>
+      </p:pic>
+      <p:sp>
+        <p:nvSpPr>
+          <p:cNvPr id="16" name="TextBox 15"/>
+          <p:cNvSpPr txBox="1"/>
+          <p:nvPr/>
+        </p:nvSpPr>
+        <p:spPr>
+          <a:xfrm>
+            <a:off x="1366459" y="6113531"/>
+            <a:ext cx="4104444" cy="738664"/>
+          </a:xfrm>
+          <a:prstGeom prst="rect">
+            <a:avLst/>
+          </a:prstGeom>
+          <a:noFill/>
+        </p:spPr>
+        <p:txBody>
+          <a:bodyPr wrap="square" rtlCol="0">
+            <a:spAutoFit/>
+          </a:bodyPr>
+          <a:lstStyle/>
+          <a:p>
+            <a:r>
+              <a:rPr lang="en-US" sz="1400" dirty="0" smtClean="0"/>
+              <a:t>Figure 3: Clusters of MNIST Images </a:t>
+            </a:r>
+            <a:r>
+              <a:rPr lang="en-US" sz="1400" dirty="0"/>
+              <a:t>by SNE (</a:t>
+            </a:r>
+            <a:r>
+              <a:rPr lang="en-US" sz="1400" dirty="0">
+                <a:hlinkClick r:id="rId5"/>
+              </a:rPr>
+              <a:t>https://</a:t>
+            </a:r>
+            <a:r>
+              <a:rPr lang="en-US" sz="1400" dirty="0" smtClean="0">
+                <a:hlinkClick r:id="rId5"/>
+              </a:rPr>
+              <a:t>lvdmaaten.github.io/publications/misc/Supplement_JMLR_2008.pdf</a:t>
+            </a:r>
+            <a:r>
+              <a:rPr lang="en-US" sz="1400" dirty="0" smtClean="0"/>
+              <a:t> )</a:t>
+            </a:r>
+            <a:endParaRPr lang="en-US" sz="1400" dirty="0"/>
+          </a:p>
+        </p:txBody>
+      </p:sp>
+      <p:sp>
+        <p:nvSpPr>
+          <p:cNvPr id="17" name="TextBox 16"/>
+          <p:cNvSpPr txBox="1"/>
+          <p:nvPr/>
+        </p:nvSpPr>
+        <p:spPr>
+          <a:xfrm>
+            <a:off x="6808361" y="6113531"/>
+            <a:ext cx="4104444" cy="738664"/>
+          </a:xfrm>
+          <a:prstGeom prst="rect">
+            <a:avLst/>
+          </a:prstGeom>
+          <a:noFill/>
+        </p:spPr>
+        <p:txBody>
+          <a:bodyPr wrap="square" rtlCol="0">
+            <a:spAutoFit/>
+          </a:bodyPr>
+          <a:lstStyle/>
+          <a:p>
+            <a:r>
+              <a:rPr lang="en-US" sz="1400" dirty="0" smtClean="0"/>
+              <a:t>Figure 4: Clusters of MNIST Images </a:t>
+            </a:r>
+            <a:r>
+              <a:rPr lang="en-US" sz="1400" dirty="0"/>
+              <a:t>by </a:t>
+            </a:r>
+            <a:r>
+              <a:rPr lang="en-US" sz="1400" dirty="0" smtClean="0"/>
+              <a:t>t-SNE </a:t>
+            </a:r>
+            <a:r>
+              <a:rPr lang="en-US" sz="1400" dirty="0"/>
+              <a:t>(</a:t>
+            </a:r>
+            <a:r>
+              <a:rPr lang="en-US" sz="1400" dirty="0">
+                <a:hlinkClick r:id="rId5"/>
+              </a:rPr>
+              <a:t>https://</a:t>
+            </a:r>
+            <a:r>
+              <a:rPr lang="en-US" sz="1400" dirty="0" smtClean="0">
+                <a:hlinkClick r:id="rId5"/>
+              </a:rPr>
+              <a:t>lvdmaaten.github.io/publications/misc/Supplement_JMLR_2008.pdf</a:t>
+            </a:r>
+            <a:r>
+              <a:rPr lang="en-US" sz="1400" dirty="0" smtClean="0"/>
+              <a:t> )</a:t>
+            </a:r>
+            <a:endParaRPr lang="en-US" sz="1400" dirty="0"/>
+          </a:p>
+        </p:txBody>
+      </p:sp>
+    </p:spTree>
+    <p:extLst>
+      <p:ext uri="{BB962C8B-B14F-4D97-AF65-F5344CB8AC3E}">
+        <p14:creationId xmlns:p14="http://schemas.microsoft.com/office/powerpoint/2010/main" val="1889581618"/>
+      </p:ext>
+    </p:extLst>
+  </p:cSld>
+  <p:clrMapOvr>
+    <a:masterClrMapping/>
+  </p:clrMapOvr>
+  <p:timing>
+    <p:tnLst>
+      <p:par>
+        <p:cTn id="1" dur="indefinite" restart="never" nodeType="tmRoot"/>
+      </p:par>
+    </p:tnLst>
+  </p:timing>
+</p:sld>
+</file>
+
+<file path=ppt/slides/slide9.xml><?xml version="1.0" encoding="utf-8"?>
+<p:sld xmlns:a="http://schemas.openxmlformats.org/drawingml/2006/main" xmlns:r="http://schemas.openxmlformats.org/officeDocument/2006/relationships" xmlns:p="http://schemas.openxmlformats.org/presentationml/2006/main">
+  <p:cSld>
+    <p:spTree>
+      <p:nvGrpSpPr>
+        <p:cNvPr id="1" name=""/>
+        <p:cNvGrpSpPr/>
+        <p:nvPr/>
+      </p:nvGrpSpPr>
+      <p:grpSpPr>
+        <a:xfrm>
+          <a:off x="0" y="0"/>
+          <a:ext cx="0" cy="0"/>
+          <a:chOff x="0" y="0"/>
+          <a:chExt cx="0" cy="0"/>
+        </a:xfrm>
+      </p:grpSpPr>
+      <p:sp>
+        <p:nvSpPr>
+          <p:cNvPr id="2" name="Title 1"/>
+          <p:cNvSpPr>
+            <a:spLocks noGrp="1"/>
+          </p:cNvSpPr>
+          <p:nvPr>
+            <p:ph type="title"/>
+          </p:nvPr>
+        </p:nvSpPr>
+        <p:spPr/>
+        <p:txBody>
+          <a:bodyPr/>
+          <a:lstStyle/>
+          <a:p>
+            <a:r>
+              <a:rPr lang="en-US" dirty="0" smtClean="0"/>
               <a:t>Comparison to Other Methods</a:t>
             </a:r>
             <a:endParaRPr lang="en-US" dirty="0"/>
@@ -9497,6 +10428,13 @@
   <p:clrMapOvr>
     <a:masterClrMapping/>
   </p:clrMapOvr>
+  <p:timing>
+    <p:tnLst>
+      <p:par>
+        <p:cTn id="1" dur="indefinite" restart="never" nodeType="tmRoot"/>
+      </p:par>
+    </p:tnLst>
+  </p:timing>
 </p:sld>
 </file>
 

</xml_diff>

<commit_message>
this is a commit
</commit_message>
<xml_diff>
--- a/math465_tsne.pptx
+++ b/math465_tsne.pptx
@@ -5410,13 +5410,13 @@
             </p:nvSpPr>
             <p:spPr>
               <a:xfrm>
-                <a:off x="838200" y="1351722"/>
-                <a:ext cx="10949608" cy="5229187"/>
+                <a:off x="838200" y="1801091"/>
+                <a:ext cx="10949608" cy="4779818"/>
               </a:xfrm>
             </p:spPr>
             <p:txBody>
               <a:bodyPr>
-                <a:normAutofit/>
+                <a:normAutofit lnSpcReduction="10000"/>
               </a:bodyPr>
               <a:lstStyle/>
               <a:p>
@@ -5428,44 +5428,77 @@
                 </a:endParaRPr>
               </a:p>
               <a:p>
-                <a:pPr marL="0" indent="0">
-                  <a:buNone/>
-                </a:pPr>
-                <a:endParaRPr lang="en-US" i="1" dirty="0">
-                  <a:latin typeface="Cambria Math" charset="0"/>
-                </a:endParaRPr>
-              </a:p>
-              <a:p>
-                <a:pPr marL="0" indent="0">
-                  <a:buNone/>
-                </a:pPr>
-                <a:endParaRPr lang="en-US" b="0" i="1" dirty="0" smtClean="0">
-                  <a:latin typeface="Cambria Math" charset="0"/>
-                </a:endParaRPr>
-              </a:p>
-              <a:p>
-                <a:pPr marL="0" indent="0">
-                  <a:buNone/>
+                <a:pPr marL="514350" indent="-514350">
+                  <a:buFont typeface="+mj-lt"/>
+                  <a:buAutoNum type="arabicPeriod"/>
                 </a:pPr>
                 <a:r>
-                  <a:rPr lang="en-US" b="1" i="1" dirty="0" smtClean="0"/>
-                  <a:t>Approach:</a:t>
+                  <a:rPr lang="en-US" dirty="0" smtClean="0"/>
+                  <a:t>Measure ”similarity” of </a:t>
                 </a:r>
+                <a14:m>
+                  <m:oMath xmlns:m="http://schemas.openxmlformats.org/officeDocument/2006/math">
+                    <m:sSub>
+                      <m:sSubPr>
+                        <m:ctrlPr>
+                          <a:rPr lang="en-US" b="1" i="1">
+                            <a:latin typeface="Cambria Math" charset="0"/>
+                          </a:rPr>
+                        </m:ctrlPr>
+                      </m:sSubPr>
+                      <m:e>
+                        <m:r>
+                          <a:rPr lang="en-US" b="1" i="1" smtClean="0">
+                            <a:latin typeface="Cambria Math" charset="0"/>
+                          </a:rPr>
+                          <m:t>𝒙</m:t>
+                        </m:r>
+                      </m:e>
+                      <m:sub>
+                        <m:r>
+                          <a:rPr lang="en-US" b="1" i="1">
+                            <a:latin typeface="Cambria Math" charset="0"/>
+                          </a:rPr>
+                          <m:t>𝟏</m:t>
+                        </m:r>
+                      </m:sub>
+                    </m:sSub>
+                    <m:r>
+                      <a:rPr lang="en-US" i="1">
+                        <a:latin typeface="Cambria Math" charset="0"/>
+                      </a:rPr>
+                      <m:t>,…,</m:t>
+                    </m:r>
+                    <m:sSub>
+                      <m:sSubPr>
+                        <m:ctrlPr>
+                          <a:rPr lang="en-US" b="1" i="1">
+                            <a:latin typeface="Cambria Math" charset="0"/>
+                          </a:rPr>
+                        </m:ctrlPr>
+                      </m:sSubPr>
+                      <m:e>
+                        <m:r>
+                          <a:rPr lang="en-US" b="1" i="1" smtClean="0">
+                            <a:latin typeface="Cambria Math" charset="0"/>
+                          </a:rPr>
+                          <m:t>𝒙</m:t>
+                        </m:r>
+                      </m:e>
+                      <m:sub>
+                        <m:r>
+                          <a:rPr lang="en-US" b="1" i="1">
+                            <a:latin typeface="Cambria Math" charset="0"/>
+                          </a:rPr>
+                          <m:t>𝒏</m:t>
+                        </m:r>
+                      </m:sub>
+                    </m:sSub>
+                  </m:oMath>
+                </a14:m>
                 <a:r>
                   <a:rPr lang="en-US" dirty="0" smtClean="0"/>
-                  <a:t>	</a:t>
-                </a:r>
-                <a:r>
-                  <a:rPr lang="en-US" dirty="0" smtClean="0"/>
-                  <a:t>1</a:t>
-                </a:r>
-                <a:r>
-                  <a:rPr lang="en-US" dirty="0" smtClean="0"/>
-                  <a:t>. </a:t>
-                </a:r>
-                <a:r>
-                  <a:rPr lang="en-US" dirty="0" smtClean="0"/>
-                  <a:t>Measure ”similarity” of points in original space </a:t>
+                  <a:t>in original space </a:t>
                 </a:r>
                 <a14:m>
                   <m:oMath xmlns:m="http://schemas.openxmlformats.org/officeDocument/2006/math">
@@ -5490,23 +5523,87 @@
                     </m:sSup>
                   </m:oMath>
                 </a14:m>
-                <a:endParaRPr lang="en-US" dirty="0" smtClean="0"/>
+                <a:endParaRPr lang="en-US" b="0" dirty="0" smtClean="0"/>
               </a:p>
               <a:p>
-                <a:pPr marL="0" indent="0">
-                  <a:buNone/>
+                <a:pPr marL="514350" indent="-514350">
+                  <a:buFont typeface="+mj-lt"/>
+                  <a:buAutoNum type="arabicPeriod"/>
+                </a:pPr>
+                <a:endParaRPr lang="en-US" b="0" dirty="0" smtClean="0"/>
+              </a:p>
+              <a:p>
+                <a:pPr marL="514350" indent="-514350">
+                  <a:buFont typeface="+mj-lt"/>
+                  <a:buAutoNum type="arabicPeriod"/>
                 </a:pPr>
                 <a:r>
                   <a:rPr lang="en-US" dirty="0" smtClean="0"/>
-                  <a:t>	</a:t>
+                  <a:t>Measure “similarity” of </a:t>
                 </a:r>
+                <a14:m>
+                  <m:oMath xmlns:m="http://schemas.openxmlformats.org/officeDocument/2006/math">
+                    <m:sSub>
+                      <m:sSubPr>
+                        <m:ctrlPr>
+                          <a:rPr lang="en-US" b="1" i="1">
+                            <a:latin typeface="Cambria Math" charset="0"/>
+                          </a:rPr>
+                        </m:ctrlPr>
+                      </m:sSubPr>
+                      <m:e>
+                        <m:r>
+                          <a:rPr lang="en-US" b="1" i="1">
+                            <a:latin typeface="Cambria Math" charset="0"/>
+                          </a:rPr>
+                          <m:t>𝒚</m:t>
+                        </m:r>
+                      </m:e>
+                      <m:sub>
+                        <m:r>
+                          <a:rPr lang="en-US" b="1" i="1">
+                            <a:latin typeface="Cambria Math" charset="0"/>
+                          </a:rPr>
+                          <m:t>𝟏</m:t>
+                        </m:r>
+                      </m:sub>
+                    </m:sSub>
+                    <m:r>
+                      <a:rPr lang="en-US" i="1">
+                        <a:latin typeface="Cambria Math" charset="0"/>
+                      </a:rPr>
+                      <m:t>,…,</m:t>
+                    </m:r>
+                    <m:sSub>
+                      <m:sSubPr>
+                        <m:ctrlPr>
+                          <a:rPr lang="en-US" b="1" i="1">
+                            <a:latin typeface="Cambria Math" charset="0"/>
+                          </a:rPr>
+                        </m:ctrlPr>
+                      </m:sSubPr>
+                      <m:e>
+                        <m:r>
+                          <a:rPr lang="en-US" b="1" i="1">
+                            <a:latin typeface="Cambria Math" charset="0"/>
+                          </a:rPr>
+                          <m:t>𝒚</m:t>
+                        </m:r>
+                      </m:e>
+                      <m:sub>
+                        <m:r>
+                          <a:rPr lang="en-US" b="1" i="1">
+                            <a:latin typeface="Cambria Math" charset="0"/>
+                          </a:rPr>
+                          <m:t>𝒏</m:t>
+                        </m:r>
+                      </m:sub>
+                    </m:sSub>
+                  </m:oMath>
+                </a14:m>
                 <a:r>
                   <a:rPr lang="en-US" dirty="0" smtClean="0"/>
-                  <a:t>	2. </a:t>
-                </a:r>
-                <a:r>
-                  <a:rPr lang="en-US" dirty="0" smtClean="0"/>
-                  <a:t>Measure “similarity” of points in embedding space </a:t>
+                  <a:t> in embedding space </a:t>
                 </a:r>
                 <a14:m>
                   <m:oMath xmlns:m="http://schemas.openxmlformats.org/officeDocument/2006/math">
@@ -5537,47 +5634,126 @@
                     </m:sSup>
                   </m:oMath>
                 </a14:m>
+                <a:endParaRPr lang="en-US" b="0" dirty="0" smtClean="0"/>
+              </a:p>
+              <a:p>
+                <a:pPr marL="514350" indent="-514350">
+                  <a:buFont typeface="+mj-lt"/>
+                  <a:buAutoNum type="arabicPeriod"/>
+                </a:pPr>
+                <a:endParaRPr lang="en-US" b="0" dirty="0" smtClean="0"/>
+              </a:p>
+              <a:p>
+                <a:pPr marL="514350" indent="-514350">
+                  <a:buFont typeface="+mj-lt"/>
+                  <a:buAutoNum type="arabicPeriod"/>
+                </a:pPr>
+                <a:r>
+                  <a:rPr lang="en-US" dirty="0" smtClean="0"/>
+                  <a:t>Cost function – measure the error in our embedding</a:t>
+                </a:r>
+              </a:p>
+              <a:p>
+                <a:pPr marL="514350" indent="-514350">
+                  <a:buFont typeface="+mj-lt"/>
+                  <a:buAutoNum type="arabicPeriod"/>
+                </a:pPr>
                 <a:endParaRPr lang="en-US" dirty="0" smtClean="0"/>
               </a:p>
               <a:p>
-                <a:pPr marL="0" indent="0">
-                  <a:buNone/>
+                <a:pPr marL="514350" indent="-514350">
+                  <a:buFont typeface="+mj-lt"/>
+                  <a:buAutoNum type="arabicPeriod"/>
                 </a:pPr>
                 <a:r>
-                  <a:rPr lang="en-US" dirty="0"/>
-                  <a:t>	</a:t>
+                  <a:rPr lang="en-US" dirty="0" smtClean="0"/>
+                  <a:t>Gradient Descent – Find </a:t>
                 </a:r>
+                <a14:m>
+                  <m:oMath xmlns:m="http://schemas.openxmlformats.org/officeDocument/2006/math">
+                    <m:sSub>
+                      <m:sSubPr>
+                        <m:ctrlPr>
+                          <a:rPr lang="en-US" b="1" i="1" smtClean="0">
+                            <a:latin typeface="Cambria Math" charset="0"/>
+                          </a:rPr>
+                        </m:ctrlPr>
+                      </m:sSubPr>
+                      <m:e>
+                        <m:r>
+                          <a:rPr lang="en-US" b="1" i="1" smtClean="0">
+                            <a:latin typeface="Cambria Math" charset="0"/>
+                          </a:rPr>
+                          <m:t>𝒚</m:t>
+                        </m:r>
+                      </m:e>
+                      <m:sub>
+                        <m:r>
+                          <a:rPr lang="en-US" b="1" i="1" smtClean="0">
+                            <a:latin typeface="Cambria Math" charset="0"/>
+                          </a:rPr>
+                          <m:t>𝟏</m:t>
+                        </m:r>
+                      </m:sub>
+                    </m:sSub>
+                    <m:r>
+                      <a:rPr lang="en-US" b="0" i="1" smtClean="0">
+                        <a:latin typeface="Cambria Math" charset="0"/>
+                      </a:rPr>
+                      <m:t>,…,</m:t>
+                    </m:r>
+                    <m:sSub>
+                      <m:sSubPr>
+                        <m:ctrlPr>
+                          <a:rPr lang="en-US" b="1" i="1" smtClean="0">
+                            <a:latin typeface="Cambria Math" charset="0"/>
+                          </a:rPr>
+                        </m:ctrlPr>
+                      </m:sSubPr>
+                      <m:e>
+                        <m:r>
+                          <a:rPr lang="en-US" b="1" i="1" smtClean="0">
+                            <a:latin typeface="Cambria Math" charset="0"/>
+                          </a:rPr>
+                          <m:t>𝒚</m:t>
+                        </m:r>
+                      </m:e>
+                      <m:sub>
+                        <m:r>
+                          <a:rPr lang="en-US" b="1" i="1" smtClean="0">
+                            <a:latin typeface="Cambria Math" charset="0"/>
+                          </a:rPr>
+                          <m:t>𝒏</m:t>
+                        </m:r>
+                      </m:sub>
+                    </m:sSub>
+                  </m:oMath>
+                </a14:m>
                 <a:r>
                   <a:rPr lang="en-US" dirty="0" smtClean="0"/>
-                  <a:t>	3. </a:t>
-                </a:r>
-                <a:r>
-                  <a:rPr lang="en-US" dirty="0" smtClean="0"/>
-                  <a:t>How do we measure the accurac</a:t>
-                </a:r>
-                <a:r>
-                  <a:rPr lang="en-US" dirty="0" smtClean="0"/>
-                  <a:t>y of the embedding?</a:t>
+                  <a:t> that minimizes the cost function</a:t>
                 </a:r>
               </a:p>
               <a:p>
-                <a:pPr marL="0" indent="0">
-                  <a:buNone/>
+                <a:pPr marL="514350" indent="-514350">
+                  <a:buFont typeface="+mj-lt"/>
+                  <a:buAutoNum type="arabicPeriod"/>
+                </a:pPr>
+                <a:endParaRPr lang="en-US" dirty="0"/>
+              </a:p>
+              <a:p>
+                <a:pPr marL="514350" indent="-514350">
+                  <a:buFont typeface="+mj-lt"/>
+                  <a:buAutoNum type="arabicPeriod"/>
                 </a:pPr>
                 <a:r>
-                  <a:rPr lang="en-US" dirty="0"/>
-                  <a:t>	</a:t>
+                  <a:rPr lang="en-US" dirty="0" smtClean="0"/>
+                  <a:t>Improvements from standard </a:t>
                 </a:r>
                 <a:r>
-                  <a:rPr lang="en-US" dirty="0" smtClean="0"/>
-                  <a:t>	4. </a:t>
+                  <a:rPr lang="en-US" i="1" dirty="0" smtClean="0"/>
+                  <a:t>SNE</a:t>
                 </a:r>
-              </a:p>
-              <a:p>
-                <a:pPr marL="0" indent="0">
-                  <a:buNone/>
-                </a:pPr>
-                <a:endParaRPr lang="en-US" dirty="0" smtClean="0"/>
               </a:p>
             </p:txBody>
           </p:sp>
@@ -5595,13 +5771,13 @@
             </p:nvSpPr>
             <p:spPr>
               <a:xfrm>
-                <a:off x="838200" y="1351722"/>
-                <a:ext cx="10949608" cy="5229187"/>
+                <a:off x="838200" y="1801091"/>
+                <a:ext cx="10949608" cy="4779818"/>
               </a:xfrm>
               <a:blipFill rotWithShape="0">
                 <a:blip r:embed="rId2"/>
                 <a:stretch>
-                  <a:fillRect l="-1169"/>
+                  <a:fillRect l="-1169" b="-1401"/>
                 </a:stretch>
               </a:blipFill>
             </p:spPr>

</xml_diff>